<commit_message>
#1122 SYRCoSE slides updated
</commit_message>
<xml_diff>
--- a/root/docs/slides/Anton_Rigin_SYRCoSE_2019.pptx
+++ b/root/docs/slides/Anton_Rigin_SYRCoSE_2019.pptx
@@ -5,7 +5,7 @@
     <p:sldMasterId id="2147483648" r:id="rId1"/>
   </p:sldMasterIdLst>
   <p:notesMasterIdLst>
-    <p:notesMasterId r:id="rId30"/>
+    <p:notesMasterId r:id="rId31"/>
   </p:notesMasterIdLst>
   <p:sldIdLst>
     <p:sldId id="256" r:id="rId2"/>
@@ -24,18 +24,19 @@
     <p:sldId id="278" r:id="rId15"/>
     <p:sldId id="273" r:id="rId16"/>
     <p:sldId id="282" r:id="rId17"/>
-    <p:sldId id="283" r:id="rId18"/>
-    <p:sldId id="284" r:id="rId19"/>
-    <p:sldId id="285" r:id="rId20"/>
-    <p:sldId id="286" r:id="rId21"/>
-    <p:sldId id="287" r:id="rId22"/>
-    <p:sldId id="288" r:id="rId23"/>
-    <p:sldId id="290" r:id="rId24"/>
-    <p:sldId id="291" r:id="rId25"/>
-    <p:sldId id="292" r:id="rId26"/>
-    <p:sldId id="289" r:id="rId27"/>
-    <p:sldId id="271" r:id="rId28"/>
-    <p:sldId id="263" r:id="rId29"/>
+    <p:sldId id="293" r:id="rId18"/>
+    <p:sldId id="283" r:id="rId19"/>
+    <p:sldId id="284" r:id="rId20"/>
+    <p:sldId id="285" r:id="rId21"/>
+    <p:sldId id="286" r:id="rId22"/>
+    <p:sldId id="287" r:id="rId23"/>
+    <p:sldId id="288" r:id="rId24"/>
+    <p:sldId id="290" r:id="rId25"/>
+    <p:sldId id="291" r:id="rId26"/>
+    <p:sldId id="292" r:id="rId27"/>
+    <p:sldId id="289" r:id="rId28"/>
+    <p:sldId id="271" r:id="rId29"/>
+    <p:sldId id="263" r:id="rId30"/>
   </p:sldIdLst>
   <p:sldSz cx="24384000" cy="13716000"/>
   <p:notesSz cx="6858000" cy="9144000"/>
@@ -6357,7 +6358,7 @@
               <a:rPr lang="en-US" sz="6000" dirty="0">
                 <a:sym typeface="Arial Narrow"/>
               </a:rPr>
-              <a:t>To develop and implement an algorithm that would allow selecting the most appropriate indexing data structure (B-tree, B</a:t>
+              <a:t>To develop and implement an algorithm that would allow selecting the indexing data structure (B-tree, B</a:t>
             </a:r>
             <a:r>
               <a:rPr lang="en-US" sz="6000" baseline="30000" dirty="0">
@@ -6930,7 +6931,7 @@
                 <a:ea typeface="Arial Narrow" charset="0"/>
                 <a:cs typeface="Arial Narrow" charset="0"/>
               </a:rPr>
-              <a:t>Algorithm of Selecting the Best Index Structure</a:t>
+              <a:t>Algorithm of Selecting the Index Structure</a:t>
             </a:r>
           </a:p>
         </p:txBody>
@@ -7099,28 +7100,7 @@
               <a:rPr lang="en-US" sz="4800" dirty="0">
                 <a:sym typeface="Arial Narrow"/>
               </a:rPr>
-              <a:t>The best index structure is defined by the step 6 of the algorithm</a:t>
-            </a:r>
-          </a:p>
-          <a:p>
-            <a:pPr marL="457200" indent="-457200" algn="l">
-              <a:buFont typeface="Arial" panose="020B0604020202020204" pitchFamily="34" charset="0"/>
-              <a:buChar char="•"/>
-              <a:defRPr sz="2800">
-                <a:solidFill>
-                  <a:srgbClr val="253957"/>
-                </a:solidFill>
-                <a:latin typeface="+mn-lt"/>
-                <a:ea typeface="+mn-ea"/>
-                <a:cs typeface="+mn-cs"/>
-                <a:sym typeface="Arial Narrow"/>
-              </a:defRPr>
-            </a:pPr>
-            <a:r>
-              <a:rPr lang="en-US" sz="4800" dirty="0">
-                <a:sym typeface="Arial Narrow"/>
-              </a:rPr>
-              <a:t>The tree order of the B-trees and their modifications used in the SQLite extension developed in this work equals 100</a:t>
+              <a:t>The tree order of the B-trees and their modifications used in the SQLite extension developed in this work equals 750</a:t>
             </a:r>
           </a:p>
         </p:txBody>
@@ -7657,7 +7637,7 @@
                 <a:ea typeface="Arial Narrow" charset="0"/>
                 <a:cs typeface="Arial Narrow" charset="0"/>
               </a:rPr>
-              <a:t>Algorithm of Selecting the Best Index Structure</a:t>
+              <a:t>Algorithm of Selecting the Index Structure</a:t>
             </a:r>
           </a:p>
         </p:txBody>
@@ -8087,222 +8067,298 @@
           </a:p>
         </p:txBody>
       </p:sp>
-      <p:sp>
-        <p:nvSpPr>
-          <p:cNvPr id="8" name="Text Text Text Text Text Text Text Text Text Text Text Text Text Text Text Text Text Text Text Text Text Text Text Text Text Text Text Text Text Text Text Text Text Text Text Text Text Text Text Text Text Text Text Text Text Text Text Text Text Text Text Text Text Text Text Text Text Text Text Text Text Text Text Text Text Text Text Text Text Text Text Text Text Text Text Text Text Text Text Text Text Text Text Text Text Text Text Text Text Text Text Text Text Text Text Text Text Text Text Text Text Text Text Text Text Text Text Text…">
-            <a:extLst>
-              <a:ext uri="{FF2B5EF4-FFF2-40B4-BE49-F238E27FC236}">
-                <a16:creationId xmlns:a16="http://schemas.microsoft.com/office/drawing/2014/main" id="{FFB73F17-777E-4651-BD1E-3421DCDED927}"/>
-              </a:ext>
-            </a:extLst>
-          </p:cNvPr>
-          <p:cNvSpPr txBox="1"/>
-          <p:nvPr/>
-        </p:nvSpPr>
-        <p:spPr>
-          <a:xfrm>
-            <a:off x="1182627" y="4857209"/>
-            <a:ext cx="21506374" cy="7843807"/>
-          </a:xfrm>
-          <a:prstGeom prst="rect">
-            <a:avLst/>
-          </a:prstGeom>
-          <a:ln w="12700">
-            <a:miter lim="400000"/>
-          </a:ln>
-          <a:extLst>
-            <a:ext uri="{C572A759-6A51-4108-AA02-DFA0A04FC94B}">
-              <ma14:wrappingTextBoxFlag xmlns:ma14="http://schemas.microsoft.com/office/mac/drawingml/2011/main" xmlns:m="http://schemas.openxmlformats.org/officeDocument/2006/math" xmlns="" xmlns:a14="http://schemas.microsoft.com/office/drawing/2010/main" xmlns:mc="http://schemas.openxmlformats.org/markup-compatibility/2006" val="1"/>
-            </a:ext>
-          </a:extLst>
-        </p:spPr>
-        <p:txBody>
-          <a:bodyPr lIns="71437" tIns="71437" rIns="71437" bIns="71437" numCol="2" spcCol="1075318"/>
-          <a:lstStyle/>
-          <a:p>
-            <a:pPr algn="l">
-              <a:spcBef>
-                <a:spcPts val="2800"/>
-              </a:spcBef>
-              <a:buSzPct val="100000"/>
-              <a:defRPr sz="2800">
-                <a:solidFill>
-                  <a:srgbClr val="253957"/>
-                </a:solidFill>
-                <a:latin typeface="+mn-lt"/>
-                <a:ea typeface="+mn-ea"/>
-                <a:cs typeface="+mn-cs"/>
-                <a:sym typeface="Arial Narrow"/>
-              </a:defRPr>
-            </a:pPr>
-            <a:r>
-              <a:rPr lang="en-US" sz="3600" dirty="0"/>
-              <a:t>1.	If the current total count of the operations on the tree is equal to 0 or more than 10000 or not a multiple of 1000, then exit the algorithm, otherwise go to step 2.</a:t>
-            </a:r>
-          </a:p>
-          <a:p>
-            <a:pPr algn="l">
-              <a:spcBef>
-                <a:spcPts val="2800"/>
-              </a:spcBef>
-              <a:buSzPct val="100000"/>
-              <a:defRPr sz="2800">
-                <a:solidFill>
-                  <a:srgbClr val="253957"/>
-                </a:solidFill>
-                <a:latin typeface="+mn-lt"/>
-                <a:ea typeface="+mn-ea"/>
-                <a:cs typeface="+mn-cs"/>
-                <a:sym typeface="Arial Narrow"/>
-              </a:defRPr>
-            </a:pPr>
-            <a:r>
-              <a:rPr lang="en-US" sz="3600" dirty="0"/>
-              <a:t>2.	If the current count of the modifying operations on the tree (key insertions, key deletions) is less than 10 % of the current total count of the operations on the tree, then exit the algorithm, otherwise go to step 3.</a:t>
-            </a:r>
-          </a:p>
-          <a:p>
-            <a:pPr algn="l">
-              <a:spcBef>
-                <a:spcPts val="2800"/>
-              </a:spcBef>
-              <a:buSzPct val="100000"/>
-              <a:defRPr sz="2800">
-                <a:solidFill>
-                  <a:srgbClr val="253957"/>
-                </a:solidFill>
-                <a:latin typeface="+mn-lt"/>
-                <a:ea typeface="+mn-ea"/>
-                <a:cs typeface="+mn-cs"/>
-                <a:sym typeface="Arial Narrow"/>
-              </a:defRPr>
-            </a:pPr>
-            <a:r>
-              <a:rPr lang="en-US" sz="3600" dirty="0"/>
-              <a:t>3.	If the current count of the key insertion operations is more than 90 % of the current count of the modifying operations on the tree, then select the B</a:t>
-            </a:r>
-            <a:r>
-              <a:rPr lang="en-US" sz="3600" baseline="30000" dirty="0"/>
-              <a:t>*</a:t>
-            </a:r>
-            <a:r>
-              <a:rPr lang="en-US" sz="3600" dirty="0"/>
-              <a:t>-tree as the index structure and go to step 6, otherwise go to step 4.</a:t>
-            </a:r>
-          </a:p>
-          <a:p>
-            <a:pPr algn="l">
-              <a:spcBef>
-                <a:spcPts val="2800"/>
-              </a:spcBef>
-              <a:buSzPct val="100000"/>
-              <a:defRPr sz="2800">
-                <a:solidFill>
-                  <a:srgbClr val="253957"/>
-                </a:solidFill>
-                <a:latin typeface="+mn-lt"/>
-                <a:ea typeface="+mn-ea"/>
-                <a:cs typeface="+mn-cs"/>
-                <a:sym typeface="Arial Narrow"/>
-              </a:defRPr>
-            </a:pPr>
-            <a:endParaRPr lang="en-US" sz="3600" dirty="0"/>
-          </a:p>
-          <a:p>
-            <a:pPr algn="l">
-              <a:spcBef>
-                <a:spcPts val="2800"/>
-              </a:spcBef>
-              <a:buSzPct val="100000"/>
-              <a:defRPr sz="2800">
-                <a:solidFill>
-                  <a:srgbClr val="253957"/>
-                </a:solidFill>
-                <a:latin typeface="+mn-lt"/>
-                <a:ea typeface="+mn-ea"/>
-                <a:cs typeface="+mn-cs"/>
-                <a:sym typeface="Arial Narrow"/>
-              </a:defRPr>
-            </a:pPr>
-            <a:r>
-              <a:rPr lang="en-US" sz="3600" dirty="0"/>
-              <a:t>4.	If the current count of the key insertion operations is not less than 60 % of the current count of the modifying operations on the tree, then select the B</a:t>
-            </a:r>
-            <a:r>
-              <a:rPr lang="en-US" sz="3600" baseline="30000" dirty="0"/>
-              <a:t>*+</a:t>
-            </a:r>
-            <a:r>
-              <a:rPr lang="en-US" sz="3600" dirty="0"/>
-              <a:t>-tree as the index structure and go to step 6, otherwise go to step 5.</a:t>
-            </a:r>
-          </a:p>
-          <a:p>
-            <a:pPr algn="l">
-              <a:spcBef>
-                <a:spcPts val="2800"/>
-              </a:spcBef>
-              <a:buSzPct val="100000"/>
-              <a:defRPr sz="2800">
-                <a:solidFill>
-                  <a:srgbClr val="253957"/>
-                </a:solidFill>
-                <a:latin typeface="+mn-lt"/>
-                <a:ea typeface="+mn-ea"/>
-                <a:cs typeface="+mn-cs"/>
-                <a:sym typeface="Arial Narrow"/>
-              </a:defRPr>
-            </a:pPr>
-            <a:r>
-              <a:rPr lang="en-US" sz="3600" dirty="0"/>
-              <a:t>5.	Select the B</a:t>
-            </a:r>
-            <a:r>
-              <a:rPr lang="en-US" sz="3600" baseline="30000" dirty="0"/>
-              <a:t>+</a:t>
-            </a:r>
-            <a:r>
-              <a:rPr lang="en-US" sz="3600" dirty="0"/>
-              <a:t>-tree as the index structure and go to</a:t>
-            </a:r>
-            <a:br>
-              <a:rPr lang="en-US" sz="3600" dirty="0"/>
-            </a:br>
-            <a:r>
-              <a:rPr lang="en-US" sz="3600" dirty="0"/>
-              <a:t>step 6.</a:t>
-            </a:r>
-          </a:p>
-          <a:p>
-            <a:pPr algn="l">
-              <a:spcBef>
-                <a:spcPts val="2800"/>
-              </a:spcBef>
-              <a:buSzPct val="100000"/>
-              <a:defRPr sz="2800">
-                <a:solidFill>
-                  <a:srgbClr val="253957"/>
-                </a:solidFill>
-                <a:latin typeface="+mn-lt"/>
-                <a:ea typeface="+mn-ea"/>
-                <a:cs typeface="+mn-cs"/>
-                <a:sym typeface="Arial Narrow"/>
-              </a:defRPr>
-            </a:pPr>
-            <a:r>
-              <a:rPr lang="en-US" sz="3600" dirty="0"/>
-              <a:t>6.	If the new index structure was selected in the steps</a:t>
-            </a:r>
-            <a:br>
-              <a:rPr lang="en-US" sz="3600" dirty="0"/>
-            </a:br>
-            <a:r>
-              <a:rPr lang="en-US" sz="3600" dirty="0"/>
-              <a:t>3 – 5, then rebuild the existing index structure into the new selected index structure (which is considered as the best index structure) saving all the data stored in the existing index structure.</a:t>
-            </a:r>
-          </a:p>
-        </p:txBody>
-      </p:sp>
+      <mc:AlternateContent xmlns:mc="http://schemas.openxmlformats.org/markup-compatibility/2006" xmlns:a14="http://schemas.microsoft.com/office/drawing/2010/main">
+        <mc:Choice Requires="a14">
+          <p:sp>
+            <p:nvSpPr>
+              <p:cNvPr id="8" name="Text Text Text Text Text Text Text Text Text Text Text Text Text Text Text Text Text Text Text Text Text Text Text Text Text Text Text Text Text Text Text Text Text Text Text Text Text Text Text Text Text Text Text Text Text Text Text Text Text Text Text Text Text Text Text Text Text Text Text Text Text Text Text Text Text Text Text Text Text Text Text Text Text Text Text Text Text Text Text Text Text Text Text Text Text Text Text Text Text Text Text Text Text Text Text Text Text Text Text Text Text Text Text Text Text Text Text Text…">
+                <a:extLst>
+                  <a:ext uri="{FF2B5EF4-FFF2-40B4-BE49-F238E27FC236}">
+                    <a16:creationId xmlns:a16="http://schemas.microsoft.com/office/drawing/2014/main" id="{FFB73F17-777E-4651-BD1E-3421DCDED927}"/>
+                  </a:ext>
+                </a:extLst>
+              </p:cNvPr>
+              <p:cNvSpPr txBox="1"/>
+              <p:nvPr/>
+            </p:nvSpPr>
+            <p:spPr>
+              <a:xfrm>
+                <a:off x="1182627" y="4857209"/>
+                <a:ext cx="21506374" cy="7843807"/>
+              </a:xfrm>
+              <a:prstGeom prst="rect">
+                <a:avLst/>
+              </a:prstGeom>
+              <a:ln w="12700">
+                <a:miter lim="400000"/>
+              </a:ln>
+              <a:extLst>
+                <a:ext uri="{C572A759-6A51-4108-AA02-DFA0A04FC94B}">
+                  <ma14:wrappingTextBoxFlag xmlns:ma14="http://schemas.microsoft.com/office/mac/drawingml/2011/main" xmlns:m="http://schemas.openxmlformats.org/officeDocument/2006/math" xmlns="" val="1"/>
+                </a:ext>
+              </a:extLst>
+            </p:spPr>
+            <p:txBody>
+              <a:bodyPr lIns="71437" tIns="71437" rIns="71437" bIns="71437" numCol="2" spcCol="1075318"/>
+              <a:lstStyle/>
+              <a:p>
+                <a:pPr algn="l">
+                  <a:spcBef>
+                    <a:spcPts val="2800"/>
+                  </a:spcBef>
+                  <a:buSzPct val="100000"/>
+                  <a:defRPr sz="2800">
+                    <a:solidFill>
+                      <a:srgbClr val="253957"/>
+                    </a:solidFill>
+                    <a:latin typeface="+mn-lt"/>
+                    <a:ea typeface="+mn-ea"/>
+                    <a:cs typeface="+mn-cs"/>
+                    <a:sym typeface="Arial Narrow"/>
+                  </a:defRPr>
+                </a:pPr>
+                <a:r>
+                  <a:rPr lang="en-US" sz="3600" dirty="0"/>
+                  <a:t>1.	If the current total count of the operations on the tree is equal to 0 or more than 10000 or not a multiple of 1000, then exit the algorithm, otherwise go to step 2.</a:t>
+                </a:r>
+              </a:p>
+              <a:p>
+                <a:pPr algn="l">
+                  <a:spcBef>
+                    <a:spcPts val="2800"/>
+                  </a:spcBef>
+                  <a:buSzPct val="100000"/>
+                  <a:defRPr sz="2800">
+                    <a:solidFill>
+                      <a:srgbClr val="253957"/>
+                    </a:solidFill>
+                    <a:latin typeface="+mn-lt"/>
+                    <a:ea typeface="+mn-ea"/>
+                    <a:cs typeface="+mn-cs"/>
+                    <a:sym typeface="Arial Narrow"/>
+                  </a:defRPr>
+                </a:pPr>
+                <a:r>
+                  <a:rPr lang="en-US" sz="3600" dirty="0"/>
+                  <a:t>2.	If the current count of the modifying operations on the tree (key insertions, key deletions) is less than 10 % of the current total count of the operations on the tree, then exit the algorithm, otherwise go to step 3.</a:t>
+                </a:r>
+              </a:p>
+              <a:p>
+                <a:pPr algn="l">
+                  <a:spcBef>
+                    <a:spcPts val="2800"/>
+                  </a:spcBef>
+                  <a:buSzPct val="100000"/>
+                  <a:defRPr sz="2800">
+                    <a:solidFill>
+                      <a:srgbClr val="253957"/>
+                    </a:solidFill>
+                    <a:latin typeface="+mn-lt"/>
+                    <a:ea typeface="+mn-ea"/>
+                    <a:cs typeface="+mn-cs"/>
+                    <a:sym typeface="Arial Narrow"/>
+                  </a:defRPr>
+                </a:pPr>
+                <a:r>
+                  <a:rPr lang="en-US" sz="3600" dirty="0"/>
+                  <a:t>3.	If the current count of the key insertion operations is more than </a:t>
+                </a:r>
+                <a14:m>
+                  <m:oMath xmlns:m="http://schemas.openxmlformats.org/officeDocument/2006/math">
+                    <m:r>
+                      <a:rPr lang="en-US" sz="3600" i="1" dirty="0" smtClean="0">
+                        <a:latin typeface="Cambria Math" panose="02040503050406030204" pitchFamily="18" charset="0"/>
+                      </a:rPr>
+                      <m:t>𝑝</m:t>
+                    </m:r>
+                    <m:r>
+                      <a:rPr lang="en-US" sz="3600" i="1" dirty="0" smtClean="0">
+                        <a:latin typeface="Cambria Math" panose="02040503050406030204" pitchFamily="18" charset="0"/>
+                      </a:rPr>
+                      <m:t> = 73.97 %</m:t>
+                    </m:r>
+                  </m:oMath>
+                </a14:m>
+                <a:r>
+                  <a:rPr lang="en-US" sz="3600" dirty="0"/>
+                  <a:t> of the current count of the modifying operations on the tree, then select the B</a:t>
+                </a:r>
+                <a:r>
+                  <a:rPr lang="en-US" sz="3600" baseline="30000" dirty="0"/>
+                  <a:t>*</a:t>
+                </a:r>
+                <a:r>
+                  <a:rPr lang="en-US" sz="3600" dirty="0"/>
+                  <a:t>-tree as the index structure and go to step 5, otherwise go to step 4.</a:t>
+                </a:r>
+              </a:p>
+              <a:p>
+                <a:pPr algn="l">
+                  <a:spcBef>
+                    <a:spcPts val="2800"/>
+                  </a:spcBef>
+                  <a:buSzPct val="100000"/>
+                  <a:defRPr sz="2800">
+                    <a:solidFill>
+                      <a:srgbClr val="253957"/>
+                    </a:solidFill>
+                    <a:latin typeface="+mn-lt"/>
+                    <a:ea typeface="+mn-ea"/>
+                    <a:cs typeface="+mn-cs"/>
+                    <a:sym typeface="Arial Narrow"/>
+                  </a:defRPr>
+                </a:pPr>
+                <a:endParaRPr lang="en-US" sz="3600" dirty="0"/>
+              </a:p>
+              <a:p>
+                <a:pPr algn="l">
+                  <a:spcBef>
+                    <a:spcPts val="2800"/>
+                  </a:spcBef>
+                  <a:buSzPct val="100000"/>
+                  <a:defRPr sz="2800">
+                    <a:solidFill>
+                      <a:srgbClr val="253957"/>
+                    </a:solidFill>
+                    <a:latin typeface="+mn-lt"/>
+                    <a:ea typeface="+mn-ea"/>
+                    <a:cs typeface="+mn-cs"/>
+                    <a:sym typeface="Arial Narrow"/>
+                  </a:defRPr>
+                </a:pPr>
+                <a:r>
+                  <a:rPr lang="en-US" sz="3600" dirty="0"/>
+                  <a:t>4.	</a:t>
+                </a:r>
+                <a:r>
+                  <a:rPr lang="en-US" sz="3600" dirty="0">
+                    <a:solidFill>
+                      <a:srgbClr val="253957"/>
+                    </a:solidFill>
+                    <a:sym typeface="Arial Narrow"/>
+                  </a:rPr>
+                  <a:t>Select the B</a:t>
+                </a:r>
+                <a:r>
+                  <a:rPr lang="en-US" sz="3600" baseline="30000" dirty="0">
+                    <a:solidFill>
+                      <a:srgbClr val="253957"/>
+                    </a:solidFill>
+                    <a:sym typeface="Arial Narrow"/>
+                  </a:rPr>
+                  <a:t>*+</a:t>
+                </a:r>
+                <a:r>
+                  <a:rPr lang="en-US" sz="3600" dirty="0">
+                    <a:solidFill>
+                      <a:srgbClr val="253957"/>
+                    </a:solidFill>
+                    <a:sym typeface="Arial Narrow"/>
+                  </a:rPr>
+                  <a:t>-tree as the index structure and go to</a:t>
+                </a:r>
+                <a:br>
+                  <a:rPr lang="en-US" sz="3600" dirty="0">
+                    <a:solidFill>
+                      <a:srgbClr val="253957"/>
+                    </a:solidFill>
+                    <a:sym typeface="Arial Narrow"/>
+                  </a:rPr>
+                </a:br>
+                <a:r>
+                  <a:rPr lang="en-US" sz="3600" dirty="0">
+                    <a:solidFill>
+                      <a:srgbClr val="253957"/>
+                    </a:solidFill>
+                    <a:sym typeface="Arial Narrow"/>
+                  </a:rPr>
+                  <a:t>step 5.</a:t>
+                </a:r>
+              </a:p>
+              <a:p>
+                <a:pPr algn="l">
+                  <a:spcBef>
+                    <a:spcPts val="2800"/>
+                  </a:spcBef>
+                  <a:buSzPct val="100000"/>
+                  <a:defRPr sz="2800">
+                    <a:solidFill>
+                      <a:srgbClr val="253957"/>
+                    </a:solidFill>
+                    <a:latin typeface="+mn-lt"/>
+                    <a:ea typeface="+mn-ea"/>
+                    <a:cs typeface="+mn-cs"/>
+                    <a:sym typeface="Arial Narrow"/>
+                  </a:defRPr>
+                </a:pPr>
+                <a:r>
+                  <a:rPr lang="en-US" sz="3600" dirty="0"/>
+                  <a:t>5.	If the new index structure was selected in the steps</a:t>
+                </a:r>
+                <a:br>
+                  <a:rPr lang="en-US" sz="3600" dirty="0"/>
+                </a:br>
+                <a:r>
+                  <a:rPr lang="en-US" sz="3600" dirty="0"/>
+                  <a:t>3 – 4, then rebuild the existing index structure into the new selected index structure saving all the data stored in the existing index structure.</a:t>
+                </a:r>
+              </a:p>
+            </p:txBody>
+          </p:sp>
+        </mc:Choice>
+        <mc:Fallback xmlns="">
+          <p:sp>
+            <p:nvSpPr>
+              <p:cNvPr id="8" name="Text Text Text Text Text Text Text Text Text Text Text Text Text Text Text Text Text Text Text Text Text Text Text Text Text Text Text Text Text Text Text Text Text Text Text Text Text Text Text Text Text Text Text Text Text Text Text Text Text Text Text Text Text Text Text Text Text Text Text Text Text Text Text Text Text Text Text Text Text Text Text Text Text Text Text Text Text Text Text Text Text Text Text Text Text Text Text Text Text Text Text Text Text Text Text Text Text Text Text Text Text Text Text Text Text Text Text Text…">
+                <a:extLst>
+                  <a:ext uri="{FF2B5EF4-FFF2-40B4-BE49-F238E27FC236}">
+                    <a16:creationId xmlns:a16="http://schemas.microsoft.com/office/drawing/2014/main" id="{FFB73F17-777E-4651-BD1E-3421DCDED927}"/>
+                  </a:ext>
+                </a:extLst>
+              </p:cNvPr>
+              <p:cNvSpPr txBox="1">
+                <a:spLocks noRot="1" noChangeAspect="1" noMove="1" noResize="1" noEditPoints="1" noAdjustHandles="1" noChangeArrowheads="1" noChangeShapeType="1" noTextEdit="1"/>
+              </p:cNvSpPr>
+              <p:nvPr/>
+            </p:nvSpPr>
+            <p:spPr>
+              <a:xfrm>
+                <a:off x="1182627" y="4857209"/>
+                <a:ext cx="21506374" cy="7843807"/>
+              </a:xfrm>
+              <a:prstGeom prst="rect">
+                <a:avLst/>
+              </a:prstGeom>
+              <a:blipFill>
+                <a:blip r:embed="rId3"/>
+                <a:stretch>
+                  <a:fillRect l="-964" t="-855"/>
+                </a:stretch>
+              </a:blipFill>
+              <a:ln w="12700">
+                <a:miter lim="400000"/>
+              </a:ln>
+              <a:extLst>
+                <a:ext uri="{C572A759-6A51-4108-AA02-DFA0A04FC94B}">
+                  <ma14:wrappingTextBoxFlag xmlns:a14="http://schemas.microsoft.com/office/drawing/2010/main" xmlns="" xmlns:m="http://schemas.openxmlformats.org/officeDocument/2006/math" xmlns:ma14="http://schemas.microsoft.com/office/mac/drawingml/2011/main" val="1"/>
+                </a:ext>
+              </a:extLst>
+            </p:spPr>
+            <p:txBody>
+              <a:bodyPr/>
+              <a:lstStyle/>
+              <a:p>
+                <a:r>
+                  <a:rPr lang="ru-RU">
+                    <a:noFill/>
+                  </a:rPr>
+                  <a:t> </a:t>
+                </a:r>
+              </a:p>
+            </p:txBody>
+          </p:sp>
+        </mc:Fallback>
+      </mc:AlternateContent>
     </p:spTree>
     <p:extLst>
       <p:ext uri="{BB962C8B-B14F-4D97-AF65-F5344CB8AC3E}">
@@ -8318,6 +8374,579 @@
 </file>
 
 <file path=ppt/slides/slide17.xml><?xml version="1.0" encoding="utf-8"?>
+<p:sld xmlns:a="http://schemas.openxmlformats.org/drawingml/2006/main" xmlns:r="http://schemas.openxmlformats.org/officeDocument/2006/relationships" xmlns:p="http://schemas.openxmlformats.org/presentationml/2006/main">
+  <p:cSld>
+    <p:spTree>
+      <p:nvGrpSpPr>
+        <p:cNvPr id="1" name=""/>
+        <p:cNvGrpSpPr/>
+        <p:nvPr/>
+      </p:nvGrpSpPr>
+      <p:grpSpPr>
+        <a:xfrm>
+          <a:off x="0" y="0"/>
+          <a:ext cx="0" cy="0"/>
+          <a:chOff x="0" y="0"/>
+          <a:chExt cx="0" cy="0"/>
+        </a:xfrm>
+      </p:grpSpPr>
+      <p:sp>
+        <p:nvSpPr>
+          <p:cNvPr id="58" name="Линия"/>
+          <p:cNvSpPr/>
+          <p:nvPr/>
+        </p:nvSpPr>
+        <p:spPr>
+          <a:xfrm>
+            <a:off x="1201065" y="2214562"/>
+            <a:ext cx="21506373" cy="1"/>
+          </a:xfrm>
+          <a:prstGeom prst="line">
+            <a:avLst/>
+          </a:prstGeom>
+          <a:ln w="12700">
+            <a:solidFill>
+              <a:srgbClr val="253957"/>
+            </a:solidFill>
+            <a:miter lim="400000"/>
+          </a:ln>
+        </p:spPr>
+        <p:txBody>
+          <a:bodyPr lIns="71437" tIns="71437" rIns="71437" bIns="71437" anchor="ctr"/>
+          <a:lstStyle/>
+          <a:p>
+            <a:pPr>
+              <a:defRPr sz="3200"/>
+            </a:pPr>
+            <a:endParaRPr/>
+          </a:p>
+        </p:txBody>
+      </p:sp>
+      <p:sp>
+        <p:nvSpPr>
+          <p:cNvPr id="59" name="Очень крутой заголовок…"/>
+          <p:cNvSpPr txBox="1"/>
+          <p:nvPr/>
+        </p:nvSpPr>
+        <p:spPr>
+          <a:xfrm>
+            <a:off x="1209448" y="2994051"/>
+            <a:ext cx="21495711" cy="2313227"/>
+          </a:xfrm>
+          <a:prstGeom prst="rect">
+            <a:avLst/>
+          </a:prstGeom>
+          <a:ln w="12700">
+            <a:miter lim="400000"/>
+          </a:ln>
+          <a:extLst>
+            <a:ext uri="{C572A759-6A51-4108-AA02-DFA0A04FC94B}">
+              <ma14:wrappingTextBoxFlag xmlns="" xmlns:m="http://schemas.openxmlformats.org/officeDocument/2006/math" xmlns:a14="http://schemas.microsoft.com/office/drawing/2010/main" xmlns:ma14="http://schemas.microsoft.com/office/mac/drawingml/2011/main" val="1"/>
+            </a:ext>
+          </a:extLst>
+        </p:spPr>
+        <p:txBody>
+          <a:bodyPr lIns="71437" tIns="71437" rIns="71437" bIns="71437"/>
+          <a:lstStyle/>
+          <a:p>
+            <a:pPr algn="l">
+              <a:defRPr sz="5000" b="1" cap="all">
+                <a:solidFill>
+                  <a:srgbClr val="253957"/>
+                </a:solidFill>
+                <a:latin typeface="+mn-lt"/>
+                <a:ea typeface="+mn-ea"/>
+                <a:cs typeface="+mn-cs"/>
+                <a:sym typeface="Arial Narrow"/>
+              </a:defRPr>
+            </a:pPr>
+            <a:r>
+              <a:rPr lang="en-US" sz="7000" b="1" dirty="0">
+                <a:latin typeface="Arial Narrow" charset="0"/>
+                <a:ea typeface="Arial Narrow" charset="0"/>
+                <a:cs typeface="Arial Narrow" charset="0"/>
+              </a:rPr>
+              <a:t>Algorithm of Selecting the Index Structure</a:t>
+            </a:r>
+          </a:p>
+        </p:txBody>
+      </p:sp>
+      <p:sp>
+        <p:nvSpPr>
+          <p:cNvPr id="62" name="Название подразделения, лаборатории, факультета и т.д."/>
+          <p:cNvSpPr txBox="1"/>
+          <p:nvPr/>
+        </p:nvSpPr>
+        <p:spPr>
+          <a:xfrm>
+            <a:off x="11338744" y="942364"/>
+            <a:ext cx="11366416" cy="513601"/>
+          </a:xfrm>
+          <a:prstGeom prst="rect">
+            <a:avLst/>
+          </a:prstGeom>
+          <a:ln w="12700">
+            <a:miter lim="400000"/>
+          </a:ln>
+          <a:extLst>
+            <a:ext uri="{C572A759-6A51-4108-AA02-DFA0A04FC94B}">
+              <ma14:wrappingTextBoxFlag xmlns="" xmlns:m="http://schemas.openxmlformats.org/officeDocument/2006/math" xmlns:a14="http://schemas.microsoft.com/office/drawing/2010/main" xmlns:ma14="http://schemas.microsoft.com/office/mac/drawingml/2011/main" val="1"/>
+            </a:ext>
+          </a:extLst>
+        </p:spPr>
+        <p:txBody>
+          <a:bodyPr lIns="71437" tIns="71437" rIns="71437" bIns="71437" anchor="ctr">
+            <a:spAutoFit/>
+          </a:bodyPr>
+          <a:lstStyle>
+            <a:lvl1pPr algn="r">
+              <a:defRPr sz="2400">
+                <a:solidFill>
+                  <a:srgbClr val="253957"/>
+                </a:solidFill>
+                <a:latin typeface="+mn-lt"/>
+                <a:ea typeface="+mn-ea"/>
+                <a:cs typeface="+mn-cs"/>
+                <a:sym typeface="Arial Narrow"/>
+              </a:defRPr>
+            </a:lvl1pPr>
+          </a:lstStyle>
+          <a:p>
+            <a:r>
+              <a:rPr lang="en-US" dirty="0"/>
+              <a:t>Faculty of Computer Science</a:t>
+            </a:r>
+          </a:p>
+        </p:txBody>
+      </p:sp>
+      <p:pic>
+        <p:nvPicPr>
+          <p:cNvPr id="9" name="Изображение" descr="Изображение"/>
+          <p:cNvPicPr>
+            <a:picLocks noChangeAspect="1"/>
+          </p:cNvPicPr>
+          <p:nvPr/>
+        </p:nvPicPr>
+        <p:blipFill>
+          <a:blip r:embed="rId2">
+            <a:extLst/>
+          </a:blip>
+          <a:stretch>
+            <a:fillRect/>
+          </a:stretch>
+        </p:blipFill>
+        <p:spPr>
+          <a:xfrm>
+            <a:off x="1211199" y="620465"/>
+            <a:ext cx="1214985" cy="1214985"/>
+          </a:xfrm>
+          <a:prstGeom prst="rect">
+            <a:avLst/>
+          </a:prstGeom>
+          <a:ln w="12700">
+            <a:miter lim="400000"/>
+          </a:ln>
+        </p:spPr>
+      </p:pic>
+      <p:sp>
+        <p:nvSpPr>
+          <p:cNvPr id="11" name="Номер слайда 3">
+            <a:extLst>
+              <a:ext uri="{FF2B5EF4-FFF2-40B4-BE49-F238E27FC236}">
+                <a16:creationId xmlns:a16="http://schemas.microsoft.com/office/drawing/2014/main" id="{28E460DF-2BC3-438A-AF55-9003BE469B4E}"/>
+              </a:ext>
+            </a:extLst>
+          </p:cNvPr>
+          <p:cNvSpPr txBox="1">
+            <a:spLocks/>
+          </p:cNvSpPr>
+          <p:nvPr/>
+        </p:nvSpPr>
+        <p:spPr>
+          <a:xfrm>
+            <a:off x="22705161" y="13079288"/>
+            <a:ext cx="1678840" cy="636712"/>
+          </a:xfrm>
+          <a:prstGeom prst="rect">
+            <a:avLst/>
+          </a:prstGeom>
+          <a:ln w="12700">
+            <a:miter lim="400000"/>
+          </a:ln>
+        </p:spPr>
+        <p:txBody>
+          <a:bodyPr wrap="none" lIns="71437" tIns="71437" rIns="71437" bIns="71437">
+            <a:spAutoFit/>
+          </a:bodyPr>
+          <a:lstStyle>
+            <a:defPPr marL="0" marR="0" indent="0" algn="l" defTabSz="914400" rtl="0" fontAlgn="auto" latinLnBrk="1" hangingPunct="0">
+              <a:lnSpc>
+                <a:spcPct val="100000"/>
+              </a:lnSpc>
+              <a:spcBef>
+                <a:spcPts val="0"/>
+              </a:spcBef>
+              <a:spcAft>
+                <a:spcPts val="0"/>
+              </a:spcAft>
+              <a:buClrTx/>
+              <a:buSzTx/>
+              <a:buFontTx/>
+              <a:buNone/>
+              <a:tabLst/>
+              <a:defRPr kumimoji="0" sz="1800" b="0" i="0" u="none" strike="noStrike" cap="none" spc="0" normalizeH="0" baseline="0">
+                <a:ln>
+                  <a:noFill/>
+                </a:ln>
+                <a:solidFill>
+                  <a:srgbClr val="000000"/>
+                </a:solidFill>
+                <a:effectLst/>
+                <a:uFillTx/>
+              </a:defRPr>
+            </a:defPPr>
+            <a:lvl1pPr marL="0" marR="0" indent="0" algn="ctr" defTabSz="821531" rtl="0" fontAlgn="auto" latinLnBrk="0" hangingPunct="0">
+              <a:lnSpc>
+                <a:spcPct val="100000"/>
+              </a:lnSpc>
+              <a:spcBef>
+                <a:spcPts val="0"/>
+              </a:spcBef>
+              <a:spcAft>
+                <a:spcPts val="0"/>
+              </a:spcAft>
+              <a:buClrTx/>
+              <a:buSzTx/>
+              <a:buFontTx/>
+              <a:buNone/>
+              <a:tabLst/>
+              <a:defRPr kumimoji="0" sz="2400" b="0" i="0" u="none" strike="noStrike" cap="none" spc="0" normalizeH="0" baseline="0">
+                <a:ln>
+                  <a:noFill/>
+                </a:ln>
+                <a:solidFill>
+                  <a:srgbClr val="000000"/>
+                </a:solidFill>
+                <a:effectLst/>
+                <a:uFillTx/>
+                <a:latin typeface="+mj-lt"/>
+                <a:ea typeface="+mj-ea"/>
+                <a:cs typeface="+mj-cs"/>
+                <a:sym typeface="Helvetica Light"/>
+              </a:defRPr>
+            </a:lvl1pPr>
+            <a:lvl2pPr marL="0" marR="0" indent="228600" algn="ctr" defTabSz="821531" rtl="0" fontAlgn="auto" latinLnBrk="0" hangingPunct="0">
+              <a:lnSpc>
+                <a:spcPct val="100000"/>
+              </a:lnSpc>
+              <a:spcBef>
+                <a:spcPts val="0"/>
+              </a:spcBef>
+              <a:spcAft>
+                <a:spcPts val="0"/>
+              </a:spcAft>
+              <a:buClrTx/>
+              <a:buSzTx/>
+              <a:buFontTx/>
+              <a:buNone/>
+              <a:tabLst/>
+              <a:defRPr kumimoji="0" sz="5000" b="0" i="0" u="none" strike="noStrike" cap="none" spc="0" normalizeH="0" baseline="0">
+                <a:ln>
+                  <a:noFill/>
+                </a:ln>
+                <a:solidFill>
+                  <a:srgbClr val="000000"/>
+                </a:solidFill>
+                <a:effectLst/>
+                <a:uFillTx/>
+                <a:latin typeface="+mj-lt"/>
+                <a:ea typeface="+mj-ea"/>
+                <a:cs typeface="+mj-cs"/>
+                <a:sym typeface="Helvetica Light"/>
+              </a:defRPr>
+            </a:lvl2pPr>
+            <a:lvl3pPr marL="0" marR="0" indent="457200" algn="ctr" defTabSz="821531" rtl="0" fontAlgn="auto" latinLnBrk="0" hangingPunct="0">
+              <a:lnSpc>
+                <a:spcPct val="100000"/>
+              </a:lnSpc>
+              <a:spcBef>
+                <a:spcPts val="0"/>
+              </a:spcBef>
+              <a:spcAft>
+                <a:spcPts val="0"/>
+              </a:spcAft>
+              <a:buClrTx/>
+              <a:buSzTx/>
+              <a:buFontTx/>
+              <a:buNone/>
+              <a:tabLst/>
+              <a:defRPr kumimoji="0" sz="5000" b="0" i="0" u="none" strike="noStrike" cap="none" spc="0" normalizeH="0" baseline="0">
+                <a:ln>
+                  <a:noFill/>
+                </a:ln>
+                <a:solidFill>
+                  <a:srgbClr val="000000"/>
+                </a:solidFill>
+                <a:effectLst/>
+                <a:uFillTx/>
+                <a:latin typeface="+mj-lt"/>
+                <a:ea typeface="+mj-ea"/>
+                <a:cs typeface="+mj-cs"/>
+                <a:sym typeface="Helvetica Light"/>
+              </a:defRPr>
+            </a:lvl3pPr>
+            <a:lvl4pPr marL="0" marR="0" indent="685800" algn="ctr" defTabSz="821531" rtl="0" fontAlgn="auto" latinLnBrk="0" hangingPunct="0">
+              <a:lnSpc>
+                <a:spcPct val="100000"/>
+              </a:lnSpc>
+              <a:spcBef>
+                <a:spcPts val="0"/>
+              </a:spcBef>
+              <a:spcAft>
+                <a:spcPts val="0"/>
+              </a:spcAft>
+              <a:buClrTx/>
+              <a:buSzTx/>
+              <a:buFontTx/>
+              <a:buNone/>
+              <a:tabLst/>
+              <a:defRPr kumimoji="0" sz="5000" b="0" i="0" u="none" strike="noStrike" cap="none" spc="0" normalizeH="0" baseline="0">
+                <a:ln>
+                  <a:noFill/>
+                </a:ln>
+                <a:solidFill>
+                  <a:srgbClr val="000000"/>
+                </a:solidFill>
+                <a:effectLst/>
+                <a:uFillTx/>
+                <a:latin typeface="+mj-lt"/>
+                <a:ea typeface="+mj-ea"/>
+                <a:cs typeface="+mj-cs"/>
+                <a:sym typeface="Helvetica Light"/>
+              </a:defRPr>
+            </a:lvl4pPr>
+            <a:lvl5pPr marL="0" marR="0" indent="914400" algn="ctr" defTabSz="821531" rtl="0" fontAlgn="auto" latinLnBrk="0" hangingPunct="0">
+              <a:lnSpc>
+                <a:spcPct val="100000"/>
+              </a:lnSpc>
+              <a:spcBef>
+                <a:spcPts val="0"/>
+              </a:spcBef>
+              <a:spcAft>
+                <a:spcPts val="0"/>
+              </a:spcAft>
+              <a:buClrTx/>
+              <a:buSzTx/>
+              <a:buFontTx/>
+              <a:buNone/>
+              <a:tabLst/>
+              <a:defRPr kumimoji="0" sz="5000" b="0" i="0" u="none" strike="noStrike" cap="none" spc="0" normalizeH="0" baseline="0">
+                <a:ln>
+                  <a:noFill/>
+                </a:ln>
+                <a:solidFill>
+                  <a:srgbClr val="000000"/>
+                </a:solidFill>
+                <a:effectLst/>
+                <a:uFillTx/>
+                <a:latin typeface="+mj-lt"/>
+                <a:ea typeface="+mj-ea"/>
+                <a:cs typeface="+mj-cs"/>
+                <a:sym typeface="Helvetica Light"/>
+              </a:defRPr>
+            </a:lvl5pPr>
+            <a:lvl6pPr marL="0" marR="0" indent="1143000" algn="ctr" defTabSz="821531" rtl="0" fontAlgn="auto" latinLnBrk="0" hangingPunct="0">
+              <a:lnSpc>
+                <a:spcPct val="100000"/>
+              </a:lnSpc>
+              <a:spcBef>
+                <a:spcPts val="0"/>
+              </a:spcBef>
+              <a:spcAft>
+                <a:spcPts val="0"/>
+              </a:spcAft>
+              <a:buClrTx/>
+              <a:buSzTx/>
+              <a:buFontTx/>
+              <a:buNone/>
+              <a:tabLst/>
+              <a:defRPr kumimoji="0" sz="5000" b="0" i="0" u="none" strike="noStrike" cap="none" spc="0" normalizeH="0" baseline="0">
+                <a:ln>
+                  <a:noFill/>
+                </a:ln>
+                <a:solidFill>
+                  <a:srgbClr val="000000"/>
+                </a:solidFill>
+                <a:effectLst/>
+                <a:uFillTx/>
+                <a:latin typeface="+mj-lt"/>
+                <a:ea typeface="+mj-ea"/>
+                <a:cs typeface="+mj-cs"/>
+                <a:sym typeface="Helvetica Light"/>
+              </a:defRPr>
+            </a:lvl6pPr>
+            <a:lvl7pPr marL="0" marR="0" indent="1371600" algn="ctr" defTabSz="821531" rtl="0" fontAlgn="auto" latinLnBrk="0" hangingPunct="0">
+              <a:lnSpc>
+                <a:spcPct val="100000"/>
+              </a:lnSpc>
+              <a:spcBef>
+                <a:spcPts val="0"/>
+              </a:spcBef>
+              <a:spcAft>
+                <a:spcPts val="0"/>
+              </a:spcAft>
+              <a:buClrTx/>
+              <a:buSzTx/>
+              <a:buFontTx/>
+              <a:buNone/>
+              <a:tabLst/>
+              <a:defRPr kumimoji="0" sz="5000" b="0" i="0" u="none" strike="noStrike" cap="none" spc="0" normalizeH="0" baseline="0">
+                <a:ln>
+                  <a:noFill/>
+                </a:ln>
+                <a:solidFill>
+                  <a:srgbClr val="000000"/>
+                </a:solidFill>
+                <a:effectLst/>
+                <a:uFillTx/>
+                <a:latin typeface="+mj-lt"/>
+                <a:ea typeface="+mj-ea"/>
+                <a:cs typeface="+mj-cs"/>
+                <a:sym typeface="Helvetica Light"/>
+              </a:defRPr>
+            </a:lvl7pPr>
+            <a:lvl8pPr marL="0" marR="0" indent="1600200" algn="ctr" defTabSz="821531" rtl="0" fontAlgn="auto" latinLnBrk="0" hangingPunct="0">
+              <a:lnSpc>
+                <a:spcPct val="100000"/>
+              </a:lnSpc>
+              <a:spcBef>
+                <a:spcPts val="0"/>
+              </a:spcBef>
+              <a:spcAft>
+                <a:spcPts val="0"/>
+              </a:spcAft>
+              <a:buClrTx/>
+              <a:buSzTx/>
+              <a:buFontTx/>
+              <a:buNone/>
+              <a:tabLst/>
+              <a:defRPr kumimoji="0" sz="5000" b="0" i="0" u="none" strike="noStrike" cap="none" spc="0" normalizeH="0" baseline="0">
+                <a:ln>
+                  <a:noFill/>
+                </a:ln>
+                <a:solidFill>
+                  <a:srgbClr val="000000"/>
+                </a:solidFill>
+                <a:effectLst/>
+                <a:uFillTx/>
+                <a:latin typeface="+mj-lt"/>
+                <a:ea typeface="+mj-ea"/>
+                <a:cs typeface="+mj-cs"/>
+                <a:sym typeface="Helvetica Light"/>
+              </a:defRPr>
+            </a:lvl8pPr>
+            <a:lvl9pPr marL="0" marR="0" indent="1828800" algn="ctr" defTabSz="821531" rtl="0" fontAlgn="auto" latinLnBrk="0" hangingPunct="0">
+              <a:lnSpc>
+                <a:spcPct val="100000"/>
+              </a:lnSpc>
+              <a:spcBef>
+                <a:spcPts val="0"/>
+              </a:spcBef>
+              <a:spcAft>
+                <a:spcPts val="0"/>
+              </a:spcAft>
+              <a:buClrTx/>
+              <a:buSzTx/>
+              <a:buFontTx/>
+              <a:buNone/>
+              <a:tabLst/>
+              <a:defRPr kumimoji="0" sz="5000" b="0" i="0" u="none" strike="noStrike" cap="none" spc="0" normalizeH="0" baseline="0">
+                <a:ln>
+                  <a:noFill/>
+                </a:ln>
+                <a:solidFill>
+                  <a:srgbClr val="000000"/>
+                </a:solidFill>
+                <a:effectLst/>
+                <a:uFillTx/>
+                <a:latin typeface="+mj-lt"/>
+                <a:ea typeface="+mj-ea"/>
+                <a:cs typeface="+mj-cs"/>
+                <a:sym typeface="Helvetica Light"/>
+              </a:defRPr>
+            </a:lvl9pPr>
+          </a:lstStyle>
+          <a:p>
+            <a:fld id="{86CB4B4D-7CA3-9044-876B-883B54F8677D}" type="slidenum">
+              <a:rPr lang="ru-RU" sz="3200" smtClean="0">
+                <a:solidFill>
+                  <a:srgbClr val="253957"/>
+                </a:solidFill>
+                <a:latin typeface="+mn-lt"/>
+              </a:rPr>
+              <a:pPr/>
+              <a:t>17</a:t>
+            </a:fld>
+            <a:endParaRPr lang="ru-RU" sz="3200" dirty="0">
+              <a:solidFill>
+                <a:srgbClr val="253957"/>
+              </a:solidFill>
+              <a:latin typeface="+mn-lt"/>
+            </a:endParaRPr>
+          </a:p>
+        </p:txBody>
+      </p:sp>
+      <p:pic>
+        <p:nvPicPr>
+          <p:cNvPr id="10" name="Рисунок 9">
+            <a:extLst>
+              <a:ext uri="{FF2B5EF4-FFF2-40B4-BE49-F238E27FC236}">
+                <a16:creationId xmlns:a16="http://schemas.microsoft.com/office/drawing/2014/main" id="{782944E5-2FDD-4BDC-99EB-52B49ADB086A}"/>
+              </a:ext>
+            </a:extLst>
+          </p:cNvPr>
+          <p:cNvPicPr>
+            <a:picLocks noChangeAspect="1"/>
+          </p:cNvPicPr>
+          <p:nvPr/>
+        </p:nvPicPr>
+        <p:blipFill>
+          <a:blip r:embed="rId3">
+            <a:extLst>
+              <a:ext uri="{28A0092B-C50C-407E-A947-70E740481C1C}">
+                <a14:useLocalDpi xmlns:a14="http://schemas.microsoft.com/office/drawing/2010/main" val="0"/>
+              </a:ext>
+            </a:extLst>
+          </a:blip>
+          <a:stretch>
+            <a:fillRect/>
+          </a:stretch>
+        </p:blipFill>
+        <p:spPr>
+          <a:xfrm>
+            <a:off x="5595747" y="4201833"/>
+            <a:ext cx="13192506" cy="8795004"/>
+          </a:xfrm>
+          <a:prstGeom prst="rect">
+            <a:avLst/>
+          </a:prstGeom>
+        </p:spPr>
+      </p:pic>
+    </p:spTree>
+    <p:extLst>
+      <p:ext uri="{BB962C8B-B14F-4D97-AF65-F5344CB8AC3E}">
+        <p14:creationId xmlns:p14="http://schemas.microsoft.com/office/powerpoint/2010/main" val="1087308844"/>
+      </p:ext>
+    </p:extLst>
+  </p:cSld>
+  <p:clrMapOvr>
+    <a:masterClrMapping/>
+  </p:clrMapOvr>
+  <p:transition spd="med"/>
+</p:sld>
+</file>
+
+<file path=ppt/slides/slide18.xml><?xml version="1.0" encoding="utf-8"?>
 <p:sld xmlns:a="http://schemas.openxmlformats.org/drawingml/2006/main" xmlns:r="http://schemas.openxmlformats.org/officeDocument/2006/relationships" xmlns:p="http://schemas.openxmlformats.org/presentationml/2006/main">
   <p:cSld>
     <p:spTree>
@@ -8525,7 +9154,7 @@
                 </a:solidFill>
                 <a:latin typeface="+mn-lt"/>
               </a:rPr>
-              <a:t>17</a:t>
+              <a:t>18</a:t>
             </a:fld>
             <a:endParaRPr lang="ru-RU" sz="3200" dirty="0">
               <a:solidFill>
@@ -11010,7 +11639,7 @@
 </p:sld>
 </file>
 
-<file path=ppt/slides/slide18.xml><?xml version="1.0" encoding="utf-8"?>
+<file path=ppt/slides/slide19.xml><?xml version="1.0" encoding="utf-8"?>
 <p:sld xmlns:a="http://schemas.openxmlformats.org/drawingml/2006/main" xmlns:r="http://schemas.openxmlformats.org/officeDocument/2006/relationships" xmlns:p="http://schemas.openxmlformats.org/presentationml/2006/main">
   <p:cSld>
     <p:spTree>
@@ -11218,7 +11847,7 @@
                 </a:solidFill>
                 <a:latin typeface="+mn-lt"/>
               </a:rPr>
-              <a:t>18</a:t>
+              <a:t>19</a:t>
             </a:fld>
             <a:endParaRPr lang="ru-RU" sz="3200" dirty="0">
               <a:solidFill>
@@ -11231,10 +11860,10 @@
       </p:sp>
       <p:pic>
         <p:nvPicPr>
-          <p:cNvPr id="8" name="Рисунок 7">
+          <p:cNvPr id="17" name="Рисунок 16">
             <a:extLst>
               <a:ext uri="{FF2B5EF4-FFF2-40B4-BE49-F238E27FC236}">
-                <a16:creationId xmlns:a16="http://schemas.microsoft.com/office/drawing/2014/main" id="{DFF44F24-7EAA-4102-8DEE-D548B7787974}"/>
+                <a16:creationId xmlns:a16="http://schemas.microsoft.com/office/drawing/2014/main" id="{06992902-01A2-426F-A20A-B1D929D99311}"/>
               </a:ext>
             </a:extLst>
           </p:cNvPr>
@@ -11261,10 +11890,10 @@
       </p:pic>
       <p:pic>
         <p:nvPicPr>
-          <p:cNvPr id="11" name="Рисунок 10">
+          <p:cNvPr id="18" name="Рисунок 17">
             <a:extLst>
               <a:ext uri="{FF2B5EF4-FFF2-40B4-BE49-F238E27FC236}">
-                <a16:creationId xmlns:a16="http://schemas.microsoft.com/office/drawing/2014/main" id="{C20B7426-0E58-439D-BE50-6383193CB73F}"/>
+                <a16:creationId xmlns:a16="http://schemas.microsoft.com/office/drawing/2014/main" id="{9FC4014A-F942-43BB-9C64-890DEACA86B8}"/>
               </a:ext>
             </a:extLst>
           </p:cNvPr>
@@ -11291,10 +11920,10 @@
       </p:pic>
       <p:pic>
         <p:nvPicPr>
-          <p:cNvPr id="12" name="Рисунок 11">
+          <p:cNvPr id="19" name="Рисунок 18">
             <a:extLst>
               <a:ext uri="{FF2B5EF4-FFF2-40B4-BE49-F238E27FC236}">
-                <a16:creationId xmlns:a16="http://schemas.microsoft.com/office/drawing/2014/main" id="{AB6C855A-CDD2-4A57-B6C5-82A1BF5EE844}"/>
+                <a16:creationId xmlns:a16="http://schemas.microsoft.com/office/drawing/2014/main" id="{DA9CD35A-9837-4404-B0EE-7F746D6B272F}"/>
               </a:ext>
             </a:extLst>
           </p:cNvPr>
@@ -11327,10 +11956,10 @@
       </p:pic>
       <p:pic>
         <p:nvPicPr>
-          <p:cNvPr id="13" name="Рисунок 12">
+          <p:cNvPr id="20" name="Рисунок 19">
             <a:extLst>
               <a:ext uri="{FF2B5EF4-FFF2-40B4-BE49-F238E27FC236}">
-                <a16:creationId xmlns:a16="http://schemas.microsoft.com/office/drawing/2014/main" id="{F1B439F0-8EEC-4F9A-9CFA-66715C216FF7}"/>
+                <a16:creationId xmlns:a16="http://schemas.microsoft.com/office/drawing/2014/main" id="{EC0D0D34-2E1B-48D9-ADB4-2FD63D2F114C}"/>
               </a:ext>
             </a:extLst>
           </p:cNvPr>
@@ -11363,10 +11992,10 @@
       </p:pic>
       <p:pic>
         <p:nvPicPr>
-          <p:cNvPr id="14" name="Рисунок 13">
+          <p:cNvPr id="21" name="Рисунок 20">
             <a:extLst>
               <a:ext uri="{FF2B5EF4-FFF2-40B4-BE49-F238E27FC236}">
-                <a16:creationId xmlns:a16="http://schemas.microsoft.com/office/drawing/2014/main" id="{ACA592D4-7A0D-4101-A7F1-AB5A8F69E071}"/>
+                <a16:creationId xmlns:a16="http://schemas.microsoft.com/office/drawing/2014/main" id="{0BA1F728-4458-4FA3-9C30-600B30E263DE}"/>
               </a:ext>
             </a:extLst>
           </p:cNvPr>
@@ -11399,10 +12028,10 @@
       </p:pic>
       <p:pic>
         <p:nvPicPr>
-          <p:cNvPr id="15" name="Рисунок 14">
+          <p:cNvPr id="22" name="Рисунок 21">
             <a:extLst>
               <a:ext uri="{FF2B5EF4-FFF2-40B4-BE49-F238E27FC236}">
-                <a16:creationId xmlns:a16="http://schemas.microsoft.com/office/drawing/2014/main" id="{81BDA108-1BFA-4C4E-90F4-C3BC3DB4FF4F}"/>
+                <a16:creationId xmlns:a16="http://schemas.microsoft.com/office/drawing/2014/main" id="{466BC68C-D3DC-4B84-B96C-39A45D53489E}"/>
               </a:ext>
             </a:extLst>
           </p:cNvPr>
@@ -11435,10 +12064,10 @@
       </p:pic>
       <p:pic>
         <p:nvPicPr>
-          <p:cNvPr id="16" name="Рисунок 15">
+          <p:cNvPr id="23" name="Рисунок 22">
             <a:extLst>
               <a:ext uri="{FF2B5EF4-FFF2-40B4-BE49-F238E27FC236}">
-                <a16:creationId xmlns:a16="http://schemas.microsoft.com/office/drawing/2014/main" id="{76611FF1-D112-4064-A882-A21CD733E0AB}"/>
+                <a16:creationId xmlns:a16="http://schemas.microsoft.com/office/drawing/2014/main" id="{3B5C4B27-6AC3-495E-8747-5633528B8173}"/>
               </a:ext>
             </a:extLst>
           </p:cNvPr>
@@ -11461,7 +12090,7 @@
         </p:blipFill>
         <p:spPr>
           <a:xfrm>
-            <a:off x="7541696" y="10888184"/>
+            <a:off x="10297215" y="10816948"/>
             <a:ext cx="3314072" cy="1445344"/>
           </a:xfrm>
           <a:prstGeom prst="rect">
@@ -11469,476 +12098,57 @@
           </a:prstGeom>
         </p:spPr>
       </p:pic>
+      <p:pic>
+        <p:nvPicPr>
+          <p:cNvPr id="24" name="Picture 2" descr="https://daveismyname.blog/assets/images/blog/tutorials/python/Python_logo.png">
+            <a:extLst>
+              <a:ext uri="{FF2B5EF4-FFF2-40B4-BE49-F238E27FC236}">
+                <a16:creationId xmlns:a16="http://schemas.microsoft.com/office/drawing/2014/main" id="{19A24D4E-77CD-463D-902B-9C42D615FCFB}"/>
+              </a:ext>
+            </a:extLst>
+          </p:cNvPr>
+          <p:cNvPicPr>
+            <a:picLocks noChangeAspect="1" noChangeArrowheads="1"/>
+          </p:cNvPicPr>
+          <p:nvPr/>
+        </p:nvPicPr>
+        <p:blipFill>
+          <a:blip r:embed="rId10" cstate="print">
+            <a:extLst>
+              <a:ext uri="{28A0092B-C50C-407E-A947-70E740481C1C}">
+                <a14:useLocalDpi xmlns:a14="http://schemas.microsoft.com/office/drawing/2010/main" val="0"/>
+              </a:ext>
+            </a:extLst>
+          </a:blip>
+          <a:srcRect/>
+          <a:stretch>
+            <a:fillRect/>
+          </a:stretch>
+        </p:blipFill>
+        <p:spPr bwMode="auto">
+          <a:xfrm>
+            <a:off x="3067528" y="10583886"/>
+            <a:ext cx="6336829" cy="2682256"/>
+          </a:xfrm>
+          <a:prstGeom prst="rect">
+            <a:avLst/>
+          </a:prstGeom>
+          <a:noFill/>
+          <a:extLst>
+            <a:ext uri="{909E8E84-426E-40DD-AFC4-6F175D3DCCD1}">
+              <a14:hiddenFill xmlns:a14="http://schemas.microsoft.com/office/drawing/2010/main">
+                <a:solidFill>
+                  <a:srgbClr val="FFFFFF"/>
+                </a:solidFill>
+              </a14:hiddenFill>
+            </a:ext>
+          </a:extLst>
+        </p:spPr>
+      </p:pic>
     </p:spTree>
     <p:extLst>
       <p:ext uri="{BB962C8B-B14F-4D97-AF65-F5344CB8AC3E}">
         <p14:creationId xmlns:p14="http://schemas.microsoft.com/office/powerpoint/2010/main" val="382875094"/>
-      </p:ext>
-    </p:extLst>
-  </p:cSld>
-  <p:clrMapOvr>
-    <a:masterClrMapping/>
-  </p:clrMapOvr>
-  <p:transition spd="med"/>
-</p:sld>
-</file>
-
-<file path=ppt/slides/slide19.xml><?xml version="1.0" encoding="utf-8"?>
-<p:sld xmlns:a="http://schemas.openxmlformats.org/drawingml/2006/main" xmlns:r="http://schemas.openxmlformats.org/officeDocument/2006/relationships" xmlns:p="http://schemas.openxmlformats.org/presentationml/2006/main">
-  <p:cSld>
-    <p:spTree>
-      <p:nvGrpSpPr>
-        <p:cNvPr id="1" name=""/>
-        <p:cNvGrpSpPr/>
-        <p:nvPr/>
-      </p:nvGrpSpPr>
-      <p:grpSpPr>
-        <a:xfrm>
-          <a:off x="0" y="0"/>
-          <a:ext cx="0" cy="0"/>
-          <a:chOff x="0" y="0"/>
-          <a:chExt cx="0" cy="0"/>
-        </a:xfrm>
-      </p:grpSpPr>
-      <p:sp>
-        <p:nvSpPr>
-          <p:cNvPr id="58" name="Линия"/>
-          <p:cNvSpPr/>
-          <p:nvPr/>
-        </p:nvSpPr>
-        <p:spPr>
-          <a:xfrm>
-            <a:off x="1201065" y="2214562"/>
-            <a:ext cx="21506373" cy="1"/>
-          </a:xfrm>
-          <a:prstGeom prst="line">
-            <a:avLst/>
-          </a:prstGeom>
-          <a:ln w="12700">
-            <a:solidFill>
-              <a:srgbClr val="253957"/>
-            </a:solidFill>
-            <a:miter lim="400000"/>
-          </a:ln>
-        </p:spPr>
-        <p:txBody>
-          <a:bodyPr lIns="71437" tIns="71437" rIns="71437" bIns="71437" anchor="ctr"/>
-          <a:lstStyle/>
-          <a:p>
-            <a:pPr>
-              <a:defRPr sz="3200"/>
-            </a:pPr>
-            <a:endParaRPr/>
-          </a:p>
-        </p:txBody>
-      </p:sp>
-      <p:sp>
-        <p:nvSpPr>
-          <p:cNvPr id="59" name="Очень крутой заголовок…"/>
-          <p:cNvSpPr txBox="1"/>
-          <p:nvPr/>
-        </p:nvSpPr>
-        <p:spPr>
-          <a:xfrm>
-            <a:off x="1209449" y="2972786"/>
-            <a:ext cx="16073440" cy="2313227"/>
-          </a:xfrm>
-          <a:prstGeom prst="rect">
-            <a:avLst/>
-          </a:prstGeom>
-          <a:ln w="12700">
-            <a:miter lim="400000"/>
-          </a:ln>
-          <a:extLst>
-            <a:ext uri="{C572A759-6A51-4108-AA02-DFA0A04FC94B}">
-              <ma14:wrappingTextBoxFlag xmlns="" xmlns:m="http://schemas.openxmlformats.org/officeDocument/2006/math" xmlns:a14="http://schemas.microsoft.com/office/drawing/2010/main" xmlns:ma14="http://schemas.microsoft.com/office/mac/drawingml/2011/main" val="1"/>
-            </a:ext>
-          </a:extLst>
-        </p:spPr>
-        <p:txBody>
-          <a:bodyPr lIns="71437" tIns="71437" rIns="71437" bIns="71437"/>
-          <a:lstStyle/>
-          <a:p>
-            <a:pPr algn="l">
-              <a:defRPr sz="5000" b="1" cap="all">
-                <a:solidFill>
-                  <a:srgbClr val="253957"/>
-                </a:solidFill>
-                <a:latin typeface="+mn-lt"/>
-                <a:ea typeface="+mn-ea"/>
-                <a:cs typeface="+mn-cs"/>
-                <a:sym typeface="Arial Narrow"/>
-              </a:defRPr>
-            </a:pPr>
-            <a:r>
-              <a:rPr lang="en-US" sz="7000" b="1" dirty="0">
-                <a:latin typeface="Arial Narrow" charset="0"/>
-                <a:ea typeface="Arial Narrow" charset="0"/>
-                <a:cs typeface="Arial Narrow" charset="0"/>
-              </a:rPr>
-              <a:t>Implementation</a:t>
-            </a:r>
-          </a:p>
-        </p:txBody>
-      </p:sp>
-      <p:sp>
-        <p:nvSpPr>
-          <p:cNvPr id="60" name="Text Text Text Text Text Text Text Text Text Text Text Text Text Text Text Text Text Text Text Text Text Text Text Text Text Text Text Text Text Text Text Text Text Text Text Text Text Text Text Text Text Text Text Text Text Text Text Text Text Text Text Text Text Text Text Text Text Text Text Text Text Text Text Text Text Text Text Text Text Text Text Text Text Text Text Text Text Text Text Text Text Text Text Text Text Text Text Text Text Text Text Text Text Text Text Text Text Text Text Text Text Text Text Text Text Text Text Text…"/>
-          <p:cNvSpPr txBox="1"/>
-          <p:nvPr/>
-        </p:nvSpPr>
-        <p:spPr>
-          <a:xfrm>
-            <a:off x="786808" y="4129399"/>
-            <a:ext cx="23597191" cy="6566710"/>
-          </a:xfrm>
-          <a:prstGeom prst="rect">
-            <a:avLst/>
-          </a:prstGeom>
-          <a:ln w="12700">
-            <a:miter lim="400000"/>
-          </a:ln>
-          <a:extLst>
-            <a:ext uri="{C572A759-6A51-4108-AA02-DFA0A04FC94B}">
-              <ma14:wrappingTextBoxFlag xmlns="" xmlns:m="http://schemas.openxmlformats.org/officeDocument/2006/math" xmlns:a14="http://schemas.microsoft.com/office/drawing/2010/main" xmlns:ma14="http://schemas.microsoft.com/office/mac/drawingml/2011/main" val="1"/>
-            </a:ext>
-          </a:extLst>
-        </p:spPr>
-        <p:txBody>
-          <a:bodyPr lIns="71437" tIns="71437" rIns="71437" bIns="71437"/>
-          <a:lstStyle/>
-          <a:p>
-            <a:pPr marL="457200" indent="-457200" algn="l">
-              <a:buFont typeface="Arial" panose="020B0604020202020204" pitchFamily="34" charset="0"/>
-              <a:buChar char="•"/>
-              <a:defRPr sz="2800">
-                <a:solidFill>
-                  <a:srgbClr val="253957"/>
-                </a:solidFill>
-                <a:latin typeface="+mn-lt"/>
-                <a:ea typeface="+mn-ea"/>
-                <a:cs typeface="+mn-cs"/>
-                <a:sym typeface="Arial Narrow"/>
-              </a:defRPr>
-            </a:pPr>
-            <a:r>
-              <a:rPr lang="en-US" sz="6600" dirty="0"/>
-              <a:t>The C API for the B-tree modifications library is implemented as dynamically shared library using the </a:t>
-            </a:r>
-            <a:r>
-              <a:rPr lang="ru-RU" sz="6600" i="1" dirty="0" err="1">
-                <a:solidFill>
-                  <a:srgbClr val="253957"/>
-                </a:solidFill>
-                <a:sym typeface="Arial Narrow"/>
-              </a:rPr>
-              <a:t>extern</a:t>
-            </a:r>
-            <a:r>
-              <a:rPr lang="ru-RU" sz="6600" i="1" dirty="0">
-                <a:solidFill>
-                  <a:srgbClr val="253957"/>
-                </a:solidFill>
-                <a:sym typeface="Arial Narrow"/>
-              </a:rPr>
-              <a:t> “C” { … }</a:t>
-            </a:r>
-            <a:r>
-              <a:rPr lang="en-US" sz="6600" dirty="0">
-                <a:solidFill>
-                  <a:srgbClr val="253957"/>
-                </a:solidFill>
-                <a:sym typeface="Arial Narrow"/>
-              </a:rPr>
-              <a:t> C++ statement</a:t>
-            </a:r>
-          </a:p>
-          <a:p>
-            <a:pPr marL="457200" indent="-457200" algn="l">
-              <a:buFont typeface="Arial" panose="020B0604020202020204" pitchFamily="34" charset="0"/>
-              <a:buChar char="•"/>
-              <a:defRPr sz="2800">
-                <a:solidFill>
-                  <a:srgbClr val="253957"/>
-                </a:solidFill>
-                <a:latin typeface="+mn-lt"/>
-                <a:ea typeface="+mn-ea"/>
-                <a:cs typeface="+mn-cs"/>
-                <a:sym typeface="Arial Narrow"/>
-              </a:defRPr>
-            </a:pPr>
-            <a:r>
-              <a:rPr lang="en-US" sz="6600" dirty="0">
-                <a:solidFill>
-                  <a:srgbClr val="253957"/>
-                </a:solidFill>
-                <a:sym typeface="Arial Narrow"/>
-              </a:rPr>
-              <a:t>The SQLite extension registers the </a:t>
-            </a:r>
-            <a:r>
-              <a:rPr lang="en-US" sz="6600" i="1" dirty="0" err="1">
-                <a:solidFill>
-                  <a:srgbClr val="253957"/>
-                </a:solidFill>
-                <a:sym typeface="Arial Narrow"/>
-              </a:rPr>
-              <a:t>btrees_mods</a:t>
-            </a:r>
-            <a:r>
-              <a:rPr lang="en-US" sz="6600" dirty="0">
-                <a:solidFill>
-                  <a:srgbClr val="253957"/>
-                </a:solidFill>
-                <a:sym typeface="Arial Narrow"/>
-              </a:rPr>
-              <a:t> module for creating the virtual tables</a:t>
-            </a:r>
-          </a:p>
-          <a:p>
-            <a:pPr marL="457200" indent="-457200" algn="l">
-              <a:buFont typeface="Arial" panose="020B0604020202020204" pitchFamily="34" charset="0"/>
-              <a:buChar char="•"/>
-              <a:defRPr sz="2800">
-                <a:solidFill>
-                  <a:srgbClr val="253957"/>
-                </a:solidFill>
-                <a:latin typeface="+mn-lt"/>
-                <a:ea typeface="+mn-ea"/>
-                <a:cs typeface="+mn-cs"/>
-                <a:sym typeface="Arial Narrow"/>
-              </a:defRPr>
-            </a:pPr>
-            <a:r>
-              <a:rPr lang="en-US" sz="6600" dirty="0">
-                <a:solidFill>
-                  <a:srgbClr val="253957"/>
-                </a:solidFill>
-                <a:sym typeface="Arial Narrow"/>
-              </a:rPr>
-              <a:t>Virtual table is any table created using such a module</a:t>
-            </a:r>
-          </a:p>
-          <a:p>
-            <a:pPr marL="457200" indent="-457200" algn="l">
-              <a:buFont typeface="Arial" panose="020B0604020202020204" pitchFamily="34" charset="0"/>
-              <a:buChar char="•"/>
-              <a:defRPr sz="2800">
-                <a:solidFill>
-                  <a:srgbClr val="253957"/>
-                </a:solidFill>
-                <a:latin typeface="+mn-lt"/>
-                <a:ea typeface="+mn-ea"/>
-                <a:cs typeface="+mn-cs"/>
-                <a:sym typeface="Arial Narrow"/>
-              </a:defRPr>
-            </a:pPr>
-            <a:r>
-              <a:rPr lang="en-US" sz="6600" dirty="0">
-                <a:solidFill>
-                  <a:srgbClr val="253957"/>
-                </a:solidFill>
-                <a:sym typeface="Arial Narrow"/>
-              </a:rPr>
-              <a:t>The extension also registers the </a:t>
-            </a:r>
-            <a:r>
-              <a:rPr lang="en-US" sz="6600" i="1" dirty="0" err="1">
-                <a:solidFill>
-                  <a:srgbClr val="253957"/>
-                </a:solidFill>
-                <a:sym typeface="Arial Narrow"/>
-              </a:rPr>
-              <a:t>btreesModsVisualize</a:t>
-            </a:r>
-            <a:r>
-              <a:rPr lang="en-US" sz="6600" i="1" dirty="0">
-                <a:solidFill>
-                  <a:srgbClr val="253957"/>
-                </a:solidFill>
-                <a:sym typeface="Arial Narrow"/>
-              </a:rPr>
-              <a:t>, </a:t>
-            </a:r>
-            <a:r>
-              <a:rPr lang="en-US" sz="6600" i="1" dirty="0" err="1">
-                <a:solidFill>
-                  <a:srgbClr val="253957"/>
-                </a:solidFill>
-                <a:sym typeface="Arial Narrow"/>
-              </a:rPr>
-              <a:t>btreesModsGetTreeOrder</a:t>
-            </a:r>
-            <a:r>
-              <a:rPr lang="en-US" sz="6600" i="1" dirty="0">
-                <a:solidFill>
-                  <a:srgbClr val="253957"/>
-                </a:solidFill>
-                <a:sym typeface="Arial Narrow"/>
-              </a:rPr>
-              <a:t>, </a:t>
-            </a:r>
-            <a:r>
-              <a:rPr lang="en-US" sz="6600" i="1" dirty="0" err="1">
-                <a:solidFill>
-                  <a:srgbClr val="253957"/>
-                </a:solidFill>
-                <a:sym typeface="Arial Narrow"/>
-              </a:rPr>
-              <a:t>btreesModsGetTreeType</a:t>
-            </a:r>
-            <a:r>
-              <a:rPr lang="en-US" sz="6600" i="1" dirty="0">
-                <a:solidFill>
-                  <a:srgbClr val="253957"/>
-                </a:solidFill>
-                <a:sym typeface="Arial Narrow"/>
-              </a:rPr>
-              <a:t> </a:t>
-            </a:r>
-            <a:r>
-              <a:rPr lang="en-US" sz="6600" dirty="0">
-                <a:solidFill>
-                  <a:srgbClr val="253957"/>
-                </a:solidFill>
-                <a:sym typeface="Arial Narrow"/>
-              </a:rPr>
-              <a:t>functions</a:t>
-            </a:r>
-            <a:endParaRPr lang="ru-RU" sz="6600" dirty="0">
-              <a:solidFill>
-                <a:srgbClr val="253957"/>
-              </a:solidFill>
-              <a:sym typeface="Arial Narrow"/>
-            </a:endParaRPr>
-          </a:p>
-        </p:txBody>
-      </p:sp>
-      <p:sp>
-        <p:nvSpPr>
-          <p:cNvPr id="62" name="Название подразделения, лаборатории, факультета и т.д."/>
-          <p:cNvSpPr txBox="1"/>
-          <p:nvPr/>
-        </p:nvSpPr>
-        <p:spPr>
-          <a:xfrm>
-            <a:off x="11338744" y="942364"/>
-            <a:ext cx="11366416" cy="513601"/>
-          </a:xfrm>
-          <a:prstGeom prst="rect">
-            <a:avLst/>
-          </a:prstGeom>
-          <a:ln w="12700">
-            <a:miter lim="400000"/>
-          </a:ln>
-          <a:extLst>
-            <a:ext uri="{C572A759-6A51-4108-AA02-DFA0A04FC94B}">
-              <ma14:wrappingTextBoxFlag xmlns="" xmlns:m="http://schemas.openxmlformats.org/officeDocument/2006/math" xmlns:a14="http://schemas.microsoft.com/office/drawing/2010/main" xmlns:ma14="http://schemas.microsoft.com/office/mac/drawingml/2011/main" val="1"/>
-            </a:ext>
-          </a:extLst>
-        </p:spPr>
-        <p:txBody>
-          <a:bodyPr lIns="71437" tIns="71437" rIns="71437" bIns="71437" anchor="ctr">
-            <a:spAutoFit/>
-          </a:bodyPr>
-          <a:lstStyle>
-            <a:lvl1pPr algn="r">
-              <a:defRPr sz="2400">
-                <a:solidFill>
-                  <a:srgbClr val="253957"/>
-                </a:solidFill>
-                <a:latin typeface="+mn-lt"/>
-                <a:ea typeface="+mn-ea"/>
-                <a:cs typeface="+mn-cs"/>
-                <a:sym typeface="Arial Narrow"/>
-              </a:defRPr>
-            </a:lvl1pPr>
-          </a:lstStyle>
-          <a:p>
-            <a:r>
-              <a:rPr lang="en-US" dirty="0"/>
-              <a:t>Faculty of Computer Science</a:t>
-            </a:r>
-          </a:p>
-        </p:txBody>
-      </p:sp>
-      <p:pic>
-        <p:nvPicPr>
-          <p:cNvPr id="9" name="Изображение" descr="Изображение"/>
-          <p:cNvPicPr>
-            <a:picLocks noChangeAspect="1"/>
-          </p:cNvPicPr>
-          <p:nvPr/>
-        </p:nvPicPr>
-        <p:blipFill>
-          <a:blip r:embed="rId2">
-            <a:extLst/>
-          </a:blip>
-          <a:stretch>
-            <a:fillRect/>
-          </a:stretch>
-        </p:blipFill>
-        <p:spPr>
-          <a:xfrm>
-            <a:off x="1211199" y="620465"/>
-            <a:ext cx="1214985" cy="1214985"/>
-          </a:xfrm>
-          <a:prstGeom prst="rect">
-            <a:avLst/>
-          </a:prstGeom>
-          <a:ln w="12700">
-            <a:miter lim="400000"/>
-          </a:ln>
-        </p:spPr>
-      </p:pic>
-      <p:sp>
-        <p:nvSpPr>
-          <p:cNvPr id="10" name="Номер слайда 3">
-            <a:extLst>
-              <a:ext uri="{FF2B5EF4-FFF2-40B4-BE49-F238E27FC236}">
-                <a16:creationId xmlns:a16="http://schemas.microsoft.com/office/drawing/2014/main" id="{CFE22364-6DCC-47CB-A115-79FB3F398412}"/>
-              </a:ext>
-            </a:extLst>
-          </p:cNvPr>
-          <p:cNvSpPr>
-            <a:spLocks noGrp="1"/>
-          </p:cNvSpPr>
-          <p:nvPr>
-            <p:ph type="sldNum" sz="quarter" idx="2"/>
-          </p:nvPr>
-        </p:nvSpPr>
-        <p:spPr>
-          <a:xfrm>
-            <a:off x="22705161" y="13079288"/>
-            <a:ext cx="1678840" cy="636712"/>
-          </a:xfrm>
-        </p:spPr>
-        <p:txBody>
-          <a:bodyPr/>
-          <a:lstStyle/>
-          <a:p>
-            <a:fld id="{86CB4B4D-7CA3-9044-876B-883B54F8677D}" type="slidenum">
-              <a:rPr lang="ru-RU" sz="3200" smtClean="0">
-                <a:solidFill>
-                  <a:srgbClr val="253957"/>
-                </a:solidFill>
-                <a:latin typeface="+mn-lt"/>
-              </a:rPr>
-              <a:t>19</a:t>
-            </a:fld>
-            <a:endParaRPr lang="ru-RU" sz="3200" dirty="0">
-              <a:solidFill>
-                <a:srgbClr val="253957"/>
-              </a:solidFill>
-              <a:latin typeface="+mn-lt"/>
-            </a:endParaRPr>
-          </a:p>
-        </p:txBody>
-      </p:sp>
-    </p:spTree>
-    <p:extLst>
-      <p:ext uri="{BB962C8B-B14F-4D97-AF65-F5344CB8AC3E}">
-        <p14:creationId xmlns:p14="http://schemas.microsoft.com/office/powerpoint/2010/main" val="767116018"/>
       </p:ext>
     </p:extLst>
   </p:cSld>
@@ -12165,7 +12375,7 @@
             </a:pPr>
             <a:r>
               <a:rPr lang="en-US" sz="7200" dirty="0"/>
-              <a:t>Algorithm of the best index structure</a:t>
+              <a:t>Algorithm of selecting the index structure</a:t>
             </a:r>
           </a:p>
           <a:p>
@@ -12478,6 +12688,239 @@
       </p:sp>
       <p:sp>
         <p:nvSpPr>
+          <p:cNvPr id="60" name="Text Text Text Text Text Text Text Text Text Text Text Text Text Text Text Text Text Text Text Text Text Text Text Text Text Text Text Text Text Text Text Text Text Text Text Text Text Text Text Text Text Text Text Text Text Text Text Text Text Text Text Text Text Text Text Text Text Text Text Text Text Text Text Text Text Text Text Text Text Text Text Text Text Text Text Text Text Text Text Text Text Text Text Text Text Text Text Text Text Text Text Text Text Text Text Text Text Text Text Text Text Text Text Text Text Text Text Text…"/>
+          <p:cNvSpPr txBox="1"/>
+          <p:nvPr/>
+        </p:nvSpPr>
+        <p:spPr>
+          <a:xfrm>
+            <a:off x="786808" y="4129399"/>
+            <a:ext cx="23597191" cy="6566710"/>
+          </a:xfrm>
+          <a:prstGeom prst="rect">
+            <a:avLst/>
+          </a:prstGeom>
+          <a:ln w="12700">
+            <a:miter lim="400000"/>
+          </a:ln>
+          <a:extLst>
+            <a:ext uri="{C572A759-6A51-4108-AA02-DFA0A04FC94B}">
+              <ma14:wrappingTextBoxFlag xmlns="" xmlns:m="http://schemas.openxmlformats.org/officeDocument/2006/math" xmlns:a14="http://schemas.microsoft.com/office/drawing/2010/main" xmlns:ma14="http://schemas.microsoft.com/office/mac/drawingml/2011/main" val="1"/>
+            </a:ext>
+          </a:extLst>
+        </p:spPr>
+        <p:txBody>
+          <a:bodyPr lIns="71437" tIns="71437" rIns="71437" bIns="71437"/>
+          <a:lstStyle/>
+          <a:p>
+            <a:pPr marL="457200" indent="-457200" algn="l">
+              <a:buFont typeface="Arial" panose="020B0604020202020204" pitchFamily="34" charset="0"/>
+              <a:buChar char="•"/>
+              <a:defRPr sz="2800">
+                <a:solidFill>
+                  <a:srgbClr val="253957"/>
+                </a:solidFill>
+                <a:latin typeface="+mn-lt"/>
+                <a:ea typeface="+mn-ea"/>
+                <a:cs typeface="+mn-cs"/>
+                <a:sym typeface="Arial Narrow"/>
+              </a:defRPr>
+            </a:pPr>
+            <a:r>
+              <a:rPr lang="en-US" sz="6600" dirty="0"/>
+              <a:t>The C API for the B-tree modifications library is implemented as dynamically shared library using the </a:t>
+            </a:r>
+            <a:r>
+              <a:rPr lang="ru-RU" sz="6600" i="1" dirty="0" err="1">
+                <a:solidFill>
+                  <a:srgbClr val="253957"/>
+                </a:solidFill>
+                <a:sym typeface="Arial Narrow"/>
+              </a:rPr>
+              <a:t>extern</a:t>
+            </a:r>
+            <a:r>
+              <a:rPr lang="ru-RU" sz="6600" i="1" dirty="0">
+                <a:solidFill>
+                  <a:srgbClr val="253957"/>
+                </a:solidFill>
+                <a:sym typeface="Arial Narrow"/>
+              </a:rPr>
+              <a:t> “C” { … }</a:t>
+            </a:r>
+            <a:r>
+              <a:rPr lang="en-US" sz="6600" dirty="0">
+                <a:solidFill>
+                  <a:srgbClr val="253957"/>
+                </a:solidFill>
+                <a:sym typeface="Arial Narrow"/>
+              </a:rPr>
+              <a:t> C++ statement</a:t>
+            </a:r>
+          </a:p>
+          <a:p>
+            <a:pPr marL="457200" indent="-457200" algn="l">
+              <a:buFont typeface="Arial" panose="020B0604020202020204" pitchFamily="34" charset="0"/>
+              <a:buChar char="•"/>
+              <a:defRPr sz="2800">
+                <a:solidFill>
+                  <a:srgbClr val="253957"/>
+                </a:solidFill>
+                <a:latin typeface="+mn-lt"/>
+                <a:ea typeface="+mn-ea"/>
+                <a:cs typeface="+mn-cs"/>
+                <a:sym typeface="Arial Narrow"/>
+              </a:defRPr>
+            </a:pPr>
+            <a:r>
+              <a:rPr lang="en-US" sz="6600" dirty="0">
+                <a:solidFill>
+                  <a:srgbClr val="253957"/>
+                </a:solidFill>
+                <a:sym typeface="Arial Narrow"/>
+              </a:rPr>
+              <a:t>The SQLite extension registers the </a:t>
+            </a:r>
+            <a:r>
+              <a:rPr lang="en-US" sz="6600" i="1" dirty="0" err="1">
+                <a:solidFill>
+                  <a:srgbClr val="253957"/>
+                </a:solidFill>
+                <a:sym typeface="Arial Narrow"/>
+              </a:rPr>
+              <a:t>btrees_mods</a:t>
+            </a:r>
+            <a:r>
+              <a:rPr lang="en-US" sz="6600" dirty="0">
+                <a:solidFill>
+                  <a:srgbClr val="253957"/>
+                </a:solidFill>
+                <a:sym typeface="Arial Narrow"/>
+              </a:rPr>
+              <a:t> module for creating the virtual tables</a:t>
+            </a:r>
+          </a:p>
+          <a:p>
+            <a:pPr marL="457200" indent="-457200" algn="l">
+              <a:buFont typeface="Arial" panose="020B0604020202020204" pitchFamily="34" charset="0"/>
+              <a:buChar char="•"/>
+              <a:defRPr sz="2800">
+                <a:solidFill>
+                  <a:srgbClr val="253957"/>
+                </a:solidFill>
+                <a:latin typeface="+mn-lt"/>
+                <a:ea typeface="+mn-ea"/>
+                <a:cs typeface="+mn-cs"/>
+                <a:sym typeface="Arial Narrow"/>
+              </a:defRPr>
+            </a:pPr>
+            <a:r>
+              <a:rPr lang="en-US" sz="6600" dirty="0">
+                <a:solidFill>
+                  <a:srgbClr val="253957"/>
+                </a:solidFill>
+                <a:sym typeface="Arial Narrow"/>
+              </a:rPr>
+              <a:t>Virtual table is any table created using such a module</a:t>
+            </a:r>
+          </a:p>
+          <a:p>
+            <a:pPr marL="457200" indent="-457200" algn="l">
+              <a:buFont typeface="Arial" panose="020B0604020202020204" pitchFamily="34" charset="0"/>
+              <a:buChar char="•"/>
+              <a:defRPr sz="2800">
+                <a:solidFill>
+                  <a:srgbClr val="253957"/>
+                </a:solidFill>
+                <a:latin typeface="+mn-lt"/>
+                <a:ea typeface="+mn-ea"/>
+                <a:cs typeface="+mn-cs"/>
+                <a:sym typeface="Arial Narrow"/>
+              </a:defRPr>
+            </a:pPr>
+            <a:r>
+              <a:rPr lang="en-US" sz="6600" dirty="0">
+                <a:solidFill>
+                  <a:srgbClr val="253957"/>
+                </a:solidFill>
+                <a:sym typeface="Arial Narrow"/>
+              </a:rPr>
+              <a:t>The extension also registers the </a:t>
+            </a:r>
+            <a:r>
+              <a:rPr lang="en-US" sz="6600" i="1" dirty="0" err="1">
+                <a:solidFill>
+                  <a:srgbClr val="253957"/>
+                </a:solidFill>
+                <a:sym typeface="Arial Narrow"/>
+              </a:rPr>
+              <a:t>btreesModsVisualize</a:t>
+            </a:r>
+            <a:r>
+              <a:rPr lang="en-US" sz="6600" i="1" dirty="0">
+                <a:solidFill>
+                  <a:srgbClr val="253957"/>
+                </a:solidFill>
+                <a:sym typeface="Arial Narrow"/>
+              </a:rPr>
+              <a:t>, </a:t>
+            </a:r>
+            <a:r>
+              <a:rPr lang="en-US" sz="6600" i="1" dirty="0" err="1">
+                <a:solidFill>
+                  <a:srgbClr val="253957"/>
+                </a:solidFill>
+                <a:sym typeface="Arial Narrow"/>
+              </a:rPr>
+              <a:t>btreesModsGetTreeOrder</a:t>
+            </a:r>
+            <a:r>
+              <a:rPr lang="en-US" sz="6600" i="1" dirty="0">
+                <a:solidFill>
+                  <a:srgbClr val="253957"/>
+                </a:solidFill>
+                <a:sym typeface="Arial Narrow"/>
+              </a:rPr>
+              <a:t>, </a:t>
+            </a:r>
+            <a:r>
+              <a:rPr lang="en-US" sz="6600" i="1" dirty="0" err="1">
+                <a:solidFill>
+                  <a:srgbClr val="253957"/>
+                </a:solidFill>
+                <a:sym typeface="Arial Narrow"/>
+              </a:rPr>
+              <a:t>btreesModsGetTreeType</a:t>
+            </a:r>
+            <a:r>
+              <a:rPr lang="en-US" sz="6600" i="1" dirty="0">
+                <a:solidFill>
+                  <a:srgbClr val="253957"/>
+                </a:solidFill>
+                <a:sym typeface="Arial Narrow"/>
+              </a:rPr>
+              <a:t> </a:t>
+            </a:r>
+            <a:r>
+              <a:rPr lang="en-US" sz="6600" dirty="0">
+                <a:solidFill>
+                  <a:srgbClr val="253957"/>
+                </a:solidFill>
+                <a:sym typeface="Arial Narrow"/>
+              </a:rPr>
+              <a:t>functions</a:t>
+            </a:r>
+            <a:endParaRPr lang="ru-RU" sz="6600" dirty="0">
+              <a:solidFill>
+                <a:srgbClr val="253957"/>
+              </a:solidFill>
+              <a:sym typeface="Arial Narrow"/>
+            </a:endParaRPr>
+          </a:p>
+        </p:txBody>
+      </p:sp>
+      <p:sp>
+        <p:nvSpPr>
           <p:cNvPr id="62" name="Название подразделения, лаборатории, факультета и т.д."/>
           <p:cNvSpPr txBox="1"/>
           <p:nvPr/>
@@ -12587,6 +13030,239 @@
                 <a:latin typeface="+mn-lt"/>
               </a:rPr>
               <a:t>20</a:t>
+            </a:fld>
+            <a:endParaRPr lang="ru-RU" sz="3200" dirty="0">
+              <a:solidFill>
+                <a:srgbClr val="253957"/>
+              </a:solidFill>
+              <a:latin typeface="+mn-lt"/>
+            </a:endParaRPr>
+          </a:p>
+        </p:txBody>
+      </p:sp>
+    </p:spTree>
+    <p:extLst>
+      <p:ext uri="{BB962C8B-B14F-4D97-AF65-F5344CB8AC3E}">
+        <p14:creationId xmlns:p14="http://schemas.microsoft.com/office/powerpoint/2010/main" val="767116018"/>
+      </p:ext>
+    </p:extLst>
+  </p:cSld>
+  <p:clrMapOvr>
+    <a:masterClrMapping/>
+  </p:clrMapOvr>
+  <p:transition spd="med"/>
+</p:sld>
+</file>
+
+<file path=ppt/slides/slide21.xml><?xml version="1.0" encoding="utf-8"?>
+<p:sld xmlns:a="http://schemas.openxmlformats.org/drawingml/2006/main" xmlns:r="http://schemas.openxmlformats.org/officeDocument/2006/relationships" xmlns:p="http://schemas.openxmlformats.org/presentationml/2006/main">
+  <p:cSld>
+    <p:spTree>
+      <p:nvGrpSpPr>
+        <p:cNvPr id="1" name=""/>
+        <p:cNvGrpSpPr/>
+        <p:nvPr/>
+      </p:nvGrpSpPr>
+      <p:grpSpPr>
+        <a:xfrm>
+          <a:off x="0" y="0"/>
+          <a:ext cx="0" cy="0"/>
+          <a:chOff x="0" y="0"/>
+          <a:chExt cx="0" cy="0"/>
+        </a:xfrm>
+      </p:grpSpPr>
+      <p:sp>
+        <p:nvSpPr>
+          <p:cNvPr id="58" name="Линия"/>
+          <p:cNvSpPr/>
+          <p:nvPr/>
+        </p:nvSpPr>
+        <p:spPr>
+          <a:xfrm>
+            <a:off x="1201065" y="2214562"/>
+            <a:ext cx="21506373" cy="1"/>
+          </a:xfrm>
+          <a:prstGeom prst="line">
+            <a:avLst/>
+          </a:prstGeom>
+          <a:ln w="12700">
+            <a:solidFill>
+              <a:srgbClr val="253957"/>
+            </a:solidFill>
+            <a:miter lim="400000"/>
+          </a:ln>
+        </p:spPr>
+        <p:txBody>
+          <a:bodyPr lIns="71437" tIns="71437" rIns="71437" bIns="71437" anchor="ctr"/>
+          <a:lstStyle/>
+          <a:p>
+            <a:pPr>
+              <a:defRPr sz="3200"/>
+            </a:pPr>
+            <a:endParaRPr/>
+          </a:p>
+        </p:txBody>
+      </p:sp>
+      <p:sp>
+        <p:nvSpPr>
+          <p:cNvPr id="59" name="Очень крутой заголовок…"/>
+          <p:cNvSpPr txBox="1"/>
+          <p:nvPr/>
+        </p:nvSpPr>
+        <p:spPr>
+          <a:xfrm>
+            <a:off x="1209449" y="2972786"/>
+            <a:ext cx="16073440" cy="2313227"/>
+          </a:xfrm>
+          <a:prstGeom prst="rect">
+            <a:avLst/>
+          </a:prstGeom>
+          <a:ln w="12700">
+            <a:miter lim="400000"/>
+          </a:ln>
+          <a:extLst>
+            <a:ext uri="{C572A759-6A51-4108-AA02-DFA0A04FC94B}">
+              <ma14:wrappingTextBoxFlag xmlns="" xmlns:m="http://schemas.openxmlformats.org/officeDocument/2006/math" xmlns:a14="http://schemas.microsoft.com/office/drawing/2010/main" xmlns:ma14="http://schemas.microsoft.com/office/mac/drawingml/2011/main" val="1"/>
+            </a:ext>
+          </a:extLst>
+        </p:spPr>
+        <p:txBody>
+          <a:bodyPr lIns="71437" tIns="71437" rIns="71437" bIns="71437"/>
+          <a:lstStyle/>
+          <a:p>
+            <a:pPr algn="l">
+              <a:defRPr sz="5000" b="1" cap="all">
+                <a:solidFill>
+                  <a:srgbClr val="253957"/>
+                </a:solidFill>
+                <a:latin typeface="+mn-lt"/>
+                <a:ea typeface="+mn-ea"/>
+                <a:cs typeface="+mn-cs"/>
+                <a:sym typeface="Arial Narrow"/>
+              </a:defRPr>
+            </a:pPr>
+            <a:r>
+              <a:rPr lang="en-US" sz="7000" b="1" dirty="0">
+                <a:latin typeface="Arial Narrow" charset="0"/>
+                <a:ea typeface="Arial Narrow" charset="0"/>
+                <a:cs typeface="Arial Narrow" charset="0"/>
+              </a:rPr>
+              <a:t>Implementation</a:t>
+            </a:r>
+          </a:p>
+        </p:txBody>
+      </p:sp>
+      <p:sp>
+        <p:nvSpPr>
+          <p:cNvPr id="62" name="Название подразделения, лаборатории, факультета и т.д."/>
+          <p:cNvSpPr txBox="1"/>
+          <p:nvPr/>
+        </p:nvSpPr>
+        <p:spPr>
+          <a:xfrm>
+            <a:off x="11338744" y="942364"/>
+            <a:ext cx="11366416" cy="513601"/>
+          </a:xfrm>
+          <a:prstGeom prst="rect">
+            <a:avLst/>
+          </a:prstGeom>
+          <a:ln w="12700">
+            <a:miter lim="400000"/>
+          </a:ln>
+          <a:extLst>
+            <a:ext uri="{C572A759-6A51-4108-AA02-DFA0A04FC94B}">
+              <ma14:wrappingTextBoxFlag xmlns="" xmlns:m="http://schemas.openxmlformats.org/officeDocument/2006/math" xmlns:a14="http://schemas.microsoft.com/office/drawing/2010/main" xmlns:ma14="http://schemas.microsoft.com/office/mac/drawingml/2011/main" val="1"/>
+            </a:ext>
+          </a:extLst>
+        </p:spPr>
+        <p:txBody>
+          <a:bodyPr lIns="71437" tIns="71437" rIns="71437" bIns="71437" anchor="ctr">
+            <a:spAutoFit/>
+          </a:bodyPr>
+          <a:lstStyle>
+            <a:lvl1pPr algn="r">
+              <a:defRPr sz="2400">
+                <a:solidFill>
+                  <a:srgbClr val="253957"/>
+                </a:solidFill>
+                <a:latin typeface="+mn-lt"/>
+                <a:ea typeface="+mn-ea"/>
+                <a:cs typeface="+mn-cs"/>
+                <a:sym typeface="Arial Narrow"/>
+              </a:defRPr>
+            </a:lvl1pPr>
+          </a:lstStyle>
+          <a:p>
+            <a:r>
+              <a:rPr lang="en-US" dirty="0"/>
+              <a:t>Faculty of Computer Science</a:t>
+            </a:r>
+          </a:p>
+        </p:txBody>
+      </p:sp>
+      <p:pic>
+        <p:nvPicPr>
+          <p:cNvPr id="9" name="Изображение" descr="Изображение"/>
+          <p:cNvPicPr>
+            <a:picLocks noChangeAspect="1"/>
+          </p:cNvPicPr>
+          <p:nvPr/>
+        </p:nvPicPr>
+        <p:blipFill>
+          <a:blip r:embed="rId2">
+            <a:extLst/>
+          </a:blip>
+          <a:stretch>
+            <a:fillRect/>
+          </a:stretch>
+        </p:blipFill>
+        <p:spPr>
+          <a:xfrm>
+            <a:off x="1211199" y="620465"/>
+            <a:ext cx="1214985" cy="1214985"/>
+          </a:xfrm>
+          <a:prstGeom prst="rect">
+            <a:avLst/>
+          </a:prstGeom>
+          <a:ln w="12700">
+            <a:miter lim="400000"/>
+          </a:ln>
+        </p:spPr>
+      </p:pic>
+      <p:sp>
+        <p:nvSpPr>
+          <p:cNvPr id="10" name="Номер слайда 3">
+            <a:extLst>
+              <a:ext uri="{FF2B5EF4-FFF2-40B4-BE49-F238E27FC236}">
+                <a16:creationId xmlns:a16="http://schemas.microsoft.com/office/drawing/2014/main" id="{CFE22364-6DCC-47CB-A115-79FB3F398412}"/>
+              </a:ext>
+            </a:extLst>
+          </p:cNvPr>
+          <p:cNvSpPr>
+            <a:spLocks noGrp="1"/>
+          </p:cNvSpPr>
+          <p:nvPr>
+            <p:ph type="sldNum" sz="quarter" idx="2"/>
+          </p:nvPr>
+        </p:nvSpPr>
+        <p:spPr>
+          <a:xfrm>
+            <a:off x="22705161" y="13079288"/>
+            <a:ext cx="1678840" cy="636712"/>
+          </a:xfrm>
+        </p:spPr>
+        <p:txBody>
+          <a:bodyPr/>
+          <a:lstStyle/>
+          <a:p>
+            <a:fld id="{86CB4B4D-7CA3-9044-876B-883B54F8677D}" type="slidenum">
+              <a:rPr lang="ru-RU" sz="3200" smtClean="0">
+                <a:solidFill>
+                  <a:srgbClr val="253957"/>
+                </a:solidFill>
+                <a:latin typeface="+mn-lt"/>
+              </a:rPr>
+              <a:t>21</a:t>
             </a:fld>
             <a:endParaRPr lang="ru-RU" sz="3200" dirty="0">
               <a:solidFill>
@@ -12955,7 +13631,7 @@
 </p:sld>
 </file>
 
-<file path=ppt/slides/slide21.xml><?xml version="1.0" encoding="utf-8"?>
+<file path=ppt/slides/slide22.xml><?xml version="1.0" encoding="utf-8"?>
 <p:sld xmlns:a="http://schemas.openxmlformats.org/drawingml/2006/main" xmlns:r="http://schemas.openxmlformats.org/officeDocument/2006/relationships" xmlns:p="http://schemas.openxmlformats.org/presentationml/2006/main">
   <p:cSld>
     <p:spTree>
@@ -13163,7 +13839,7 @@
                 </a:solidFill>
                 <a:latin typeface="+mn-lt"/>
               </a:rPr>
-              <a:t>21</a:t>
+              <a:t>22</a:t>
             </a:fld>
             <a:endParaRPr lang="ru-RU" sz="3200" dirty="0">
               <a:solidFill>
@@ -13574,7 +14250,7 @@
 </p:sld>
 </file>
 
-<file path=ppt/slides/slide22.xml><?xml version="1.0" encoding="utf-8"?>
+<file path=ppt/slides/slide23.xml><?xml version="1.0" encoding="utf-8"?>
 <p:sld xmlns:a="http://schemas.openxmlformats.org/drawingml/2006/main" xmlns:r="http://schemas.openxmlformats.org/officeDocument/2006/relationships" xmlns:p="http://schemas.openxmlformats.org/presentationml/2006/main">
   <p:cSld>
     <p:spTree>
@@ -13782,7 +14458,7 @@
                 </a:solidFill>
                 <a:latin typeface="+mn-lt"/>
               </a:rPr>
-              <a:t>22</a:t>
+              <a:t>23</a:t>
             </a:fld>
             <a:endParaRPr lang="ru-RU" sz="3200" dirty="0">
               <a:solidFill>
@@ -13846,7 +14522,7 @@
 </p:sld>
 </file>
 
-<file path=ppt/slides/slide23.xml><?xml version="1.0" encoding="utf-8"?>
+<file path=ppt/slides/slide24.xml><?xml version="1.0" encoding="utf-8"?>
 <p:sld xmlns:a="http://schemas.openxmlformats.org/drawingml/2006/main" xmlns:r="http://schemas.openxmlformats.org/officeDocument/2006/relationships" xmlns:p="http://schemas.openxmlformats.org/presentationml/2006/main">
   <p:cSld>
     <p:spTree>
@@ -14070,7 +14746,7 @@
                 </a:solidFill>
                 <a:latin typeface="+mn-lt"/>
               </a:rPr>
-              <a:t>23</a:t>
+              <a:t>24</a:t>
             </a:fld>
             <a:endParaRPr lang="ru-RU" sz="3200" dirty="0">
               <a:solidFill>
@@ -14096,7 +14772,7 @@
           <p:nvPr>
             <p:extLst>
               <p:ext uri="{D42A27DB-BD31-4B8C-83A1-F6EECF244321}">
-                <p14:modId xmlns:p14="http://schemas.microsoft.com/office/powerpoint/2010/main" val="1520070737"/>
+                <p14:modId xmlns:p14="http://schemas.microsoft.com/office/powerpoint/2010/main" val="517468361"/>
               </p:ext>
             </p:extLst>
           </p:nvPr>
@@ -14264,7 +14940,7 @@
                     <a:bodyPr/>
                     <a:lstStyle/>
                     <a:p>
-                      <a:pPr indent="182880" algn="just">
+                      <a:pPr indent="182880" algn="ctr">
                         <a:lnSpc>
                           <a:spcPct val="95000"/>
                         </a:lnSpc>
@@ -14276,12 +14952,12 @@
                         </a:tabLst>
                       </a:pPr>
                       <a:r>
-                        <a:rPr lang="en-US" sz="4800" spc="-5">
+                        <a:rPr lang="en-US" sz="4800" spc="-5" dirty="0">
                           <a:effectLst/>
                         </a:rPr>
                         <a:t>Table creation</a:t>
                       </a:r>
-                      <a:endParaRPr lang="ru-RU" sz="4800" spc="-5">
+                      <a:endParaRPr lang="ru-RU" sz="4800" spc="-5" dirty="0">
                         <a:effectLst/>
                         <a:latin typeface="Times New Roman" panose="02020603050405020304" pitchFamily="18" charset="0"/>
                         <a:ea typeface="SimSun" panose="02010600030101010101" pitchFamily="2" charset="-122"/>
@@ -14295,7 +14971,7 @@
                     <a:bodyPr/>
                     <a:lstStyle/>
                     <a:p>
-                      <a:pPr indent="182880" algn="just">
+                      <a:pPr indent="182880" algn="ctr">
                         <a:lnSpc>
                           <a:spcPct val="95000"/>
                         </a:lnSpc>
@@ -14307,12 +14983,12 @@
                         </a:tabLst>
                       </a:pPr>
                       <a:r>
-                        <a:rPr lang="en-US" sz="4800" spc="-5">
+                        <a:rPr lang="en-US" sz="4800" spc="-5" dirty="0">
                           <a:effectLst/>
                         </a:rPr>
-                        <a:t>21</a:t>
+                        <a:t>20</a:t>
                       </a:r>
-                      <a:endParaRPr lang="ru-RU" sz="4800" spc="-5">
+                      <a:endParaRPr lang="ru-RU" sz="4800" spc="-5" dirty="0">
                         <a:effectLst/>
                         <a:latin typeface="Times New Roman" panose="02020603050405020304" pitchFamily="18" charset="0"/>
                         <a:ea typeface="SimSun" panose="02010600030101010101" pitchFamily="2" charset="-122"/>
@@ -14326,7 +15002,7 @@
                     <a:bodyPr/>
                     <a:lstStyle/>
                     <a:p>
-                      <a:pPr indent="182880" algn="just">
+                      <a:pPr indent="182880" algn="ctr">
                         <a:lnSpc>
                           <a:spcPct val="95000"/>
                         </a:lnSpc>
@@ -14364,7 +15040,7 @@
                     <a:bodyPr/>
                     <a:lstStyle/>
                     <a:p>
-                      <a:pPr indent="182880" algn="just">
+                      <a:pPr indent="182880" algn="ctr">
                         <a:lnSpc>
                           <a:spcPct val="95000"/>
                         </a:lnSpc>
@@ -14376,12 +15052,12 @@
                         </a:tabLst>
                       </a:pPr>
                       <a:r>
-                        <a:rPr lang="en-US" sz="4800" spc="-5">
+                        <a:rPr lang="en-US" sz="4800" spc="-5" dirty="0">
                           <a:effectLst/>
                         </a:rPr>
                         <a:t>First 500 rows insertion</a:t>
                       </a:r>
-                      <a:endParaRPr lang="ru-RU" sz="4800" spc="-5">
+                      <a:endParaRPr lang="ru-RU" sz="4800" spc="-5" dirty="0">
                         <a:effectLst/>
                         <a:latin typeface="Times New Roman" panose="02020603050405020304" pitchFamily="18" charset="0"/>
                         <a:ea typeface="SimSun" panose="02010600030101010101" pitchFamily="2" charset="-122"/>
@@ -14395,7 +15071,7 @@
                     <a:bodyPr/>
                     <a:lstStyle/>
                     <a:p>
-                      <a:pPr indent="182880" algn="just">
+                      <a:pPr indent="182880" algn="ctr">
                         <a:lnSpc>
                           <a:spcPct val="95000"/>
                         </a:lnSpc>
@@ -14407,12 +15083,12 @@
                         </a:tabLst>
                       </a:pPr>
                       <a:r>
-                        <a:rPr lang="en-US" sz="4800" spc="-5">
+                        <a:rPr lang="en-US" sz="4800" spc="-5" dirty="0">
                           <a:effectLst/>
                         </a:rPr>
-                        <a:t>9128</a:t>
+                        <a:t>10301</a:t>
                       </a:r>
-                      <a:endParaRPr lang="ru-RU" sz="4800" spc="-5">
+                      <a:endParaRPr lang="ru-RU" sz="4800" spc="-5" dirty="0">
                         <a:effectLst/>
                         <a:latin typeface="Times New Roman" panose="02020603050405020304" pitchFamily="18" charset="0"/>
                         <a:ea typeface="SimSun" panose="02010600030101010101" pitchFamily="2" charset="-122"/>
@@ -14426,7 +15102,7 @@
                     <a:bodyPr/>
                     <a:lstStyle/>
                     <a:p>
-                      <a:pPr indent="182880" algn="just">
+                      <a:pPr indent="182880" algn="ctr">
                         <a:lnSpc>
                           <a:spcPct val="95000"/>
                         </a:lnSpc>
@@ -14438,12 +15114,12 @@
                         </a:tabLst>
                       </a:pPr>
                       <a:r>
-                        <a:rPr lang="en-US" sz="4800" spc="-5">
+                        <a:rPr lang="en-US" sz="4800" spc="-5" dirty="0">
                           <a:effectLst/>
                         </a:rPr>
-                        <a:t>18.3</a:t>
+                        <a:t>20.6</a:t>
                       </a:r>
-                      <a:endParaRPr lang="ru-RU" sz="4800" spc="-5">
+                      <a:endParaRPr lang="ru-RU" sz="4800" spc="-5" dirty="0">
                         <a:effectLst/>
                         <a:latin typeface="Times New Roman" panose="02020603050405020304" pitchFamily="18" charset="0"/>
                         <a:ea typeface="SimSun" panose="02010600030101010101" pitchFamily="2" charset="-122"/>
@@ -14464,7 +15140,7 @@
                     <a:bodyPr/>
                     <a:lstStyle/>
                     <a:p>
-                      <a:pPr indent="182880" algn="just">
+                      <a:pPr indent="182880" algn="ctr">
                         <a:lnSpc>
                           <a:spcPct val="95000"/>
                         </a:lnSpc>
@@ -14476,12 +15152,12 @@
                         </a:tabLst>
                       </a:pPr>
                       <a:r>
-                        <a:rPr lang="en-US" sz="4800" spc="-5">
+                        <a:rPr lang="en-US" sz="4800" spc="-5" dirty="0">
                           <a:effectLst/>
                         </a:rPr>
                         <a:t>Next 500 rows insertion</a:t>
                       </a:r>
-                      <a:endParaRPr lang="ru-RU" sz="4800" spc="-5">
+                      <a:endParaRPr lang="ru-RU" sz="4800" spc="-5" dirty="0">
                         <a:effectLst/>
                         <a:latin typeface="Times New Roman" panose="02020603050405020304" pitchFamily="18" charset="0"/>
                         <a:ea typeface="SimSun" panose="02010600030101010101" pitchFamily="2" charset="-122"/>
@@ -14495,7 +15171,7 @@
                     <a:bodyPr/>
                     <a:lstStyle/>
                     <a:p>
-                      <a:pPr indent="182880" algn="just">
+                      <a:pPr indent="182880" algn="ctr">
                         <a:lnSpc>
                           <a:spcPct val="95000"/>
                         </a:lnSpc>
@@ -14507,12 +15183,12 @@
                         </a:tabLst>
                       </a:pPr>
                       <a:r>
-                        <a:rPr lang="en-US" sz="4800" spc="-5">
+                        <a:rPr lang="en-US" sz="4800" spc="-5" dirty="0">
                           <a:effectLst/>
                         </a:rPr>
-                        <a:t>9802</a:t>
+                        <a:t>10322</a:t>
                       </a:r>
-                      <a:endParaRPr lang="ru-RU" sz="4800" spc="-5">
+                      <a:endParaRPr lang="ru-RU" sz="4800" spc="-5" dirty="0">
                         <a:effectLst/>
                         <a:latin typeface="Times New Roman" panose="02020603050405020304" pitchFamily="18" charset="0"/>
                         <a:ea typeface="SimSun" panose="02010600030101010101" pitchFamily="2" charset="-122"/>
@@ -14526,7 +15202,7 @@
                     <a:bodyPr/>
                     <a:lstStyle/>
                     <a:p>
-                      <a:pPr indent="182880" algn="just">
+                      <a:pPr indent="182880" algn="ctr">
                         <a:lnSpc>
                           <a:spcPct val="95000"/>
                         </a:lnSpc>
@@ -14538,12 +15214,12 @@
                         </a:tabLst>
                       </a:pPr>
                       <a:r>
-                        <a:rPr lang="en-US" sz="4800" spc="-5">
+                        <a:rPr lang="en-US" sz="4800" spc="-5" dirty="0">
                           <a:effectLst/>
                         </a:rPr>
-                        <a:t>19.6</a:t>
+                        <a:t>20.6</a:t>
                       </a:r>
-                      <a:endParaRPr lang="ru-RU" sz="4800" spc="-5">
+                      <a:endParaRPr lang="ru-RU" sz="4800" spc="-5" dirty="0">
                         <a:effectLst/>
                         <a:latin typeface="Times New Roman" panose="02020603050405020304" pitchFamily="18" charset="0"/>
                         <a:ea typeface="SimSun" panose="02010600030101010101" pitchFamily="2" charset="-122"/>
@@ -14564,7 +15240,7 @@
                     <a:bodyPr/>
                     <a:lstStyle/>
                     <a:p>
-                      <a:pPr indent="182880" algn="just">
+                      <a:pPr indent="182880" algn="ctr">
                         <a:lnSpc>
                           <a:spcPct val="95000"/>
                         </a:lnSpc>
@@ -14576,24 +15252,36 @@
                         </a:tabLst>
                       </a:pPr>
                       <a:r>
-                        <a:rPr lang="en-US" sz="4800" spc="-5">
+                        <a:rPr lang="en-US" sz="4800" spc="-5" dirty="0">
                           <a:effectLst/>
                         </a:rPr>
-                        <a:t>1001st row insertion (including the B-tree into the B</a:t>
+                        <a:t>1001st row insertion (including the B</a:t>
                       </a:r>
                       <a:r>
-                        <a:rPr lang="en-US" sz="4800" spc="-5" baseline="30000">
+                        <a:rPr lang="en-US" sz="4800" spc="-5" baseline="30000" dirty="0">
+                          <a:effectLst/>
+                        </a:rPr>
+                        <a:t>+</a:t>
+                      </a:r>
+                      <a:r>
+                        <a:rPr lang="en-US" sz="4800" spc="-5" dirty="0">
+                          <a:effectLst/>
+                        </a:rPr>
+                        <a:t>-tree into the B</a:t>
+                      </a:r>
+                      <a:r>
+                        <a:rPr lang="en-US" sz="4800" spc="-5" baseline="30000" dirty="0">
                           <a:effectLst/>
                         </a:rPr>
                         <a:t>*</a:t>
                       </a:r>
                       <a:r>
-                        <a:rPr lang="en-US" sz="4800" spc="-5">
+                        <a:rPr lang="en-US" sz="4800" spc="-5" dirty="0">
                           <a:effectLst/>
                         </a:rPr>
                         <a:t>-tree rebuilding)</a:t>
                       </a:r>
-                      <a:endParaRPr lang="ru-RU" sz="4800" spc="-5">
+                      <a:endParaRPr lang="ru-RU" sz="4800" spc="-5" dirty="0">
                         <a:effectLst/>
                         <a:latin typeface="Times New Roman" panose="02020603050405020304" pitchFamily="18" charset="0"/>
                         <a:ea typeface="SimSun" panose="02010600030101010101" pitchFamily="2" charset="-122"/>
@@ -14607,7 +15295,7 @@
                     <a:bodyPr/>
                     <a:lstStyle/>
                     <a:p>
-                      <a:pPr indent="182880" algn="just">
+                      <a:pPr indent="182880" algn="ctr">
                         <a:lnSpc>
                           <a:spcPct val="95000"/>
                         </a:lnSpc>
@@ -14619,12 +15307,12 @@
                         </a:tabLst>
                       </a:pPr>
                       <a:r>
-                        <a:rPr lang="en-US" sz="4800" spc="-5">
+                        <a:rPr lang="en-US" sz="4800" spc="-5" dirty="0">
                           <a:effectLst/>
                         </a:rPr>
-                        <a:t>50</a:t>
+                        <a:t>40</a:t>
                       </a:r>
-                      <a:endParaRPr lang="ru-RU" sz="4800" spc="-5">
+                      <a:endParaRPr lang="ru-RU" sz="4800" spc="-5" dirty="0">
                         <a:effectLst/>
                         <a:latin typeface="Times New Roman" panose="02020603050405020304" pitchFamily="18" charset="0"/>
                         <a:ea typeface="SimSun" panose="02010600030101010101" pitchFamily="2" charset="-122"/>
@@ -14638,7 +15326,7 @@
                     <a:bodyPr/>
                     <a:lstStyle/>
                     <a:p>
-                      <a:pPr indent="182880" algn="just">
+                      <a:pPr indent="182880" algn="ctr">
                         <a:lnSpc>
                           <a:spcPct val="95000"/>
                         </a:lnSpc>
@@ -14650,12 +15338,12 @@
                         </a:tabLst>
                       </a:pPr>
                       <a:r>
-                        <a:rPr lang="en-US" sz="4800" spc="-5">
+                        <a:rPr lang="en-US" sz="4800" spc="-5" dirty="0">
                           <a:effectLst/>
                         </a:rPr>
-                        <a:t>50</a:t>
+                        <a:t>40</a:t>
                       </a:r>
-                      <a:endParaRPr lang="ru-RU" sz="4800" spc="-5">
+                      <a:endParaRPr lang="ru-RU" sz="4800" spc="-5" dirty="0">
                         <a:effectLst/>
                         <a:latin typeface="Times New Roman" panose="02020603050405020304" pitchFamily="18" charset="0"/>
                         <a:ea typeface="SimSun" panose="02010600030101010101" pitchFamily="2" charset="-122"/>
@@ -14676,7 +15364,7 @@
                     <a:bodyPr/>
                     <a:lstStyle/>
                     <a:p>
-                      <a:pPr indent="182880" algn="just">
+                      <a:pPr indent="182880" algn="ctr">
                         <a:lnSpc>
                           <a:spcPct val="95000"/>
                         </a:lnSpc>
@@ -14688,12 +15376,12 @@
                         </a:tabLst>
                       </a:pPr>
                       <a:r>
-                        <a:rPr lang="en-US" sz="4800" spc="-5">
+                        <a:rPr lang="en-US" sz="4800" spc="-5" dirty="0">
                           <a:effectLst/>
                         </a:rPr>
                         <a:t>Next 499 rows insertion</a:t>
                       </a:r>
-                      <a:endParaRPr lang="ru-RU" sz="4800" spc="-5">
+                      <a:endParaRPr lang="ru-RU" sz="4800" spc="-5" dirty="0">
                         <a:effectLst/>
                         <a:latin typeface="Times New Roman" panose="02020603050405020304" pitchFamily="18" charset="0"/>
                         <a:ea typeface="SimSun" panose="02010600030101010101" pitchFamily="2" charset="-122"/>
@@ -14707,7 +15395,7 @@
                     <a:bodyPr/>
                     <a:lstStyle/>
                     <a:p>
-                      <a:pPr indent="182880" algn="just">
+                      <a:pPr indent="182880" algn="ctr">
                         <a:lnSpc>
                           <a:spcPct val="95000"/>
                         </a:lnSpc>
@@ -14719,12 +15407,12 @@
                         </a:tabLst>
                       </a:pPr>
                       <a:r>
-                        <a:rPr lang="en-US" sz="4800" spc="-5">
+                        <a:rPr lang="en-US" sz="4800" spc="-5" dirty="0">
                           <a:effectLst/>
                         </a:rPr>
-                        <a:t>9168</a:t>
+                        <a:t>9386</a:t>
                       </a:r>
-                      <a:endParaRPr lang="ru-RU" sz="4800" spc="-5">
+                      <a:endParaRPr lang="ru-RU" sz="4800" spc="-5" dirty="0">
                         <a:effectLst/>
                         <a:latin typeface="Times New Roman" panose="02020603050405020304" pitchFamily="18" charset="0"/>
                         <a:ea typeface="SimSun" panose="02010600030101010101" pitchFamily="2" charset="-122"/>
@@ -14738,7 +15426,7 @@
                     <a:bodyPr/>
                     <a:lstStyle/>
                     <a:p>
-                      <a:pPr indent="182880" algn="just">
+                      <a:pPr indent="182880" algn="ctr">
                         <a:lnSpc>
                           <a:spcPct val="95000"/>
                         </a:lnSpc>
@@ -14750,12 +15438,12 @@
                         </a:tabLst>
                       </a:pPr>
                       <a:r>
-                        <a:rPr lang="en-US" sz="4800" spc="-5">
+                        <a:rPr lang="en-US" sz="4800" spc="-5" dirty="0">
                           <a:effectLst/>
                         </a:rPr>
-                        <a:t>18.4</a:t>
+                        <a:t>18.8</a:t>
                       </a:r>
-                      <a:endParaRPr lang="ru-RU" sz="4800" spc="-5">
+                      <a:endParaRPr lang="ru-RU" sz="4800" spc="-5" dirty="0">
                         <a:effectLst/>
                         <a:latin typeface="Times New Roman" panose="02020603050405020304" pitchFamily="18" charset="0"/>
                         <a:ea typeface="SimSun" panose="02010600030101010101" pitchFamily="2" charset="-122"/>
@@ -14776,69 +15464,7 @@
                     <a:bodyPr/>
                     <a:lstStyle/>
                     <a:p>
-                      <a:pPr indent="182880" algn="just">
-                        <a:lnSpc>
-                          <a:spcPct val="95000"/>
-                        </a:lnSpc>
-                        <a:spcAft>
-                          <a:spcPts val="600"/>
-                        </a:spcAft>
-                        <a:tabLst>
-                          <a:tab pos="182880" algn="l"/>
-                        </a:tabLst>
-                      </a:pPr>
-                      <a:r>
-                        <a:rPr lang="en-US" sz="4800" spc="-5">
-                          <a:effectLst/>
-                        </a:rPr>
-                        <a:t>Last 500 rows insertion</a:t>
-                      </a:r>
-                      <a:endParaRPr lang="ru-RU" sz="4800" spc="-5">
-                        <a:effectLst/>
-                        <a:latin typeface="Times New Roman" panose="02020603050405020304" pitchFamily="18" charset="0"/>
-                        <a:ea typeface="SimSun" panose="02010600030101010101" pitchFamily="2" charset="-122"/>
-                      </a:endParaRPr>
-                    </a:p>
-                  </a:txBody>
-                  <a:tcPr marL="68580" marR="68580" marT="0" marB="0"/>
-                </a:tc>
-                <a:tc>
-                  <a:txBody>
-                    <a:bodyPr/>
-                    <a:lstStyle/>
-                    <a:p>
-                      <a:pPr indent="182880" algn="just">
-                        <a:lnSpc>
-                          <a:spcPct val="95000"/>
-                        </a:lnSpc>
-                        <a:spcAft>
-                          <a:spcPts val="600"/>
-                        </a:spcAft>
-                        <a:tabLst>
-                          <a:tab pos="182880" algn="l"/>
-                        </a:tabLst>
-                      </a:pPr>
-                      <a:r>
-                        <a:rPr lang="en-US" sz="4800" spc="-5">
-                          <a:effectLst/>
-                        </a:rPr>
-                        <a:t>8933</a:t>
-                      </a:r>
-                      <a:endParaRPr lang="ru-RU" sz="4800" spc="-5">
-                        <a:effectLst/>
-                        <a:latin typeface="Times New Roman" panose="02020603050405020304" pitchFamily="18" charset="0"/>
-                        <a:ea typeface="SimSun" panose="02010600030101010101" pitchFamily="2" charset="-122"/>
-                      </a:endParaRPr>
-                    </a:p>
-                  </a:txBody>
-                  <a:tcPr marL="68580" marR="68580" marT="0" marB="0"/>
-                </a:tc>
-                <a:tc>
-                  <a:txBody>
-                    <a:bodyPr/>
-                    <a:lstStyle/>
-                    <a:p>
-                      <a:pPr indent="182880" algn="just">
+                      <a:pPr indent="182880" algn="ctr">
                         <a:lnSpc>
                           <a:spcPct val="95000"/>
                         </a:lnSpc>
@@ -14853,7 +15479,69 @@
                         <a:rPr lang="en-US" sz="4800" spc="-5" dirty="0">
                           <a:effectLst/>
                         </a:rPr>
-                        <a:t>17.9</a:t>
+                        <a:t>Last 500 rows insertion</a:t>
+                      </a:r>
+                      <a:endParaRPr lang="ru-RU" sz="4800" spc="-5" dirty="0">
+                        <a:effectLst/>
+                        <a:latin typeface="Times New Roman" panose="02020603050405020304" pitchFamily="18" charset="0"/>
+                        <a:ea typeface="SimSun" panose="02010600030101010101" pitchFamily="2" charset="-122"/>
+                      </a:endParaRPr>
+                    </a:p>
+                  </a:txBody>
+                  <a:tcPr marL="68580" marR="68580" marT="0" marB="0"/>
+                </a:tc>
+                <a:tc>
+                  <a:txBody>
+                    <a:bodyPr/>
+                    <a:lstStyle/>
+                    <a:p>
+                      <a:pPr indent="182880" algn="ctr">
+                        <a:lnSpc>
+                          <a:spcPct val="95000"/>
+                        </a:lnSpc>
+                        <a:spcAft>
+                          <a:spcPts val="600"/>
+                        </a:spcAft>
+                        <a:tabLst>
+                          <a:tab pos="182880" algn="l"/>
+                        </a:tabLst>
+                      </a:pPr>
+                      <a:r>
+                        <a:rPr lang="en-US" sz="4800" spc="-5" dirty="0">
+                          <a:effectLst/>
+                        </a:rPr>
+                        <a:t>9032</a:t>
+                      </a:r>
+                      <a:endParaRPr lang="ru-RU" sz="4800" spc="-5" dirty="0">
+                        <a:effectLst/>
+                        <a:latin typeface="Times New Roman" panose="02020603050405020304" pitchFamily="18" charset="0"/>
+                        <a:ea typeface="SimSun" panose="02010600030101010101" pitchFamily="2" charset="-122"/>
+                      </a:endParaRPr>
+                    </a:p>
+                  </a:txBody>
+                  <a:tcPr marL="68580" marR="68580" marT="0" marB="0"/>
+                </a:tc>
+                <a:tc>
+                  <a:txBody>
+                    <a:bodyPr/>
+                    <a:lstStyle/>
+                    <a:p>
+                      <a:pPr indent="182880" algn="ctr">
+                        <a:lnSpc>
+                          <a:spcPct val="95000"/>
+                        </a:lnSpc>
+                        <a:spcAft>
+                          <a:spcPts val="600"/>
+                        </a:spcAft>
+                        <a:tabLst>
+                          <a:tab pos="182880" algn="l"/>
+                        </a:tabLst>
+                      </a:pPr>
+                      <a:r>
+                        <a:rPr lang="en-US" sz="4800" spc="-5" dirty="0">
+                          <a:effectLst/>
+                        </a:rPr>
+                        <a:t>18.1</a:t>
                       </a:r>
                       <a:endParaRPr lang="ru-RU" sz="4800" spc="-5" dirty="0">
                         <a:effectLst/>
@@ -14888,7 +15576,7 @@
 </p:sld>
 </file>
 
-<file path=ppt/slides/slide24.xml><?xml version="1.0" encoding="utf-8"?>
+<file path=ppt/slides/slide25.xml><?xml version="1.0" encoding="utf-8"?>
 <p:sld xmlns:a="http://schemas.openxmlformats.org/drawingml/2006/main" xmlns:r="http://schemas.openxmlformats.org/officeDocument/2006/relationships" xmlns:p="http://schemas.openxmlformats.org/presentationml/2006/main">
   <p:cSld>
     <p:spTree>
@@ -15112,7 +15800,7 @@
                 </a:solidFill>
                 <a:latin typeface="+mn-lt"/>
               </a:rPr>
-              <a:t>24</a:t>
+              <a:t>25</a:t>
             </a:fld>
             <a:endParaRPr lang="ru-RU" sz="3200" dirty="0">
               <a:solidFill>
@@ -15138,14 +15826,14 @@
           <p:nvPr>
             <p:extLst>
               <p:ext uri="{D42A27DB-BD31-4B8C-83A1-F6EECF244321}">
-                <p14:modId xmlns:p14="http://schemas.microsoft.com/office/powerpoint/2010/main" val="3566715137"/>
+                <p14:modId xmlns:p14="http://schemas.microsoft.com/office/powerpoint/2010/main" val="659573181"/>
               </p:ext>
             </p:extLst>
           </p:nvPr>
         </p:nvGraphicFramePr>
         <p:xfrm>
           <a:off x="1201065" y="4363372"/>
-          <a:ext cx="21495711" cy="8918448"/>
+          <a:ext cx="21495711" cy="7644384"/>
         </p:xfrm>
         <a:graphic>
           <a:graphicData uri="http://schemas.openxmlformats.org/drawingml/2006/table">
@@ -15306,7 +15994,7 @@
                     <a:bodyPr/>
                     <a:lstStyle/>
                     <a:p>
-                      <a:pPr indent="182880" algn="just">
+                      <a:pPr indent="182880" algn="ctr">
                         <a:lnSpc>
                           <a:spcPct val="95000"/>
                         </a:lnSpc>
@@ -15337,7 +16025,7 @@
                     <a:bodyPr/>
                     <a:lstStyle/>
                     <a:p>
-                      <a:pPr indent="182880" algn="just">
+                      <a:pPr indent="182880" algn="ctr">
                         <a:lnSpc>
                           <a:spcPct val="95000"/>
                         </a:lnSpc>
@@ -15352,7 +16040,7 @@
                         <a:rPr lang="en-US" sz="4400" spc="-5" dirty="0">
                           <a:effectLst/>
                         </a:rPr>
-                        <a:t>9888</a:t>
+                        <a:t>11558</a:t>
                       </a:r>
                       <a:endParaRPr lang="ru-RU" sz="4400" spc="-5" dirty="0">
                         <a:effectLst/>
@@ -15368,7 +16056,7 @@
                     <a:bodyPr/>
                     <a:lstStyle/>
                     <a:p>
-                      <a:pPr indent="182880" algn="just">
+                      <a:pPr indent="182880" algn="ctr">
                         <a:lnSpc>
                           <a:spcPct val="95000"/>
                         </a:lnSpc>
@@ -15383,7 +16071,7 @@
                         <a:rPr lang="en-US" sz="4400" spc="-5" dirty="0">
                           <a:effectLst/>
                         </a:rPr>
-                        <a:t>19.8</a:t>
+                        <a:t>23.1</a:t>
                       </a:r>
                       <a:endParaRPr lang="ru-RU" sz="4400" spc="-5" dirty="0">
                         <a:effectLst/>
@@ -15406,7 +16094,7 @@
                     <a:bodyPr/>
                     <a:lstStyle/>
                     <a:p>
-                      <a:pPr indent="182880" algn="just">
+                      <a:pPr indent="182880" algn="ctr">
                         <a:lnSpc>
                           <a:spcPct val="95000"/>
                         </a:lnSpc>
@@ -15421,7 +16109,107 @@
                         <a:rPr lang="en-US" sz="4400" spc="-5" dirty="0">
                           <a:effectLst/>
                         </a:rPr>
-                        <a:t>Next 500 rows deletion (including the B</a:t>
+                        <a:t>Next 500 rows deletion</a:t>
+                      </a:r>
+                      <a:endParaRPr lang="ru-RU" sz="4400" spc="-5" dirty="0">
+                        <a:effectLst/>
+                        <a:latin typeface="Times New Roman" panose="02020603050405020304" pitchFamily="18" charset="0"/>
+                        <a:ea typeface="SimSun" panose="02010600030101010101" pitchFamily="2" charset="-122"/>
+                      </a:endParaRPr>
+                    </a:p>
+                  </a:txBody>
+                  <a:tcPr marL="68580" marR="68580" marT="0" marB="0"/>
+                </a:tc>
+                <a:tc>
+                  <a:txBody>
+                    <a:bodyPr/>
+                    <a:lstStyle/>
+                    <a:p>
+                      <a:pPr indent="182880" algn="ctr">
+                        <a:lnSpc>
+                          <a:spcPct val="95000"/>
+                        </a:lnSpc>
+                        <a:spcAft>
+                          <a:spcPts val="600"/>
+                        </a:spcAft>
+                        <a:tabLst>
+                          <a:tab pos="182880" algn="l"/>
+                        </a:tabLst>
+                      </a:pPr>
+                      <a:r>
+                        <a:rPr lang="en-US" sz="4400" spc="-5" dirty="0">
+                          <a:effectLst/>
+                        </a:rPr>
+                        <a:t>10708</a:t>
+                      </a:r>
+                      <a:endParaRPr lang="ru-RU" sz="4400" spc="-5" dirty="0">
+                        <a:effectLst/>
+                        <a:latin typeface="Times New Roman" panose="02020603050405020304" pitchFamily="18" charset="0"/>
+                        <a:ea typeface="SimSun" panose="02010600030101010101" pitchFamily="2" charset="-122"/>
+                      </a:endParaRPr>
+                    </a:p>
+                  </a:txBody>
+                  <a:tcPr marL="68580" marR="68580" marT="0" marB="0"/>
+                </a:tc>
+                <a:tc>
+                  <a:txBody>
+                    <a:bodyPr/>
+                    <a:lstStyle/>
+                    <a:p>
+                      <a:pPr indent="182880" algn="ctr">
+                        <a:lnSpc>
+                          <a:spcPct val="95000"/>
+                        </a:lnSpc>
+                        <a:spcAft>
+                          <a:spcPts val="600"/>
+                        </a:spcAft>
+                        <a:tabLst>
+                          <a:tab pos="182880" algn="l"/>
+                        </a:tabLst>
+                      </a:pPr>
+                      <a:r>
+                        <a:rPr lang="en-US" sz="4400" spc="-5" dirty="0">
+                          <a:effectLst/>
+                        </a:rPr>
+                        <a:t>21.4</a:t>
+                      </a:r>
+                      <a:endParaRPr lang="ru-RU" sz="4400" spc="-5" dirty="0">
+                        <a:effectLst/>
+                        <a:latin typeface="Times New Roman" panose="02020603050405020304" pitchFamily="18" charset="0"/>
+                        <a:ea typeface="SimSun" panose="02010600030101010101" pitchFamily="2" charset="-122"/>
+                      </a:endParaRPr>
+                    </a:p>
+                  </a:txBody>
+                  <a:tcPr marL="68580" marR="68580" marT="0" marB="0"/>
+                </a:tc>
+                <a:extLst>
+                  <a:ext uri="{0D108BD9-81ED-4DB2-BD59-A6C34878D82A}">
+                    <a16:rowId xmlns:a16="http://schemas.microsoft.com/office/drawing/2014/main" val="2064939370"/>
+                  </a:ext>
+                </a:extLst>
+              </a:tr>
+              <a:tr h="0">
+                <a:tc>
+                  <a:txBody>
+                    <a:bodyPr/>
+                    <a:lstStyle/>
+                    <a:p>
+                      <a:pPr indent="182880" algn="ctr">
+                        <a:lnSpc>
+                          <a:spcPct val="95000"/>
+                        </a:lnSpc>
+                        <a:spcAft>
+                          <a:spcPts val="600"/>
+                        </a:spcAft>
+                        <a:tabLst>
+                          <a:tab pos="182880" algn="l"/>
+                        </a:tabLst>
+                      </a:pPr>
+                      <a:r>
+                        <a:rPr lang="en-US" sz="4400" spc="-5" dirty="0">
+                          <a:effectLst/>
+                        </a:rPr>
+                        <a:t>1001st row insertion (including the B</a:t>
                       </a:r>
                       <a:r>
                         <a:rPr lang="en-US" sz="4400" spc="-5" baseline="30000" dirty="0">
@@ -15461,7 +16249,7 @@
                     <a:bodyPr/>
                     <a:lstStyle/>
                     <a:p>
-                      <a:pPr indent="182880" algn="just">
+                      <a:pPr indent="182880" algn="ctr">
                         <a:lnSpc>
                           <a:spcPct val="95000"/>
                         </a:lnSpc>
@@ -15476,7 +16264,7 @@
                         <a:rPr lang="en-US" sz="4400" spc="-5" dirty="0">
                           <a:effectLst/>
                         </a:rPr>
-                        <a:t>9974</a:t>
+                        <a:t>62</a:t>
                       </a:r>
                       <a:endParaRPr lang="ru-RU" sz="4400" spc="-5" dirty="0">
                         <a:effectLst/>
@@ -15492,76 +16280,7 @@
                     <a:bodyPr/>
                     <a:lstStyle/>
                     <a:p>
-                      <a:pPr indent="182880" algn="just">
-                        <a:lnSpc>
-                          <a:spcPct val="95000"/>
-                        </a:lnSpc>
-                        <a:spcAft>
-                          <a:spcPts val="600"/>
-                        </a:spcAft>
-                        <a:tabLst>
-                          <a:tab pos="182880" algn="l"/>
-                        </a:tabLst>
-                      </a:pPr>
-                      <a:r>
-                        <a:rPr lang="en-US" sz="4400" spc="-5">
-                          <a:effectLst/>
-                        </a:rPr>
-                        <a:t>19.9</a:t>
-                      </a:r>
-                      <a:endParaRPr lang="ru-RU" sz="4400" spc="-5">
-                        <a:effectLst/>
-                        <a:latin typeface="Times New Roman" panose="02020603050405020304" pitchFamily="18" charset="0"/>
-                        <a:ea typeface="SimSun" panose="02010600030101010101" pitchFamily="2" charset="-122"/>
-                      </a:endParaRPr>
-                    </a:p>
-                  </a:txBody>
-                  <a:tcPr marL="68580" marR="68580" marT="0" marB="0"/>
-                </a:tc>
-                <a:extLst>
-                  <a:ext uri="{0D108BD9-81ED-4DB2-BD59-A6C34878D82A}">
-                    <a16:rowId xmlns:a16="http://schemas.microsoft.com/office/drawing/2014/main" val="2064939370"/>
-                  </a:ext>
-                </a:extLst>
-              </a:tr>
-              <a:tr h="0">
-                <a:tc>
-                  <a:txBody>
-                    <a:bodyPr/>
-                    <a:lstStyle/>
-                    <a:p>
-                      <a:pPr indent="182880" algn="just">
-                        <a:lnSpc>
-                          <a:spcPct val="95000"/>
-                        </a:lnSpc>
-                        <a:spcAft>
-                          <a:spcPts val="600"/>
-                        </a:spcAft>
-                        <a:tabLst>
-                          <a:tab pos="182880" algn="l"/>
-                        </a:tabLst>
-                      </a:pPr>
-                      <a:r>
-                        <a:rPr lang="en-US" sz="4400" spc="-5">
-                          <a:effectLst/>
-                        </a:rPr>
-                        <a:t>Next 500 rows deletion</a:t>
-                      </a:r>
-                      <a:endParaRPr lang="ru-RU" sz="4400" spc="-5">
-                        <a:effectLst/>
-                        <a:latin typeface="Times New Roman" panose="02020603050405020304" pitchFamily="18" charset="0"/>
-                        <a:ea typeface="SimSun" panose="02010600030101010101" pitchFamily="2" charset="-122"/>
-                      </a:endParaRPr>
-                    </a:p>
-                  </a:txBody>
-                  <a:tcPr marL="68580" marR="68580" marT="0" marB="0"/>
-                </a:tc>
-                <a:tc>
-                  <a:txBody>
-                    <a:bodyPr/>
-                    <a:lstStyle/>
-                    <a:p>
-                      <a:pPr indent="182880" algn="just">
+                      <a:pPr indent="182880" algn="ctr">
                         <a:lnSpc>
                           <a:spcPct val="95000"/>
                         </a:lnSpc>
@@ -15576,40 +16295,9 @@
                         <a:rPr lang="en-US" sz="4400" spc="-5" dirty="0">
                           <a:effectLst/>
                         </a:rPr>
-                        <a:t>9784</a:t>
+                        <a:t>62</a:t>
                       </a:r>
                       <a:endParaRPr lang="ru-RU" sz="4400" spc="-5" dirty="0">
-                        <a:effectLst/>
-                        <a:latin typeface="Times New Roman" panose="02020603050405020304" pitchFamily="18" charset="0"/>
-                        <a:ea typeface="SimSun" panose="02010600030101010101" pitchFamily="2" charset="-122"/>
-                      </a:endParaRPr>
-                    </a:p>
-                  </a:txBody>
-                  <a:tcPr marL="68580" marR="68580" marT="0" marB="0"/>
-                </a:tc>
-                <a:tc>
-                  <a:txBody>
-                    <a:bodyPr/>
-                    <a:lstStyle/>
-                    <a:p>
-                      <a:pPr indent="182880" algn="just">
-                        <a:lnSpc>
-                          <a:spcPct val="95000"/>
-                        </a:lnSpc>
-                        <a:spcAft>
-                          <a:spcPts val="600"/>
-                        </a:spcAft>
-                        <a:tabLst>
-                          <a:tab pos="182880" algn="l"/>
-                        </a:tabLst>
-                      </a:pPr>
-                      <a:r>
-                        <a:rPr lang="en-US" sz="4400" spc="-5">
-                          <a:effectLst/>
-                        </a:rPr>
-                        <a:t>19.6</a:t>
-                      </a:r>
-                      <a:endParaRPr lang="ru-RU" sz="4400" spc="-5">
                         <a:effectLst/>
                         <a:latin typeface="Times New Roman" panose="02020603050405020304" pitchFamily="18" charset="0"/>
                         <a:ea typeface="SimSun" panose="02010600030101010101" pitchFamily="2" charset="-122"/>
@@ -15630,62 +16318,7 @@
                     <a:bodyPr/>
                     <a:lstStyle/>
                     <a:p>
-                      <a:pPr indent="182880" algn="just">
-                        <a:lnSpc>
-                          <a:spcPct val="95000"/>
-                        </a:lnSpc>
-                        <a:spcAft>
-                          <a:spcPts val="600"/>
-                        </a:spcAft>
-                        <a:tabLst>
-                          <a:tab pos="182880" algn="l"/>
-                        </a:tabLst>
-                      </a:pPr>
-                      <a:r>
-                        <a:rPr lang="en-US" sz="4400" spc="-5">
-                          <a:effectLst/>
-                        </a:rPr>
-                        <a:t>Last 500 rows deletion (including the B</a:t>
-                      </a:r>
-                      <a:r>
-                        <a:rPr lang="en-US" sz="4400" spc="-5" baseline="30000">
-                          <a:effectLst/>
-                        </a:rPr>
-                        <a:t>*+</a:t>
-                      </a:r>
-                      <a:r>
-                        <a:rPr lang="en-US" sz="4400" spc="-5">
-                          <a:effectLst/>
-                        </a:rPr>
-                        <a:t>-tree into the B</a:t>
-                      </a:r>
-                      <a:r>
-                        <a:rPr lang="en-US" sz="4400" spc="-5" baseline="30000">
-                          <a:effectLst/>
-                        </a:rPr>
-                        <a:t>+</a:t>
-                      </a:r>
-                      <a:r>
-                        <a:rPr lang="en-US" sz="4400" spc="-5">
-                          <a:effectLst/>
-                        </a:rPr>
-                        <a:t>-tree rebuilding)</a:t>
-                      </a:r>
-                      <a:endParaRPr lang="ru-RU" sz="4400" spc="-5">
-                        <a:effectLst/>
-                        <a:latin typeface="Times New Roman" panose="02020603050405020304" pitchFamily="18" charset="0"/>
-                        <a:ea typeface="SimSun" panose="02010600030101010101" pitchFamily="2" charset="-122"/>
-                      </a:endParaRPr>
-                    </a:p>
-                  </a:txBody>
-                  <a:tcPr marL="68580" marR="68580" marT="0" marB="0"/>
-                </a:tc>
-                <a:tc>
-                  <a:txBody>
-                    <a:bodyPr/>
-                    <a:lstStyle/>
-                    <a:p>
-                      <a:pPr indent="182880" algn="just">
+                      <a:pPr indent="182880" algn="ctr">
                         <a:lnSpc>
                           <a:spcPct val="95000"/>
                         </a:lnSpc>
@@ -15700,7 +16333,7 @@
                         <a:rPr lang="en-US" sz="4400" spc="-5" dirty="0">
                           <a:effectLst/>
                         </a:rPr>
-                        <a:t>9201</a:t>
+                        <a:t>Next 499 rows deletion</a:t>
                       </a:r>
                       <a:endParaRPr lang="ru-RU" sz="4400" spc="-5" dirty="0">
                         <a:effectLst/>
@@ -15716,7 +16349,7 @@
                     <a:bodyPr/>
                     <a:lstStyle/>
                     <a:p>
-                      <a:pPr indent="182880" algn="just">
+                      <a:pPr indent="182880" algn="ctr">
                         <a:lnSpc>
                           <a:spcPct val="95000"/>
                         </a:lnSpc>
@@ -15728,12 +16361,43 @@
                         </a:tabLst>
                       </a:pPr>
                       <a:r>
-                        <a:rPr lang="en-US" sz="4400" spc="-5">
+                        <a:rPr lang="en-US" sz="4400" spc="-5" dirty="0">
                           <a:effectLst/>
                         </a:rPr>
-                        <a:t>18.4</a:t>
+                        <a:t>9418</a:t>
                       </a:r>
-                      <a:endParaRPr lang="ru-RU" sz="4400" spc="-5">
+                      <a:endParaRPr lang="ru-RU" sz="4400" spc="-5" dirty="0">
+                        <a:effectLst/>
+                        <a:latin typeface="Times New Roman" panose="02020603050405020304" pitchFamily="18" charset="0"/>
+                        <a:ea typeface="SimSun" panose="02010600030101010101" pitchFamily="2" charset="-122"/>
+                      </a:endParaRPr>
+                    </a:p>
+                  </a:txBody>
+                  <a:tcPr marL="68580" marR="68580" marT="0" marB="0"/>
+                </a:tc>
+                <a:tc>
+                  <a:txBody>
+                    <a:bodyPr/>
+                    <a:lstStyle/>
+                    <a:p>
+                      <a:pPr indent="182880" algn="ctr">
+                        <a:lnSpc>
+                          <a:spcPct val="95000"/>
+                        </a:lnSpc>
+                        <a:spcAft>
+                          <a:spcPts val="600"/>
+                        </a:spcAft>
+                        <a:tabLst>
+                          <a:tab pos="182880" algn="l"/>
+                        </a:tabLst>
+                      </a:pPr>
+                      <a:r>
+                        <a:rPr lang="en-US" sz="4400" spc="-5" dirty="0">
+                          <a:effectLst/>
+                        </a:rPr>
+                        <a:t>18.9</a:t>
+                      </a:r>
+                      <a:endParaRPr lang="ru-RU" sz="4400" spc="-5" dirty="0">
                         <a:effectLst/>
                         <a:latin typeface="Times New Roman" panose="02020603050405020304" pitchFamily="18" charset="0"/>
                         <a:ea typeface="SimSun" panose="02010600030101010101" pitchFamily="2" charset="-122"/>
@@ -15754,38 +16418,7 @@
                     <a:bodyPr/>
                     <a:lstStyle/>
                     <a:p>
-                      <a:pPr indent="182880" algn="just">
-                        <a:lnSpc>
-                          <a:spcPct val="95000"/>
-                        </a:lnSpc>
-                        <a:spcAft>
-                          <a:spcPts val="600"/>
-                        </a:spcAft>
-                        <a:tabLst>
-                          <a:tab pos="182880" algn="l"/>
-                        </a:tabLst>
-                      </a:pPr>
-                      <a:r>
-                        <a:rPr lang="en-US" sz="4400" spc="-5">
-                          <a:effectLst/>
-                        </a:rPr>
-                        <a:t>1000 rows insertion</a:t>
-                      </a:r>
-                      <a:endParaRPr lang="ru-RU" sz="4400" spc="-5">
-                        <a:effectLst/>
-                        <a:latin typeface="Times New Roman" panose="02020603050405020304" pitchFamily="18" charset="0"/>
-                        <a:ea typeface="SimSun" panose="02010600030101010101" pitchFamily="2" charset="-122"/>
-                      </a:endParaRPr>
-                    </a:p>
-                  </a:txBody>
-                  <a:tcPr marL="68580" marR="68580" marT="0" marB="0"/>
-                </a:tc>
-                <a:tc>
-                  <a:txBody>
-                    <a:bodyPr/>
-                    <a:lstStyle/>
-                    <a:p>
-                      <a:pPr indent="182880" algn="just">
+                      <a:pPr indent="182880" algn="ctr">
                         <a:lnSpc>
                           <a:spcPct val="95000"/>
                         </a:lnSpc>
@@ -15800,7 +16433,7 @@
                         <a:rPr lang="en-US" sz="4400" spc="-5" dirty="0">
                           <a:effectLst/>
                         </a:rPr>
-                        <a:t>18113</a:t>
+                        <a:t>Last 500 rows deletion</a:t>
                       </a:r>
                       <a:endParaRPr lang="ru-RU" sz="4400" spc="-5" dirty="0">
                         <a:effectLst/>
@@ -15816,7 +16449,7 @@
                     <a:bodyPr/>
                     <a:lstStyle/>
                     <a:p>
-                      <a:pPr indent="182880" algn="just">
+                      <a:pPr indent="182880" algn="ctr">
                         <a:lnSpc>
                           <a:spcPct val="95000"/>
                         </a:lnSpc>
@@ -15831,7 +16464,38 @@
                         <a:rPr lang="en-US" sz="4400" spc="-5" dirty="0">
                           <a:effectLst/>
                         </a:rPr>
-                        <a:t>18.1</a:t>
+                        <a:t>8863</a:t>
+                      </a:r>
+                      <a:endParaRPr lang="ru-RU" sz="4400" spc="-5" dirty="0">
+                        <a:effectLst/>
+                        <a:latin typeface="Times New Roman" panose="02020603050405020304" pitchFamily="18" charset="0"/>
+                        <a:ea typeface="SimSun" panose="02010600030101010101" pitchFamily="2" charset="-122"/>
+                      </a:endParaRPr>
+                    </a:p>
+                  </a:txBody>
+                  <a:tcPr marL="68580" marR="68580" marT="0" marB="0"/>
+                </a:tc>
+                <a:tc>
+                  <a:txBody>
+                    <a:bodyPr/>
+                    <a:lstStyle/>
+                    <a:p>
+                      <a:pPr indent="182880" algn="ctr">
+                        <a:lnSpc>
+                          <a:spcPct val="95000"/>
+                        </a:lnSpc>
+                        <a:spcAft>
+                          <a:spcPts val="600"/>
+                        </a:spcAft>
+                        <a:tabLst>
+                          <a:tab pos="182880" algn="l"/>
+                        </a:tabLst>
+                      </a:pPr>
+                      <a:r>
+                        <a:rPr lang="en-US" sz="4400" spc="-5" dirty="0">
+                          <a:effectLst/>
+                        </a:rPr>
+                        <a:t>17.7</a:t>
                       </a:r>
                       <a:endParaRPr lang="ru-RU" sz="4400" spc="-5" dirty="0">
                         <a:effectLst/>
@@ -15848,99 +16512,13 @@
                   </a:ext>
                 </a:extLst>
               </a:tr>
-              <a:tr h="0">
+              <a:tr h="318516">
                 <a:tc>
                   <a:txBody>
                     <a:bodyPr/>
                     <a:lstStyle/>
                     <a:p>
-                      <a:pPr indent="182880" algn="just">
-                        <a:lnSpc>
-                          <a:spcPct val="95000"/>
-                        </a:lnSpc>
-                        <a:spcAft>
-                          <a:spcPts val="600"/>
-                        </a:spcAft>
-                        <a:tabLst>
-                          <a:tab pos="182880" algn="l"/>
-                        </a:tabLst>
-                      </a:pPr>
-                      <a:r>
-                        <a:rPr lang="en-US" sz="4400" spc="-5">
-                          <a:effectLst/>
-                        </a:rPr>
-                        <a:t>Next 4800 rows insertion (including the B</a:t>
-                      </a:r>
-                      <a:r>
-                        <a:rPr lang="en-US" sz="4400" spc="-5" baseline="30000">
-                          <a:effectLst/>
-                        </a:rPr>
-                        <a:t>+</a:t>
-                      </a:r>
-                      <a:r>
-                        <a:rPr lang="en-US" sz="4400" spc="-5">
-                          <a:effectLst/>
-                        </a:rPr>
-                        <a:t>-tree into the B</a:t>
-                      </a:r>
-                      <a:r>
-                        <a:rPr lang="en-US" sz="4400" spc="-5" baseline="30000">
-                          <a:effectLst/>
-                        </a:rPr>
-                        <a:t>*+</a:t>
-                      </a:r>
-                      <a:r>
-                        <a:rPr lang="en-US" sz="4400" spc="-5">
-                          <a:effectLst/>
-                        </a:rPr>
-                        <a:t>-tree rebuilding)</a:t>
-                      </a:r>
-                      <a:endParaRPr lang="ru-RU" sz="4400" spc="-5">
-                        <a:effectLst/>
-                        <a:latin typeface="Times New Roman" panose="02020603050405020304" pitchFamily="18" charset="0"/>
-                        <a:ea typeface="SimSun" panose="02010600030101010101" pitchFamily="2" charset="-122"/>
-                      </a:endParaRPr>
-                    </a:p>
-                  </a:txBody>
-                  <a:tcPr marL="68580" marR="68580" marT="0" marB="0"/>
-                </a:tc>
-                <a:tc>
-                  <a:txBody>
-                    <a:bodyPr/>
-                    <a:lstStyle/>
-                    <a:p>
-                      <a:pPr indent="182880" algn="just">
-                        <a:lnSpc>
-                          <a:spcPct val="95000"/>
-                        </a:lnSpc>
-                        <a:spcAft>
-                          <a:spcPts val="600"/>
-                        </a:spcAft>
-                        <a:tabLst>
-                          <a:tab pos="182880" algn="l"/>
-                        </a:tabLst>
-                      </a:pPr>
-                      <a:r>
-                        <a:rPr lang="en-US" sz="4400" spc="-5">
-                          <a:effectLst/>
-                        </a:rPr>
-                        <a:t>86465</a:t>
-                      </a:r>
-                      <a:endParaRPr lang="ru-RU" sz="4400" spc="-5">
-                        <a:effectLst/>
-                        <a:latin typeface="Times New Roman" panose="02020603050405020304" pitchFamily="18" charset="0"/>
-                        <a:ea typeface="SimSun" panose="02010600030101010101" pitchFamily="2" charset="-122"/>
-                      </a:endParaRPr>
-                    </a:p>
-                  </a:txBody>
-                  <a:tcPr marL="68580" marR="68580" marT="0" marB="0"/>
-                </a:tc>
-                <a:tc>
-                  <a:txBody>
-                    <a:bodyPr/>
-                    <a:lstStyle/>
-                    <a:p>
-                      <a:pPr indent="182880" algn="just">
+                      <a:pPr indent="182880" algn="ctr">
                         <a:lnSpc>
                           <a:spcPct val="95000"/>
                         </a:lnSpc>
@@ -15955,7 +16533,69 @@
                         <a:rPr lang="en-US" sz="4400" spc="-5" dirty="0">
                           <a:effectLst/>
                         </a:rPr>
-                        <a:t>18</a:t>
+                        <a:t>1000 rows insertion</a:t>
+                      </a:r>
+                      <a:endParaRPr lang="ru-RU" sz="4400" spc="-5" dirty="0">
+                        <a:effectLst/>
+                        <a:latin typeface="Times New Roman" panose="02020603050405020304" pitchFamily="18" charset="0"/>
+                        <a:ea typeface="SimSun" panose="02010600030101010101" pitchFamily="2" charset="-122"/>
+                      </a:endParaRPr>
+                    </a:p>
+                  </a:txBody>
+                  <a:tcPr marL="68580" marR="68580" marT="0" marB="0"/>
+                </a:tc>
+                <a:tc>
+                  <a:txBody>
+                    <a:bodyPr/>
+                    <a:lstStyle/>
+                    <a:p>
+                      <a:pPr indent="182880" algn="ctr">
+                        <a:lnSpc>
+                          <a:spcPct val="95000"/>
+                        </a:lnSpc>
+                        <a:spcAft>
+                          <a:spcPts val="600"/>
+                        </a:spcAft>
+                        <a:tabLst>
+                          <a:tab pos="182880" algn="l"/>
+                        </a:tabLst>
+                      </a:pPr>
+                      <a:r>
+                        <a:rPr lang="en-US" sz="4400" spc="-5" dirty="0">
+                          <a:effectLst/>
+                        </a:rPr>
+                        <a:t>18890</a:t>
+                      </a:r>
+                      <a:endParaRPr lang="ru-RU" sz="4400" spc="-5" dirty="0">
+                        <a:effectLst/>
+                        <a:latin typeface="Times New Roman" panose="02020603050405020304" pitchFamily="18" charset="0"/>
+                        <a:ea typeface="SimSun" panose="02010600030101010101" pitchFamily="2" charset="-122"/>
+                      </a:endParaRPr>
+                    </a:p>
+                  </a:txBody>
+                  <a:tcPr marL="68580" marR="68580" marT="0" marB="0"/>
+                </a:tc>
+                <a:tc>
+                  <a:txBody>
+                    <a:bodyPr/>
+                    <a:lstStyle/>
+                    <a:p>
+                      <a:pPr indent="182880" algn="ctr">
+                        <a:lnSpc>
+                          <a:spcPct val="95000"/>
+                        </a:lnSpc>
+                        <a:spcAft>
+                          <a:spcPts val="600"/>
+                        </a:spcAft>
+                        <a:tabLst>
+                          <a:tab pos="182880" algn="l"/>
+                        </a:tabLst>
+                      </a:pPr>
+                      <a:r>
+                        <a:rPr lang="en-US" sz="4400" spc="-5" dirty="0">
+                          <a:effectLst/>
+                        </a:rPr>
+                        <a:t>18.9</a:t>
                       </a:r>
                       <a:endParaRPr lang="ru-RU" sz="4400" spc="-5" dirty="0">
                         <a:effectLst/>
@@ -15969,6 +16609,196 @@
                 <a:extLst>
                   <a:ext uri="{0D108BD9-81ED-4DB2-BD59-A6C34878D82A}">
                     <a16:rowId xmlns:a16="http://schemas.microsoft.com/office/drawing/2014/main" val="3483311153"/>
+                  </a:ext>
+                </a:extLst>
+              </a:tr>
+              <a:tr h="318516">
+                <a:tc>
+                  <a:txBody>
+                    <a:bodyPr/>
+                    <a:lstStyle/>
+                    <a:p>
+                      <a:pPr indent="182880" algn="ctr">
+                        <a:lnSpc>
+                          <a:spcPct val="95000"/>
+                        </a:lnSpc>
+                        <a:spcAft>
+                          <a:spcPts val="600"/>
+                        </a:spcAft>
+                        <a:tabLst>
+                          <a:tab pos="182880" algn="l"/>
+                        </a:tabLst>
+                      </a:pPr>
+                      <a:r>
+                        <a:rPr lang="en-US" sz="4400" b="0" i="0" u="none" strike="noStrike" cap="none" spc="-5" baseline="0" dirty="0">
+                          <a:ln>
+                            <a:noFill/>
+                          </a:ln>
+                          <a:solidFill>
+                            <a:schemeClr val="tx1"/>
+                          </a:solidFill>
+                          <a:effectLst/>
+                          <a:uFillTx/>
+                          <a:latin typeface="+mn-lt"/>
+                          <a:ea typeface="+mn-ea"/>
+                          <a:cs typeface="+mn-cs"/>
+                          <a:sym typeface="Helvetica Light"/>
+                        </a:rPr>
+                        <a:t>Next 5000 rows insertion </a:t>
+                      </a:r>
+                      <a:r>
+                        <a:rPr lang="en-US" sz="4400" spc="-5" dirty="0">
+                          <a:effectLst/>
+                        </a:rPr>
+                        <a:t>(including the B</a:t>
+                      </a:r>
+                      <a:r>
+                        <a:rPr lang="en-US" sz="4400" spc="-5" baseline="30000" dirty="0">
+                          <a:effectLst/>
+                        </a:rPr>
+                        <a:t>*+</a:t>
+                      </a:r>
+                      <a:r>
+                        <a:rPr lang="en-US" sz="4400" spc="-5" dirty="0">
+                          <a:effectLst/>
+                        </a:rPr>
+                        <a:t>-tree into the B</a:t>
+                      </a:r>
+                      <a:r>
+                        <a:rPr lang="en-US" sz="4400" spc="-5" baseline="30000" dirty="0">
+                          <a:effectLst/>
+                        </a:rPr>
+                        <a:t>*</a:t>
+                      </a:r>
+                      <a:r>
+                        <a:rPr lang="en-US" sz="4400" spc="-5" dirty="0">
+                          <a:effectLst/>
+                        </a:rPr>
+                        <a:t>-tree rebuilding)</a:t>
+                      </a:r>
+                      <a:endParaRPr lang="ru-RU" sz="4400" b="0" i="0" u="none" strike="noStrike" cap="none" spc="-5" baseline="0" dirty="0">
+                        <a:ln>
+                          <a:noFill/>
+                        </a:ln>
+                        <a:solidFill>
+                          <a:schemeClr val="tx1"/>
+                        </a:solidFill>
+                        <a:effectLst/>
+                        <a:uFillTx/>
+                        <a:latin typeface="+mn-lt"/>
+                        <a:ea typeface="+mn-ea"/>
+                        <a:cs typeface="+mn-cs"/>
+                        <a:sym typeface="Helvetica Light"/>
+                      </a:endParaRPr>
+                    </a:p>
+                  </a:txBody>
+                  <a:tcPr marL="68580" marR="68580" marT="0" marB="0"/>
+                </a:tc>
+                <a:tc>
+                  <a:txBody>
+                    <a:bodyPr/>
+                    <a:lstStyle/>
+                    <a:p>
+                      <a:pPr indent="182880" algn="ctr">
+                        <a:lnSpc>
+                          <a:spcPct val="95000"/>
+                        </a:lnSpc>
+                        <a:spcAft>
+                          <a:spcPts val="600"/>
+                        </a:spcAft>
+                        <a:tabLst>
+                          <a:tab pos="182880" algn="l"/>
+                        </a:tabLst>
+                      </a:pPr>
+                      <a:r>
+                        <a:rPr lang="en-US" sz="4400" b="0" i="0" u="none" strike="noStrike" cap="none" spc="-5" baseline="0" dirty="0">
+                          <a:ln>
+                            <a:noFill/>
+                          </a:ln>
+                          <a:solidFill>
+                            <a:schemeClr val="tx1"/>
+                          </a:solidFill>
+                          <a:effectLst/>
+                          <a:uFillTx/>
+                          <a:latin typeface="+mn-lt"/>
+                          <a:ea typeface="+mn-ea"/>
+                          <a:cs typeface="+mn-cs"/>
+                          <a:sym typeface="Helvetica Light"/>
+                        </a:rPr>
+                        <a:t>92395</a:t>
+                      </a:r>
+                      <a:endParaRPr lang="ru-RU" sz="4400" b="0" i="0" u="none" strike="noStrike" cap="none" spc="-5" baseline="0" dirty="0">
+                        <a:ln>
+                          <a:noFill/>
+                        </a:ln>
+                        <a:solidFill>
+                          <a:schemeClr val="tx1"/>
+                        </a:solidFill>
+                        <a:effectLst/>
+                        <a:uFillTx/>
+                        <a:latin typeface="+mn-lt"/>
+                        <a:ea typeface="+mn-ea"/>
+                        <a:cs typeface="+mn-cs"/>
+                        <a:sym typeface="Helvetica Light"/>
+                      </a:endParaRPr>
+                    </a:p>
+                  </a:txBody>
+                  <a:tcPr marL="68580" marR="68580" marT="0" marB="0"/>
+                </a:tc>
+                <a:tc>
+                  <a:txBody>
+                    <a:bodyPr/>
+                    <a:lstStyle/>
+                    <a:p>
+                      <a:pPr indent="182880" algn="ctr">
+                        <a:lnSpc>
+                          <a:spcPct val="95000"/>
+                        </a:lnSpc>
+                        <a:spcAft>
+                          <a:spcPts val="600"/>
+                        </a:spcAft>
+                        <a:tabLst>
+                          <a:tab pos="182880" algn="l"/>
+                        </a:tabLst>
+                      </a:pPr>
+                      <a:r>
+                        <a:rPr lang="en-US" sz="4400" b="0" i="0" u="none" strike="noStrike" cap="none" spc="-5" baseline="0" dirty="0">
+                          <a:ln>
+                            <a:noFill/>
+                          </a:ln>
+                          <a:solidFill>
+                            <a:schemeClr val="tx1"/>
+                          </a:solidFill>
+                          <a:effectLst/>
+                          <a:uFillTx/>
+                          <a:latin typeface="+mn-lt"/>
+                          <a:ea typeface="+mn-ea"/>
+                          <a:cs typeface="+mn-cs"/>
+                          <a:sym typeface="Helvetica Light"/>
+                        </a:rPr>
+                        <a:t>18.5</a:t>
+                      </a:r>
+                      <a:endParaRPr lang="ru-RU" sz="4400" b="0" i="0" u="none" strike="noStrike" cap="none" spc="-5" baseline="0" dirty="0">
+                        <a:ln>
+                          <a:noFill/>
+                        </a:ln>
+                        <a:solidFill>
+                          <a:schemeClr val="tx1"/>
+                        </a:solidFill>
+                        <a:effectLst/>
+                        <a:uFillTx/>
+                        <a:latin typeface="+mn-lt"/>
+                        <a:ea typeface="+mn-ea"/>
+                        <a:cs typeface="+mn-cs"/>
+                        <a:sym typeface="Helvetica Light"/>
+                      </a:endParaRPr>
+                    </a:p>
+                  </a:txBody>
+                  <a:tcPr marL="68580" marR="68580" marT="0" marB="0"/>
+                </a:tc>
+                <a:extLst>
+                  <a:ext uri="{0D108BD9-81ED-4DB2-BD59-A6C34878D82A}">
+                    <a16:rowId xmlns:a16="http://schemas.microsoft.com/office/drawing/2014/main" val="1779453871"/>
                   </a:ext>
                 </a:extLst>
               </a:tr>
@@ -15990,7 +16820,7 @@
 </p:sld>
 </file>
 
-<file path=ppt/slides/slide25.xml><?xml version="1.0" encoding="utf-8"?>
+<file path=ppt/slides/slide26.xml><?xml version="1.0" encoding="utf-8"?>
 <p:sld xmlns:a="http://schemas.openxmlformats.org/drawingml/2006/main" xmlns:r="http://schemas.openxmlformats.org/officeDocument/2006/relationships" xmlns:p="http://schemas.openxmlformats.org/presentationml/2006/main">
   <p:cSld>
     <p:spTree>
@@ -16154,7 +16984,15 @@
             </a:r>
             <a:r>
               <a:rPr lang="en-US" sz="6600" dirty="0"/>
-              <a:t>-tree is faster than on the B-tree as expected</a:t>
+              <a:t>-tree was faster than on the B</a:t>
+            </a:r>
+            <a:r>
+              <a:rPr lang="en-US" sz="6600" baseline="30000" dirty="0"/>
+              <a:t>+</a:t>
+            </a:r>
+            <a:r>
+              <a:rPr lang="en-US" sz="6600" dirty="0"/>
+              <a:t>-tree</a:t>
             </a:r>
           </a:p>
           <a:p>
@@ -16177,19 +17015,11 @@
             </a:r>
             <a:r>
               <a:rPr lang="en-US" sz="6600" baseline="30000" dirty="0"/>
-              <a:t>+</a:t>
+              <a:t>*+</a:t>
             </a:r>
             <a:r>
               <a:rPr lang="en-US" sz="6600" dirty="0"/>
-              <a:t>-tree and B</a:t>
-            </a:r>
-            <a:r>
-              <a:rPr lang="en-US" sz="6600" baseline="30000" dirty="0"/>
-              <a:t>*+</a:t>
-            </a:r>
-            <a:r>
-              <a:rPr lang="en-US" sz="6600" dirty="0"/>
-              <a:t>-tree is faster than on the B-tree and B</a:t>
+              <a:t>-tree was faster than on the B</a:t>
             </a:r>
             <a:r>
               <a:rPr lang="en-US" sz="6600" baseline="30000" dirty="0"/>
@@ -16197,7 +17027,7 @@
             </a:r>
             <a:r>
               <a:rPr lang="en-US" sz="6600" dirty="0"/>
-              <a:t>-tree respectively</a:t>
+              <a:t>-tree</a:t>
             </a:r>
           </a:p>
           <a:p>
@@ -16220,7 +17050,7 @@
             </a:r>
             <a:r>
               <a:rPr lang="en-US" sz="6600" baseline="30000" dirty="0"/>
-              <a:t>*+</a:t>
+              <a:t>*</a:t>
             </a:r>
             <a:r>
               <a:rPr lang="en-US" sz="6600" dirty="0"/>
@@ -16228,11 +17058,38 @@
             </a:r>
             <a:r>
               <a:rPr lang="en-US" sz="6600" baseline="30000" dirty="0"/>
-              <a:t>+</a:t>
+              <a:t>*+</a:t>
             </a:r>
             <a:r>
               <a:rPr lang="en-US" sz="6600" dirty="0"/>
               <a:t>-tree</a:t>
+            </a:r>
+          </a:p>
+          <a:p>
+            <a:pPr marL="457200" indent="-457200" algn="l">
+              <a:buFont typeface="Arial" panose="020B0604020202020204" pitchFamily="34" charset="0"/>
+              <a:buChar char="•"/>
+              <a:defRPr sz="2800">
+                <a:solidFill>
+                  <a:srgbClr val="253957"/>
+                </a:solidFill>
+                <a:latin typeface="+mn-lt"/>
+                <a:ea typeface="+mn-ea"/>
+                <a:cs typeface="+mn-cs"/>
+                <a:sym typeface="Arial Narrow"/>
+              </a:defRPr>
+            </a:pPr>
+            <a:r>
+              <a:rPr lang="en-US" sz="6600" dirty="0"/>
+              <a:t>The search on the table takes about 1 </a:t>
+            </a:r>
+            <a:r>
+              <a:rPr lang="en-US" sz="6600" dirty="0" err="1"/>
+              <a:t>ms</a:t>
+            </a:r>
+            <a:r>
+              <a:rPr lang="en-US" sz="6600" dirty="0"/>
+              <a:t> on all the B-tree modifications considered in this work</a:t>
             </a:r>
           </a:p>
         </p:txBody>
@@ -16347,7 +17204,7 @@
                 </a:solidFill>
                 <a:latin typeface="+mn-lt"/>
               </a:rPr>
-              <a:t>25</a:t>
+              <a:t>26</a:t>
             </a:fld>
             <a:endParaRPr lang="ru-RU" sz="3200" dirty="0">
               <a:solidFill>
@@ -16372,7 +17229,7 @@
 </p:sld>
 </file>
 
-<file path=ppt/slides/slide26.xml><?xml version="1.0" encoding="utf-8"?>
+<file path=ppt/slides/slide27.xml><?xml version="1.0" encoding="utf-8"?>
 <p:sld xmlns:a="http://schemas.openxmlformats.org/drawingml/2006/main" xmlns:r="http://schemas.openxmlformats.org/officeDocument/2006/relationships" xmlns:p="http://schemas.openxmlformats.org/presentationml/2006/main">
   <p:cSld>
     <p:spTree>
@@ -16550,7 +17407,7 @@
             </a:pPr>
             <a:r>
               <a:rPr lang="en-US" sz="6600" dirty="0"/>
-              <a:t>Algorithm of selecting the best index structure is developed and implemented</a:t>
+              <a:t>Algorithm of selecting the index structure is developed and implemented</a:t>
             </a:r>
           </a:p>
           <a:p>
@@ -16569,7 +17426,7 @@
             </a:pPr>
             <a:r>
               <a:rPr lang="en-US" sz="6600" dirty="0"/>
-              <a:t>Experiment is conducted using the SQLite extension</a:t>
+              <a:t>Experiment on the trees performance is conducted using the developed SQLite extension</a:t>
             </a:r>
           </a:p>
           <a:p>
@@ -16700,7 +17557,7 @@
                 </a:solidFill>
                 <a:latin typeface="+mn-lt"/>
               </a:rPr>
-              <a:t>26</a:t>
+              <a:t>27</a:t>
             </a:fld>
             <a:endParaRPr lang="ru-RU" sz="3200" dirty="0">
               <a:solidFill>
@@ -16725,7 +17582,7 @@
 </p:sld>
 </file>
 
-<file path=ppt/slides/slide27.xml><?xml version="1.0" encoding="utf-8"?>
+<file path=ppt/slides/slide28.xml><?xml version="1.0" encoding="utf-8"?>
 <p:sld xmlns:a="http://schemas.openxmlformats.org/drawingml/2006/main" xmlns:r="http://schemas.openxmlformats.org/officeDocument/2006/relationships" xmlns:p="http://schemas.openxmlformats.org/presentationml/2006/main">
   <p:cSld>
     <p:spTree>
@@ -17129,7 +17986,7 @@
                 </a:solidFill>
                 <a:latin typeface="+mn-lt"/>
               </a:rPr>
-              <a:t>27</a:t>
+              <a:t>28</a:t>
             </a:fld>
             <a:endParaRPr lang="ru-RU" sz="3200" dirty="0">
               <a:solidFill>
@@ -17154,7 +18011,7 @@
 </p:sld>
 </file>
 
-<file path=ppt/slides/slide28.xml><?xml version="1.0" encoding="utf-8"?>
+<file path=ppt/slides/slide29.xml><?xml version="1.0" encoding="utf-8"?>
 <p:sld xmlns:a="http://schemas.openxmlformats.org/drawingml/2006/main" xmlns:r="http://schemas.openxmlformats.org/officeDocument/2006/relationships" xmlns:p="http://schemas.openxmlformats.org/presentationml/2006/main">
   <p:cSld>
     <p:spTree>

</xml_diff>

<commit_message>
#1122 SYRCoSE slides updated again
</commit_message>
<xml_diff>
--- a/root/docs/slides/Anton_Rigin_SYRCoSE_2019.pptx
+++ b/root/docs/slides/Anton_Rigin_SYRCoSE_2019.pptx
@@ -2111,7 +2111,7 @@
           </a:ln>
           <a:extLst>
             <a:ext uri="{C572A759-6A51-4108-AA02-DFA0A04FC94B}">
-              <ma14:wrappingTextBoxFlag xmlns:ma14="http://schemas.microsoft.com/office/mac/drawingml/2011/main" xmlns:a14="http://schemas.microsoft.com/office/drawing/2010/main" xmlns:m="http://schemas.openxmlformats.org/officeDocument/2006/math" xmlns="" val="1"/>
+              <ma14:wrappingTextBoxFlag xmlns="" xmlns:m="http://schemas.openxmlformats.org/officeDocument/2006/math" xmlns:a14="http://schemas.microsoft.com/office/drawing/2010/main" xmlns:ma14="http://schemas.microsoft.com/office/mac/drawingml/2011/main" val="1"/>
             </a:ext>
           </a:extLst>
         </p:spPr>
@@ -2150,7 +2150,7 @@
           </a:ln>
           <a:extLst>
             <a:ext uri="{C572A759-6A51-4108-AA02-DFA0A04FC94B}">
-              <ma14:wrappingTextBoxFlag xmlns:ma14="http://schemas.microsoft.com/office/mac/drawingml/2011/main" xmlns:a14="http://schemas.microsoft.com/office/drawing/2010/main" xmlns:m="http://schemas.openxmlformats.org/officeDocument/2006/math" xmlns="" val="1"/>
+              <ma14:wrappingTextBoxFlag xmlns="" xmlns:m="http://schemas.openxmlformats.org/officeDocument/2006/math" xmlns:a14="http://schemas.microsoft.com/office/drawing/2010/main" xmlns:ma14="http://schemas.microsoft.com/office/mac/drawingml/2011/main" val="1"/>
             </a:ext>
           </a:extLst>
         </p:spPr>
@@ -3110,7 +3110,7 @@
           </a:ln>
           <a:extLst>
             <a:ext uri="{C572A759-6A51-4108-AA02-DFA0A04FC94B}">
-              <ma14:wrappingTextBoxFlag xmlns:ma14="http://schemas.microsoft.com/office/mac/drawingml/2011/main" xmlns:a14="http://schemas.microsoft.com/office/drawing/2010/main" xmlns:m="http://schemas.openxmlformats.org/officeDocument/2006/math" xmlns="" val="1"/>
+              <ma14:wrappingTextBoxFlag xmlns="" xmlns:m="http://schemas.openxmlformats.org/officeDocument/2006/math" xmlns:a14="http://schemas.microsoft.com/office/drawing/2010/main" xmlns:ma14="http://schemas.microsoft.com/office/mac/drawingml/2011/main" val="1"/>
             </a:ext>
           </a:extLst>
         </p:spPr>
@@ -3155,7 +3155,7 @@
           </a:ln>
           <a:extLst>
             <a:ext uri="{C572A759-6A51-4108-AA02-DFA0A04FC94B}">
-              <ma14:wrappingTextBoxFlag xmlns:ma14="http://schemas.microsoft.com/office/mac/drawingml/2011/main" xmlns:a14="http://schemas.microsoft.com/office/drawing/2010/main" xmlns:m="http://schemas.openxmlformats.org/officeDocument/2006/math" xmlns="" val="1"/>
+              <ma14:wrappingTextBoxFlag xmlns="" xmlns:m="http://schemas.openxmlformats.org/officeDocument/2006/math" xmlns:a14="http://schemas.microsoft.com/office/drawing/2010/main" xmlns:ma14="http://schemas.microsoft.com/office/mac/drawingml/2011/main" val="1"/>
             </a:ext>
           </a:extLst>
         </p:spPr>
@@ -3247,7 +3247,7 @@
           </a:ln>
           <a:extLst>
             <a:ext uri="{C572A759-6A51-4108-AA02-DFA0A04FC94B}">
-              <ma14:wrappingTextBoxFlag xmlns:ma14="http://schemas.microsoft.com/office/mac/drawingml/2011/main" xmlns:a14="http://schemas.microsoft.com/office/drawing/2010/main" xmlns:m="http://schemas.openxmlformats.org/officeDocument/2006/math" xmlns="" val="1"/>
+              <ma14:wrappingTextBoxFlag xmlns="" xmlns:m="http://schemas.openxmlformats.org/officeDocument/2006/math" xmlns:a14="http://schemas.microsoft.com/office/drawing/2010/main" xmlns:ma14="http://schemas.microsoft.com/office/mac/drawingml/2011/main" val="1"/>
             </a:ext>
           </a:extLst>
         </p:spPr>
@@ -3311,7 +3311,7 @@
           </a:ln>
           <a:extLst>
             <a:ext uri="{C572A759-6A51-4108-AA02-DFA0A04FC94B}">
-              <ma14:wrappingTextBoxFlag xmlns:ma14="http://schemas.microsoft.com/office/mac/drawingml/2011/main" xmlns:a14="http://schemas.microsoft.com/office/drawing/2010/main" xmlns:m="http://schemas.openxmlformats.org/officeDocument/2006/math" xmlns="" val="1"/>
+              <ma14:wrappingTextBoxFlag xmlns="" xmlns:m="http://schemas.openxmlformats.org/officeDocument/2006/math" xmlns:a14="http://schemas.microsoft.com/office/drawing/2010/main" xmlns:ma14="http://schemas.microsoft.com/office/mac/drawingml/2011/main" val="1"/>
             </a:ext>
           </a:extLst>
         </p:spPr>
@@ -3451,7 +3451,7 @@
           </a:ln>
           <a:extLst>
             <a:ext uri="{C572A759-6A51-4108-AA02-DFA0A04FC94B}">
-              <ma14:wrappingTextBoxFlag xmlns:ma14="http://schemas.microsoft.com/office/mac/drawingml/2011/main" xmlns:a14="http://schemas.microsoft.com/office/drawing/2010/main" xmlns:m="http://schemas.openxmlformats.org/officeDocument/2006/math" xmlns="" val="1"/>
+              <ma14:wrappingTextBoxFlag xmlns="" xmlns:m="http://schemas.openxmlformats.org/officeDocument/2006/math" xmlns:a14="http://schemas.microsoft.com/office/drawing/2010/main" xmlns:ma14="http://schemas.microsoft.com/office/mac/drawingml/2011/main" val="1"/>
             </a:ext>
           </a:extLst>
         </p:spPr>
@@ -3500,7 +3500,7 @@
           </a:ln>
           <a:extLst>
             <a:ext uri="{C572A759-6A51-4108-AA02-DFA0A04FC94B}">
-              <ma14:wrappingTextBoxFlag xmlns:ma14="http://schemas.microsoft.com/office/mac/drawingml/2011/main" xmlns:a14="http://schemas.microsoft.com/office/drawing/2010/main" xmlns:m="http://schemas.openxmlformats.org/officeDocument/2006/math" xmlns="" val="1"/>
+              <ma14:wrappingTextBoxFlag xmlns="" xmlns:m="http://schemas.openxmlformats.org/officeDocument/2006/math" xmlns:a14="http://schemas.microsoft.com/office/drawing/2010/main" xmlns:ma14="http://schemas.microsoft.com/office/mac/drawingml/2011/main" val="1"/>
             </a:ext>
           </a:extLst>
         </p:spPr>
@@ -4095,7 +4095,7 @@
           </a:ln>
           <a:extLst>
             <a:ext uri="{C572A759-6A51-4108-AA02-DFA0A04FC94B}">
-              <ma14:wrappingTextBoxFlag xmlns:ma14="http://schemas.microsoft.com/office/mac/drawingml/2011/main" xmlns:a14="http://schemas.microsoft.com/office/drawing/2010/main" xmlns:m="http://schemas.openxmlformats.org/officeDocument/2006/math" xmlns="" val="1"/>
+              <ma14:wrappingTextBoxFlag xmlns="" xmlns:m="http://schemas.openxmlformats.org/officeDocument/2006/math" xmlns:a14="http://schemas.microsoft.com/office/drawing/2010/main" xmlns:ma14="http://schemas.microsoft.com/office/mac/drawingml/2011/main" val="1"/>
             </a:ext>
           </a:extLst>
         </p:spPr>
@@ -4144,7 +4144,7 @@
           </a:ln>
           <a:extLst>
             <a:ext uri="{C572A759-6A51-4108-AA02-DFA0A04FC94B}">
-              <ma14:wrappingTextBoxFlag xmlns:ma14="http://schemas.microsoft.com/office/mac/drawingml/2011/main" xmlns:a14="http://schemas.microsoft.com/office/drawing/2010/main" xmlns:m="http://schemas.openxmlformats.org/officeDocument/2006/math" xmlns="" val="1"/>
+              <ma14:wrappingTextBoxFlag xmlns="" xmlns:m="http://schemas.openxmlformats.org/officeDocument/2006/math" xmlns:a14="http://schemas.microsoft.com/office/drawing/2010/main" xmlns:ma14="http://schemas.microsoft.com/office/mac/drawingml/2011/main" val="1"/>
             </a:ext>
           </a:extLst>
         </p:spPr>
@@ -4778,7 +4778,7 @@
           </a:ln>
           <a:extLst>
             <a:ext uri="{C572A759-6A51-4108-AA02-DFA0A04FC94B}">
-              <ma14:wrappingTextBoxFlag xmlns:ma14="http://schemas.microsoft.com/office/mac/drawingml/2011/main" xmlns:a14="http://schemas.microsoft.com/office/drawing/2010/main" xmlns:m="http://schemas.openxmlformats.org/officeDocument/2006/math" xmlns="" val="1"/>
+              <ma14:wrappingTextBoxFlag xmlns="" xmlns:m="http://schemas.openxmlformats.org/officeDocument/2006/math" xmlns:a14="http://schemas.microsoft.com/office/drawing/2010/main" xmlns:ma14="http://schemas.microsoft.com/office/mac/drawingml/2011/main" val="1"/>
             </a:ext>
           </a:extLst>
         </p:spPr>
@@ -4827,7 +4827,7 @@
           </a:ln>
           <a:extLst>
             <a:ext uri="{C572A759-6A51-4108-AA02-DFA0A04FC94B}">
-              <ma14:wrappingTextBoxFlag xmlns:ma14="http://schemas.microsoft.com/office/mac/drawingml/2011/main" xmlns:a14="http://schemas.microsoft.com/office/drawing/2010/main" xmlns:m="http://schemas.openxmlformats.org/officeDocument/2006/math" xmlns="" val="1"/>
+              <ma14:wrappingTextBoxFlag xmlns="" xmlns:m="http://schemas.openxmlformats.org/officeDocument/2006/math" xmlns:a14="http://schemas.microsoft.com/office/drawing/2010/main" xmlns:ma14="http://schemas.microsoft.com/office/mac/drawingml/2011/main" val="1"/>
             </a:ext>
           </a:extLst>
         </p:spPr>
@@ -5422,7 +5422,7 @@
           </a:ln>
           <a:extLst>
             <a:ext uri="{C572A759-6A51-4108-AA02-DFA0A04FC94B}">
-              <ma14:wrappingTextBoxFlag xmlns:ma14="http://schemas.microsoft.com/office/mac/drawingml/2011/main" xmlns:a14="http://schemas.microsoft.com/office/drawing/2010/main" xmlns:m="http://schemas.openxmlformats.org/officeDocument/2006/math" xmlns="" val="1"/>
+              <ma14:wrappingTextBoxFlag xmlns="" xmlns:m="http://schemas.openxmlformats.org/officeDocument/2006/math" xmlns:a14="http://schemas.microsoft.com/office/drawing/2010/main" xmlns:ma14="http://schemas.microsoft.com/office/mac/drawingml/2011/main" val="1"/>
             </a:ext>
           </a:extLst>
         </p:spPr>
@@ -5471,7 +5471,7 @@
           </a:ln>
           <a:extLst>
             <a:ext uri="{C572A759-6A51-4108-AA02-DFA0A04FC94B}">
-              <ma14:wrappingTextBoxFlag xmlns:ma14="http://schemas.microsoft.com/office/mac/drawingml/2011/main" xmlns:a14="http://schemas.microsoft.com/office/drawing/2010/main" xmlns:m="http://schemas.openxmlformats.org/officeDocument/2006/math" xmlns="" val="1"/>
+              <ma14:wrappingTextBoxFlag xmlns="" xmlns:m="http://schemas.openxmlformats.org/officeDocument/2006/math" xmlns:a14="http://schemas.microsoft.com/office/drawing/2010/main" xmlns:ma14="http://schemas.microsoft.com/office/mac/drawingml/2011/main" val="1"/>
             </a:ext>
           </a:extLst>
         </p:spPr>
@@ -5739,7 +5739,7 @@
           </a:ln>
           <a:extLst>
             <a:ext uri="{C572A759-6A51-4108-AA02-DFA0A04FC94B}">
-              <ma14:wrappingTextBoxFlag xmlns:ma14="http://schemas.microsoft.com/office/mac/drawingml/2011/main" xmlns:a14="http://schemas.microsoft.com/office/drawing/2010/main" xmlns:m="http://schemas.openxmlformats.org/officeDocument/2006/math" xmlns="" val="1"/>
+              <ma14:wrappingTextBoxFlag xmlns="" xmlns:m="http://schemas.openxmlformats.org/officeDocument/2006/math" xmlns:a14="http://schemas.microsoft.com/office/drawing/2010/main" xmlns:ma14="http://schemas.microsoft.com/office/mac/drawingml/2011/main" val="1"/>
             </a:ext>
           </a:extLst>
         </p:spPr>
@@ -6227,7 +6227,7 @@
           </a:ln>
           <a:extLst>
             <a:ext uri="{C572A759-6A51-4108-AA02-DFA0A04FC94B}">
-              <ma14:wrappingTextBoxFlag xmlns:ma14="http://schemas.microsoft.com/office/mac/drawingml/2011/main" xmlns:a14="http://schemas.microsoft.com/office/drawing/2010/main" xmlns:m="http://schemas.openxmlformats.org/officeDocument/2006/math" xmlns="" val="1"/>
+              <ma14:wrappingTextBoxFlag xmlns="" xmlns:m="http://schemas.openxmlformats.org/officeDocument/2006/math" xmlns:a14="http://schemas.microsoft.com/office/drawing/2010/main" xmlns:ma14="http://schemas.microsoft.com/office/mac/drawingml/2011/main" val="1"/>
             </a:ext>
           </a:extLst>
         </p:spPr>
@@ -6276,7 +6276,7 @@
           </a:ln>
           <a:extLst>
             <a:ext uri="{C572A759-6A51-4108-AA02-DFA0A04FC94B}">
-              <ma14:wrappingTextBoxFlag xmlns:ma14="http://schemas.microsoft.com/office/mac/drawingml/2011/main" xmlns:a14="http://schemas.microsoft.com/office/drawing/2010/main" xmlns:m="http://schemas.openxmlformats.org/officeDocument/2006/math" xmlns="" val="1"/>
+              <ma14:wrappingTextBoxFlag xmlns="" xmlns:m="http://schemas.openxmlformats.org/officeDocument/2006/math" xmlns:a14="http://schemas.microsoft.com/office/drawing/2010/main" xmlns:ma14="http://schemas.microsoft.com/office/mac/drawingml/2011/main" val="1"/>
             </a:ext>
           </a:extLst>
         </p:spPr>
@@ -6358,7 +6358,7 @@
               <a:rPr lang="en-US" sz="6000" dirty="0">
                 <a:sym typeface="Arial Narrow"/>
               </a:rPr>
-              <a:t>To develop and implement an algorithm that would allow selecting the indexing data structure (B-tree, B</a:t>
+              <a:t>To develop and implement an algorithm that would allow selecting the indexing data structure (B</a:t>
             </a:r>
             <a:r>
               <a:rPr lang="en-US" sz="6000" baseline="30000" dirty="0">
@@ -6418,7 +6418,7 @@
           </a:ln>
           <a:extLst>
             <a:ext uri="{C572A759-6A51-4108-AA02-DFA0A04FC94B}">
-              <ma14:wrappingTextBoxFlag xmlns:ma14="http://schemas.microsoft.com/office/mac/drawingml/2011/main" xmlns:a14="http://schemas.microsoft.com/office/drawing/2010/main" xmlns:m="http://schemas.openxmlformats.org/officeDocument/2006/math" xmlns="" val="1"/>
+              <ma14:wrappingTextBoxFlag xmlns="" xmlns:m="http://schemas.openxmlformats.org/officeDocument/2006/math" xmlns:a14="http://schemas.microsoft.com/office/drawing/2010/main" xmlns:ma14="http://schemas.microsoft.com/office/mac/drawingml/2011/main" val="1"/>
             </a:ext>
           </a:extLst>
         </p:spPr>
@@ -6906,7 +6906,7 @@
           </a:ln>
           <a:extLst>
             <a:ext uri="{C572A759-6A51-4108-AA02-DFA0A04FC94B}">
-              <ma14:wrappingTextBoxFlag xmlns:ma14="http://schemas.microsoft.com/office/mac/drawingml/2011/main" xmlns:a14="http://schemas.microsoft.com/office/drawing/2010/main" xmlns:m="http://schemas.openxmlformats.org/officeDocument/2006/math" xmlns="" val="1"/>
+              <ma14:wrappingTextBoxFlag xmlns="" xmlns:m="http://schemas.openxmlformats.org/officeDocument/2006/math" xmlns:a14="http://schemas.microsoft.com/office/drawing/2010/main" xmlns:ma14="http://schemas.microsoft.com/office/mac/drawingml/2011/main" val="1"/>
             </a:ext>
           </a:extLst>
         </p:spPr>
@@ -6955,7 +6955,7 @@
           </a:ln>
           <a:extLst>
             <a:ext uri="{C572A759-6A51-4108-AA02-DFA0A04FC94B}">
-              <ma14:wrappingTextBoxFlag xmlns:ma14="http://schemas.microsoft.com/office/mac/drawingml/2011/main" xmlns:a14="http://schemas.microsoft.com/office/drawing/2010/main" xmlns:m="http://schemas.openxmlformats.org/officeDocument/2006/math" xmlns="" val="1"/>
+              <ma14:wrappingTextBoxFlag xmlns="" xmlns:m="http://schemas.openxmlformats.org/officeDocument/2006/math" xmlns:a14="http://schemas.microsoft.com/office/drawing/2010/main" xmlns:ma14="http://schemas.microsoft.com/office/mac/drawingml/2011/main" val="1"/>
             </a:ext>
           </a:extLst>
         </p:spPr>
@@ -6980,7 +6980,7 @@
               <a:rPr lang="en-US" sz="4800" dirty="0">
                 <a:sym typeface="Arial Narrow"/>
               </a:rPr>
-              <a:t>Selects from the B-tree and its modifications (B</a:t>
+              <a:t>Selects from the B-tree modifications (B</a:t>
             </a:r>
             <a:r>
               <a:rPr lang="en-US" sz="4800" baseline="30000" dirty="0">
@@ -7160,7 +7160,7 @@
           </a:ln>
           <a:extLst>
             <a:ext uri="{C572A759-6A51-4108-AA02-DFA0A04FC94B}">
-              <ma14:wrappingTextBoxFlag xmlns:ma14="http://schemas.microsoft.com/office/mac/drawingml/2011/main" xmlns:a14="http://schemas.microsoft.com/office/drawing/2010/main" xmlns:m="http://schemas.openxmlformats.org/officeDocument/2006/math" xmlns="" val="1"/>
+              <ma14:wrappingTextBoxFlag xmlns="" xmlns:m="http://schemas.openxmlformats.org/officeDocument/2006/math" xmlns:a14="http://schemas.microsoft.com/office/drawing/2010/main" xmlns:ma14="http://schemas.microsoft.com/office/mac/drawingml/2011/main" val="1"/>
             </a:ext>
           </a:extLst>
         </p:spPr>
@@ -7648,7 +7648,7 @@
           </a:ln>
           <a:extLst>
             <a:ext uri="{C572A759-6A51-4108-AA02-DFA0A04FC94B}">
-              <ma14:wrappingTextBoxFlag xmlns:ma14="http://schemas.microsoft.com/office/mac/drawingml/2011/main" xmlns:a14="http://schemas.microsoft.com/office/drawing/2010/main" xmlns:m="http://schemas.openxmlformats.org/officeDocument/2006/math" xmlns="" val="1"/>
+              <ma14:wrappingTextBoxFlag xmlns="" xmlns:m="http://schemas.openxmlformats.org/officeDocument/2006/math" xmlns:a14="http://schemas.microsoft.com/office/drawing/2010/main" xmlns:ma14="http://schemas.microsoft.com/office/mac/drawingml/2011/main" val="1"/>
             </a:ext>
           </a:extLst>
         </p:spPr>
@@ -7697,7 +7697,7 @@
           </a:ln>
           <a:extLst>
             <a:ext uri="{C572A759-6A51-4108-AA02-DFA0A04FC94B}">
-              <ma14:wrappingTextBoxFlag xmlns:ma14="http://schemas.microsoft.com/office/mac/drawingml/2011/main" xmlns:a14="http://schemas.microsoft.com/office/drawing/2010/main" xmlns:m="http://schemas.openxmlformats.org/officeDocument/2006/math" xmlns="" val="1"/>
+              <ma14:wrappingTextBoxFlag xmlns="" xmlns:m="http://schemas.openxmlformats.org/officeDocument/2006/math" xmlns:a14="http://schemas.microsoft.com/office/drawing/2010/main" xmlns:ma14="http://schemas.microsoft.com/office/mac/drawingml/2011/main" val="1"/>
             </a:ext>
           </a:extLst>
         </p:spPr>
@@ -8130,7 +8130,7 @@
               </a:ln>
               <a:extLst>
                 <a:ext uri="{C572A759-6A51-4108-AA02-DFA0A04FC94B}">
-                  <ma14:wrappingTextBoxFlag xmlns="" xmlns:m="http://schemas.openxmlformats.org/officeDocument/2006/math" xmlns:ma14="http://schemas.microsoft.com/office/mac/drawingml/2011/main" val="1"/>
+                  <ma14:wrappingTextBoxFlag xmlns:ma14="http://schemas.microsoft.com/office/mac/drawingml/2011/main" xmlns:m="http://schemas.openxmlformats.org/officeDocument/2006/math" xmlns="" val="1"/>
                 </a:ext>
               </a:extLst>
             </p:spPr>
@@ -8477,7 +8477,7 @@
           </a:ln>
           <a:extLst>
             <a:ext uri="{C572A759-6A51-4108-AA02-DFA0A04FC94B}">
-              <ma14:wrappingTextBoxFlag xmlns:ma14="http://schemas.microsoft.com/office/mac/drawingml/2011/main" xmlns:a14="http://schemas.microsoft.com/office/drawing/2010/main" xmlns:m="http://schemas.openxmlformats.org/officeDocument/2006/math" xmlns="" val="1"/>
+              <ma14:wrappingTextBoxFlag xmlns="" xmlns:m="http://schemas.openxmlformats.org/officeDocument/2006/math" xmlns:a14="http://schemas.microsoft.com/office/drawing/2010/main" xmlns:ma14="http://schemas.microsoft.com/office/mac/drawingml/2011/main" val="1"/>
             </a:ext>
           </a:extLst>
         </p:spPr>
@@ -8526,7 +8526,7 @@
           </a:ln>
           <a:extLst>
             <a:ext uri="{C572A759-6A51-4108-AA02-DFA0A04FC94B}">
-              <ma14:wrappingTextBoxFlag xmlns:ma14="http://schemas.microsoft.com/office/mac/drawingml/2011/main" xmlns:a14="http://schemas.microsoft.com/office/drawing/2010/main" xmlns:m="http://schemas.openxmlformats.org/officeDocument/2006/math" xmlns="" val="1"/>
+              <ma14:wrappingTextBoxFlag xmlns="" xmlns:m="http://schemas.openxmlformats.org/officeDocument/2006/math" xmlns:a14="http://schemas.microsoft.com/office/drawing/2010/main" xmlns:ma14="http://schemas.microsoft.com/office/mac/drawingml/2011/main" val="1"/>
             </a:ext>
           </a:extLst>
         </p:spPr>
@@ -9050,7 +9050,7 @@
           </a:ln>
           <a:extLst>
             <a:ext uri="{C572A759-6A51-4108-AA02-DFA0A04FC94B}">
-              <ma14:wrappingTextBoxFlag xmlns:ma14="http://schemas.microsoft.com/office/mac/drawingml/2011/main" xmlns:a14="http://schemas.microsoft.com/office/drawing/2010/main" xmlns:m="http://schemas.openxmlformats.org/officeDocument/2006/math" xmlns="" val="1"/>
+              <ma14:wrappingTextBoxFlag xmlns="" xmlns:m="http://schemas.openxmlformats.org/officeDocument/2006/math" xmlns:a14="http://schemas.microsoft.com/office/drawing/2010/main" xmlns:ma14="http://schemas.microsoft.com/office/mac/drawingml/2011/main" val="1"/>
             </a:ext>
           </a:extLst>
         </p:spPr>
@@ -9099,7 +9099,7 @@
           </a:ln>
           <a:extLst>
             <a:ext uri="{C572A759-6A51-4108-AA02-DFA0A04FC94B}">
-              <ma14:wrappingTextBoxFlag xmlns:ma14="http://schemas.microsoft.com/office/mac/drawingml/2011/main" xmlns:a14="http://schemas.microsoft.com/office/drawing/2010/main" xmlns:m="http://schemas.openxmlformats.org/officeDocument/2006/math" xmlns="" val="1"/>
+              <ma14:wrappingTextBoxFlag xmlns="" xmlns:m="http://schemas.openxmlformats.org/officeDocument/2006/math" xmlns:a14="http://schemas.microsoft.com/office/drawing/2010/main" xmlns:ma14="http://schemas.microsoft.com/office/mac/drawingml/2011/main" val="1"/>
             </a:ext>
           </a:extLst>
         </p:spPr>
@@ -11743,7 +11743,7 @@
           </a:ln>
           <a:extLst>
             <a:ext uri="{C572A759-6A51-4108-AA02-DFA0A04FC94B}">
-              <ma14:wrappingTextBoxFlag xmlns:ma14="http://schemas.microsoft.com/office/mac/drawingml/2011/main" xmlns:a14="http://schemas.microsoft.com/office/drawing/2010/main" xmlns:m="http://schemas.openxmlformats.org/officeDocument/2006/math" xmlns="" val="1"/>
+              <ma14:wrappingTextBoxFlag xmlns="" xmlns:m="http://schemas.openxmlformats.org/officeDocument/2006/math" xmlns:a14="http://schemas.microsoft.com/office/drawing/2010/main" xmlns:ma14="http://schemas.microsoft.com/office/mac/drawingml/2011/main" val="1"/>
             </a:ext>
           </a:extLst>
         </p:spPr>
@@ -11792,7 +11792,7 @@
           </a:ln>
           <a:extLst>
             <a:ext uri="{C572A759-6A51-4108-AA02-DFA0A04FC94B}">
-              <ma14:wrappingTextBoxFlag xmlns:ma14="http://schemas.microsoft.com/office/mac/drawingml/2011/main" xmlns:a14="http://schemas.microsoft.com/office/drawing/2010/main" xmlns:m="http://schemas.openxmlformats.org/officeDocument/2006/math" xmlns="" val="1"/>
+              <ma14:wrappingTextBoxFlag xmlns="" xmlns:m="http://schemas.openxmlformats.org/officeDocument/2006/math" xmlns:a14="http://schemas.microsoft.com/office/drawing/2010/main" xmlns:ma14="http://schemas.microsoft.com/office/mac/drawingml/2011/main" val="1"/>
             </a:ext>
           </a:extLst>
         </p:spPr>
@@ -12263,7 +12263,7 @@
           </a:ln>
           <a:extLst>
             <a:ext uri="{C572A759-6A51-4108-AA02-DFA0A04FC94B}">
-              <ma14:wrappingTextBoxFlag xmlns:ma14="http://schemas.microsoft.com/office/mac/drawingml/2011/main" xmlns:a14="http://schemas.microsoft.com/office/drawing/2010/main" xmlns:m="http://schemas.openxmlformats.org/officeDocument/2006/math" xmlns="" val="1"/>
+              <ma14:wrappingTextBoxFlag xmlns="" xmlns:m="http://schemas.openxmlformats.org/officeDocument/2006/math" xmlns:a14="http://schemas.microsoft.com/office/drawing/2010/main" xmlns:ma14="http://schemas.microsoft.com/office/mac/drawingml/2011/main" val="1"/>
             </a:ext>
           </a:extLst>
         </p:spPr>
@@ -12312,7 +12312,7 @@
           </a:ln>
           <a:extLst>
             <a:ext uri="{C572A759-6A51-4108-AA02-DFA0A04FC94B}">
-              <ma14:wrappingTextBoxFlag xmlns:ma14="http://schemas.microsoft.com/office/mac/drawingml/2011/main" xmlns:a14="http://schemas.microsoft.com/office/drawing/2010/main" xmlns:m="http://schemas.openxmlformats.org/officeDocument/2006/math" xmlns="" val="1"/>
+              <ma14:wrappingTextBoxFlag xmlns="" xmlns:m="http://schemas.openxmlformats.org/officeDocument/2006/math" xmlns:a14="http://schemas.microsoft.com/office/drawing/2010/main" xmlns:ma14="http://schemas.microsoft.com/office/mac/drawingml/2011/main" val="1"/>
             </a:ext>
           </a:extLst>
         </p:spPr>
@@ -12508,7 +12508,7 @@
           </a:ln>
           <a:extLst>
             <a:ext uri="{C572A759-6A51-4108-AA02-DFA0A04FC94B}">
-              <ma14:wrappingTextBoxFlag xmlns:ma14="http://schemas.microsoft.com/office/mac/drawingml/2011/main" xmlns:a14="http://schemas.microsoft.com/office/drawing/2010/main" xmlns:m="http://schemas.openxmlformats.org/officeDocument/2006/math" xmlns="" val="1"/>
+              <ma14:wrappingTextBoxFlag xmlns="" xmlns:m="http://schemas.openxmlformats.org/officeDocument/2006/math" xmlns:a14="http://schemas.microsoft.com/office/drawing/2010/main" xmlns:ma14="http://schemas.microsoft.com/office/mac/drawingml/2011/main" val="1"/>
             </a:ext>
           </a:extLst>
         </p:spPr>
@@ -12692,7 +12692,7 @@
           </a:ln>
           <a:extLst>
             <a:ext uri="{C572A759-6A51-4108-AA02-DFA0A04FC94B}">
-              <ma14:wrappingTextBoxFlag xmlns:ma14="http://schemas.microsoft.com/office/mac/drawingml/2011/main" xmlns:a14="http://schemas.microsoft.com/office/drawing/2010/main" xmlns:m="http://schemas.openxmlformats.org/officeDocument/2006/math" xmlns="" val="1"/>
+              <ma14:wrappingTextBoxFlag xmlns="" xmlns:m="http://schemas.openxmlformats.org/officeDocument/2006/math" xmlns:a14="http://schemas.microsoft.com/office/drawing/2010/main" xmlns:ma14="http://schemas.microsoft.com/office/mac/drawingml/2011/main" val="1"/>
             </a:ext>
           </a:extLst>
         </p:spPr>
@@ -12741,7 +12741,7 @@
           </a:ln>
           <a:extLst>
             <a:ext uri="{C572A759-6A51-4108-AA02-DFA0A04FC94B}">
-              <ma14:wrappingTextBoxFlag xmlns:ma14="http://schemas.microsoft.com/office/mac/drawingml/2011/main" xmlns:a14="http://schemas.microsoft.com/office/drawing/2010/main" xmlns:m="http://schemas.openxmlformats.org/officeDocument/2006/math" xmlns="" val="1"/>
+              <ma14:wrappingTextBoxFlag xmlns="" xmlns:m="http://schemas.openxmlformats.org/officeDocument/2006/math" xmlns:a14="http://schemas.microsoft.com/office/drawing/2010/main" xmlns:ma14="http://schemas.microsoft.com/office/mac/drawingml/2011/main" val="1"/>
             </a:ext>
           </a:extLst>
         </p:spPr>
@@ -12974,7 +12974,7 @@
           </a:ln>
           <a:extLst>
             <a:ext uri="{C572A759-6A51-4108-AA02-DFA0A04FC94B}">
-              <ma14:wrappingTextBoxFlag xmlns:ma14="http://schemas.microsoft.com/office/mac/drawingml/2011/main" xmlns:a14="http://schemas.microsoft.com/office/drawing/2010/main" xmlns:m="http://schemas.openxmlformats.org/officeDocument/2006/math" xmlns="" val="1"/>
+              <ma14:wrappingTextBoxFlag xmlns="" xmlns:m="http://schemas.openxmlformats.org/officeDocument/2006/math" xmlns:a14="http://schemas.microsoft.com/office/drawing/2010/main" xmlns:ma14="http://schemas.microsoft.com/office/mac/drawingml/2011/main" val="1"/>
             </a:ext>
           </a:extLst>
         </p:spPr>
@@ -13158,7 +13158,7 @@
           </a:ln>
           <a:extLst>
             <a:ext uri="{C572A759-6A51-4108-AA02-DFA0A04FC94B}">
-              <ma14:wrappingTextBoxFlag xmlns:ma14="http://schemas.microsoft.com/office/mac/drawingml/2011/main" xmlns:a14="http://schemas.microsoft.com/office/drawing/2010/main" xmlns:m="http://schemas.openxmlformats.org/officeDocument/2006/math" xmlns="" val="1"/>
+              <ma14:wrappingTextBoxFlag xmlns="" xmlns:m="http://schemas.openxmlformats.org/officeDocument/2006/math" xmlns:a14="http://schemas.microsoft.com/office/drawing/2010/main" xmlns:ma14="http://schemas.microsoft.com/office/mac/drawingml/2011/main" val="1"/>
             </a:ext>
           </a:extLst>
         </p:spPr>
@@ -13207,7 +13207,7 @@
           </a:ln>
           <a:extLst>
             <a:ext uri="{C572A759-6A51-4108-AA02-DFA0A04FC94B}">
-              <ma14:wrappingTextBoxFlag xmlns:ma14="http://schemas.microsoft.com/office/mac/drawingml/2011/main" xmlns:a14="http://schemas.microsoft.com/office/drawing/2010/main" xmlns:m="http://schemas.openxmlformats.org/officeDocument/2006/math" xmlns="" val="1"/>
+              <ma14:wrappingTextBoxFlag xmlns="" xmlns:m="http://schemas.openxmlformats.org/officeDocument/2006/math" xmlns:a14="http://schemas.microsoft.com/office/drawing/2010/main" xmlns:ma14="http://schemas.microsoft.com/office/mac/drawingml/2011/main" val="1"/>
             </a:ext>
           </a:extLst>
         </p:spPr>
@@ -13735,7 +13735,7 @@
           </a:ln>
           <a:extLst>
             <a:ext uri="{C572A759-6A51-4108-AA02-DFA0A04FC94B}">
-              <ma14:wrappingTextBoxFlag xmlns:ma14="http://schemas.microsoft.com/office/mac/drawingml/2011/main" xmlns:a14="http://schemas.microsoft.com/office/drawing/2010/main" xmlns:m="http://schemas.openxmlformats.org/officeDocument/2006/math" xmlns="" val="1"/>
+              <ma14:wrappingTextBoxFlag xmlns="" xmlns:m="http://schemas.openxmlformats.org/officeDocument/2006/math" xmlns:a14="http://schemas.microsoft.com/office/drawing/2010/main" xmlns:ma14="http://schemas.microsoft.com/office/mac/drawingml/2011/main" val="1"/>
             </a:ext>
           </a:extLst>
         </p:spPr>
@@ -13784,7 +13784,7 @@
           </a:ln>
           <a:extLst>
             <a:ext uri="{C572A759-6A51-4108-AA02-DFA0A04FC94B}">
-              <ma14:wrappingTextBoxFlag xmlns:ma14="http://schemas.microsoft.com/office/mac/drawingml/2011/main" xmlns:a14="http://schemas.microsoft.com/office/drawing/2010/main" xmlns:m="http://schemas.openxmlformats.org/officeDocument/2006/math" xmlns="" val="1"/>
+              <ma14:wrappingTextBoxFlag xmlns="" xmlns:m="http://schemas.openxmlformats.org/officeDocument/2006/math" xmlns:a14="http://schemas.microsoft.com/office/drawing/2010/main" xmlns:ma14="http://schemas.microsoft.com/office/mac/drawingml/2011/main" val="1"/>
             </a:ext>
           </a:extLst>
         </p:spPr>
@@ -14354,7 +14354,7 @@
           </a:ln>
           <a:extLst>
             <a:ext uri="{C572A759-6A51-4108-AA02-DFA0A04FC94B}">
-              <ma14:wrappingTextBoxFlag xmlns:ma14="http://schemas.microsoft.com/office/mac/drawingml/2011/main" xmlns:a14="http://schemas.microsoft.com/office/drawing/2010/main" xmlns:m="http://schemas.openxmlformats.org/officeDocument/2006/math" xmlns="" val="1"/>
+              <ma14:wrappingTextBoxFlag xmlns="" xmlns:m="http://schemas.openxmlformats.org/officeDocument/2006/math" xmlns:a14="http://schemas.microsoft.com/office/drawing/2010/main" xmlns:ma14="http://schemas.microsoft.com/office/mac/drawingml/2011/main" val="1"/>
             </a:ext>
           </a:extLst>
         </p:spPr>
@@ -14403,7 +14403,7 @@
           </a:ln>
           <a:extLst>
             <a:ext uri="{C572A759-6A51-4108-AA02-DFA0A04FC94B}">
-              <ma14:wrappingTextBoxFlag xmlns:ma14="http://schemas.microsoft.com/office/mac/drawingml/2011/main" xmlns:a14="http://schemas.microsoft.com/office/drawing/2010/main" xmlns:m="http://schemas.openxmlformats.org/officeDocument/2006/math" xmlns="" val="1"/>
+              <ma14:wrappingTextBoxFlag xmlns="" xmlns:m="http://schemas.openxmlformats.org/officeDocument/2006/math" xmlns:a14="http://schemas.microsoft.com/office/drawing/2010/main" xmlns:ma14="http://schemas.microsoft.com/office/mac/drawingml/2011/main" val="1"/>
             </a:ext>
           </a:extLst>
         </p:spPr>
@@ -14626,7 +14626,7 @@
           </a:ln>
           <a:extLst>
             <a:ext uri="{C572A759-6A51-4108-AA02-DFA0A04FC94B}">
-              <ma14:wrappingTextBoxFlag xmlns:ma14="http://schemas.microsoft.com/office/mac/drawingml/2011/main" xmlns:a14="http://schemas.microsoft.com/office/drawing/2010/main" xmlns:m="http://schemas.openxmlformats.org/officeDocument/2006/math" xmlns="" val="1"/>
+              <ma14:wrappingTextBoxFlag xmlns="" xmlns:m="http://schemas.openxmlformats.org/officeDocument/2006/math" xmlns:a14="http://schemas.microsoft.com/office/drawing/2010/main" xmlns:ma14="http://schemas.microsoft.com/office/mac/drawingml/2011/main" val="1"/>
             </a:ext>
           </a:extLst>
         </p:spPr>
@@ -14691,7 +14691,7 @@
           </a:ln>
           <a:extLst>
             <a:ext uri="{C572A759-6A51-4108-AA02-DFA0A04FC94B}">
-              <ma14:wrappingTextBoxFlag xmlns:ma14="http://schemas.microsoft.com/office/mac/drawingml/2011/main" xmlns:a14="http://schemas.microsoft.com/office/drawing/2010/main" xmlns:m="http://schemas.openxmlformats.org/officeDocument/2006/math" xmlns="" val="1"/>
+              <ma14:wrappingTextBoxFlag xmlns="" xmlns:m="http://schemas.openxmlformats.org/officeDocument/2006/math" xmlns:a14="http://schemas.microsoft.com/office/drawing/2010/main" xmlns:ma14="http://schemas.microsoft.com/office/mac/drawingml/2011/main" val="1"/>
             </a:ext>
           </a:extLst>
         </p:spPr>
@@ -15680,7 +15680,7 @@
           </a:ln>
           <a:extLst>
             <a:ext uri="{C572A759-6A51-4108-AA02-DFA0A04FC94B}">
-              <ma14:wrappingTextBoxFlag xmlns:ma14="http://schemas.microsoft.com/office/mac/drawingml/2011/main" xmlns:a14="http://schemas.microsoft.com/office/drawing/2010/main" xmlns:m="http://schemas.openxmlformats.org/officeDocument/2006/math" xmlns="" val="1"/>
+              <ma14:wrappingTextBoxFlag xmlns="" xmlns:m="http://schemas.openxmlformats.org/officeDocument/2006/math" xmlns:a14="http://schemas.microsoft.com/office/drawing/2010/main" xmlns:ma14="http://schemas.microsoft.com/office/mac/drawingml/2011/main" val="1"/>
             </a:ext>
           </a:extLst>
         </p:spPr>
@@ -15745,7 +15745,7 @@
           </a:ln>
           <a:extLst>
             <a:ext uri="{C572A759-6A51-4108-AA02-DFA0A04FC94B}">
-              <ma14:wrappingTextBoxFlag xmlns:ma14="http://schemas.microsoft.com/office/mac/drawingml/2011/main" xmlns:a14="http://schemas.microsoft.com/office/drawing/2010/main" xmlns:m="http://schemas.openxmlformats.org/officeDocument/2006/math" xmlns="" val="1"/>
+              <ma14:wrappingTextBoxFlag xmlns="" xmlns:m="http://schemas.openxmlformats.org/officeDocument/2006/math" xmlns:a14="http://schemas.microsoft.com/office/drawing/2010/main" xmlns:ma14="http://schemas.microsoft.com/office/mac/drawingml/2011/main" val="1"/>
             </a:ext>
           </a:extLst>
         </p:spPr>
@@ -16924,7 +16924,7 @@
           </a:ln>
           <a:extLst>
             <a:ext uri="{C572A759-6A51-4108-AA02-DFA0A04FC94B}">
-              <ma14:wrappingTextBoxFlag xmlns:ma14="http://schemas.microsoft.com/office/mac/drawingml/2011/main" xmlns:a14="http://schemas.microsoft.com/office/drawing/2010/main" xmlns:m="http://schemas.openxmlformats.org/officeDocument/2006/math" xmlns="" val="1"/>
+              <ma14:wrappingTextBoxFlag xmlns="" xmlns:m="http://schemas.openxmlformats.org/officeDocument/2006/math" xmlns:a14="http://schemas.microsoft.com/office/drawing/2010/main" xmlns:ma14="http://schemas.microsoft.com/office/mac/drawingml/2011/main" val="1"/>
             </a:ext>
           </a:extLst>
         </p:spPr>
@@ -16989,7 +16989,7 @@
           </a:ln>
           <a:extLst>
             <a:ext uri="{C572A759-6A51-4108-AA02-DFA0A04FC94B}">
-              <ma14:wrappingTextBoxFlag xmlns:ma14="http://schemas.microsoft.com/office/mac/drawingml/2011/main" xmlns:a14="http://schemas.microsoft.com/office/drawing/2010/main" xmlns:m="http://schemas.openxmlformats.org/officeDocument/2006/math" xmlns="" val="1"/>
+              <ma14:wrappingTextBoxFlag xmlns="" xmlns:m="http://schemas.openxmlformats.org/officeDocument/2006/math" xmlns:a14="http://schemas.microsoft.com/office/drawing/2010/main" xmlns:ma14="http://schemas.microsoft.com/office/mac/drawingml/2011/main" val="1"/>
             </a:ext>
           </a:extLst>
         </p:spPr>
@@ -17149,7 +17149,7 @@
           </a:ln>
           <a:extLst>
             <a:ext uri="{C572A759-6A51-4108-AA02-DFA0A04FC94B}">
-              <ma14:wrappingTextBoxFlag xmlns:ma14="http://schemas.microsoft.com/office/mac/drawingml/2011/main" xmlns:a14="http://schemas.microsoft.com/office/drawing/2010/main" xmlns:m="http://schemas.openxmlformats.org/officeDocument/2006/math" xmlns="" val="1"/>
+              <ma14:wrappingTextBoxFlag xmlns="" xmlns:m="http://schemas.openxmlformats.org/officeDocument/2006/math" xmlns:a14="http://schemas.microsoft.com/office/drawing/2010/main" xmlns:ma14="http://schemas.microsoft.com/office/mac/drawingml/2011/main" val="1"/>
             </a:ext>
           </a:extLst>
         </p:spPr>
@@ -17333,7 +17333,7 @@
           </a:ln>
           <a:extLst>
             <a:ext uri="{C572A759-6A51-4108-AA02-DFA0A04FC94B}">
-              <ma14:wrappingTextBoxFlag xmlns:ma14="http://schemas.microsoft.com/office/mac/drawingml/2011/main" xmlns:a14="http://schemas.microsoft.com/office/drawing/2010/main" xmlns:m="http://schemas.openxmlformats.org/officeDocument/2006/math" xmlns="" val="1"/>
+              <ma14:wrappingTextBoxFlag xmlns="" xmlns:m="http://schemas.openxmlformats.org/officeDocument/2006/math" xmlns:a14="http://schemas.microsoft.com/office/drawing/2010/main" xmlns:ma14="http://schemas.microsoft.com/office/mac/drawingml/2011/main" val="1"/>
             </a:ext>
           </a:extLst>
         </p:spPr>
@@ -17382,7 +17382,7 @@
           </a:ln>
           <a:extLst>
             <a:ext uri="{C572A759-6A51-4108-AA02-DFA0A04FC94B}">
-              <ma14:wrappingTextBoxFlag xmlns:ma14="http://schemas.microsoft.com/office/mac/drawingml/2011/main" xmlns:a14="http://schemas.microsoft.com/office/drawing/2010/main" xmlns:m="http://schemas.openxmlformats.org/officeDocument/2006/math" xmlns="" val="1"/>
+              <ma14:wrappingTextBoxFlag xmlns="" xmlns:m="http://schemas.openxmlformats.org/officeDocument/2006/math" xmlns:a14="http://schemas.microsoft.com/office/drawing/2010/main" xmlns:ma14="http://schemas.microsoft.com/office/mac/drawingml/2011/main" val="1"/>
             </a:ext>
           </a:extLst>
         </p:spPr>
@@ -17413,7 +17413,7 @@
             </a:r>
             <a:r>
               <a:rPr lang="en-US" sz="6600" dirty="0"/>
-              <a:t>-tree has smaller computational complexity of keys insertion and deletion than B-tree</a:t>
+              <a:t>-tree has smaller computational complexity of keys insertion and deletion than B-tree, however it has greater memory usage</a:t>
             </a:r>
           </a:p>
           <a:p>
@@ -17529,7 +17529,7 @@
           </a:ln>
           <a:extLst>
             <a:ext uri="{C572A759-6A51-4108-AA02-DFA0A04FC94B}">
-              <ma14:wrappingTextBoxFlag xmlns:ma14="http://schemas.microsoft.com/office/mac/drawingml/2011/main" xmlns:a14="http://schemas.microsoft.com/office/drawing/2010/main" xmlns:m="http://schemas.openxmlformats.org/officeDocument/2006/math" xmlns="" val="1"/>
+              <ma14:wrappingTextBoxFlag xmlns="" xmlns:m="http://schemas.openxmlformats.org/officeDocument/2006/math" xmlns:a14="http://schemas.microsoft.com/office/drawing/2010/main" xmlns:ma14="http://schemas.microsoft.com/office/mac/drawingml/2011/main" val="1"/>
             </a:ext>
           </a:extLst>
         </p:spPr>
@@ -17713,7 +17713,7 @@
           </a:ln>
           <a:extLst>
             <a:ext uri="{C572A759-6A51-4108-AA02-DFA0A04FC94B}">
-              <ma14:wrappingTextBoxFlag xmlns:ma14="http://schemas.microsoft.com/office/mac/drawingml/2011/main" xmlns:a14="http://schemas.microsoft.com/office/drawing/2010/main" xmlns:m="http://schemas.openxmlformats.org/officeDocument/2006/math" xmlns="" val="1"/>
+              <ma14:wrappingTextBoxFlag xmlns="" xmlns:m="http://schemas.openxmlformats.org/officeDocument/2006/math" xmlns:a14="http://schemas.microsoft.com/office/drawing/2010/main" xmlns:ma14="http://schemas.microsoft.com/office/mac/drawingml/2011/main" val="1"/>
             </a:ext>
           </a:extLst>
         </p:spPr>
@@ -17762,7 +17762,7 @@
           </a:ln>
           <a:extLst>
             <a:ext uri="{C572A759-6A51-4108-AA02-DFA0A04FC94B}">
-              <ma14:wrappingTextBoxFlag xmlns:ma14="http://schemas.microsoft.com/office/mac/drawingml/2011/main" xmlns:a14="http://schemas.microsoft.com/office/drawing/2010/main" xmlns:m="http://schemas.openxmlformats.org/officeDocument/2006/math" xmlns="" val="1"/>
+              <ma14:wrappingTextBoxFlag xmlns="" xmlns:m="http://schemas.openxmlformats.org/officeDocument/2006/math" xmlns:a14="http://schemas.microsoft.com/office/drawing/2010/main" xmlns:ma14="http://schemas.microsoft.com/office/mac/drawingml/2011/main" val="1"/>
             </a:ext>
           </a:extLst>
         </p:spPr>
@@ -17958,7 +17958,7 @@
           </a:ln>
           <a:extLst>
             <a:ext uri="{C572A759-6A51-4108-AA02-DFA0A04FC94B}">
-              <ma14:wrappingTextBoxFlag xmlns:ma14="http://schemas.microsoft.com/office/mac/drawingml/2011/main" xmlns:a14="http://schemas.microsoft.com/office/drawing/2010/main" xmlns:m="http://schemas.openxmlformats.org/officeDocument/2006/math" xmlns="" val="1"/>
+              <ma14:wrappingTextBoxFlag xmlns="" xmlns:m="http://schemas.openxmlformats.org/officeDocument/2006/math" xmlns:a14="http://schemas.microsoft.com/office/drawing/2010/main" xmlns:ma14="http://schemas.microsoft.com/office/mac/drawingml/2011/main" val="1"/>
             </a:ext>
           </a:extLst>
         </p:spPr>
@@ -18110,7 +18110,7 @@
           </a:ln>
           <a:extLst>
             <a:ext uri="{C572A759-6A51-4108-AA02-DFA0A04FC94B}">
-              <ma14:wrappingTextBoxFlag xmlns:ma14="http://schemas.microsoft.com/office/mac/drawingml/2011/main" xmlns:a14="http://schemas.microsoft.com/office/drawing/2010/main" xmlns:m="http://schemas.openxmlformats.org/officeDocument/2006/math" xmlns="" val="1"/>
+              <ma14:wrappingTextBoxFlag xmlns="" xmlns:m="http://schemas.openxmlformats.org/officeDocument/2006/math" xmlns:a14="http://schemas.microsoft.com/office/drawing/2010/main" xmlns:ma14="http://schemas.microsoft.com/office/mac/drawingml/2011/main" val="1"/>
             </a:ext>
           </a:extLst>
         </p:spPr>
@@ -18221,7 +18221,7 @@
           </a:ln>
           <a:extLst>
             <a:ext uri="{C572A759-6A51-4108-AA02-DFA0A04FC94B}">
-              <ma14:wrappingTextBoxFlag xmlns:ma14="http://schemas.microsoft.com/office/mac/drawingml/2011/main" xmlns:a14="http://schemas.microsoft.com/office/drawing/2010/main" xmlns:m="http://schemas.openxmlformats.org/officeDocument/2006/math" xmlns="" val="1"/>
+              <ma14:wrappingTextBoxFlag xmlns="" xmlns:m="http://schemas.openxmlformats.org/officeDocument/2006/math" xmlns:a14="http://schemas.microsoft.com/office/drawing/2010/main" xmlns:ma14="http://schemas.microsoft.com/office/mac/drawingml/2011/main" val="1"/>
             </a:ext>
           </a:extLst>
         </p:spPr>
@@ -18358,7 +18358,7 @@
           </a:ln>
           <a:extLst>
             <a:ext uri="{C572A759-6A51-4108-AA02-DFA0A04FC94B}">
-              <ma14:wrappingTextBoxFlag xmlns:ma14="http://schemas.microsoft.com/office/mac/drawingml/2011/main" xmlns:a14="http://schemas.microsoft.com/office/drawing/2010/main" xmlns:m="http://schemas.openxmlformats.org/officeDocument/2006/math" xmlns="" val="1"/>
+              <ma14:wrappingTextBoxFlag xmlns="" xmlns:m="http://schemas.openxmlformats.org/officeDocument/2006/math" xmlns:a14="http://schemas.microsoft.com/office/drawing/2010/main" xmlns:ma14="http://schemas.microsoft.com/office/mac/drawingml/2011/main" val="1"/>
             </a:ext>
           </a:extLst>
         </p:spPr>
@@ -18409,7 +18409,7 @@
               </a:ln>
               <a:extLst>
                 <a:ext uri="{C572A759-6A51-4108-AA02-DFA0A04FC94B}">
-                  <ma14:wrappingTextBoxFlag xmlns:ma14="http://schemas.microsoft.com/office/mac/drawingml/2011/main" xmlns:m="http://schemas.openxmlformats.org/officeDocument/2006/math" xmlns="" val="1"/>
+                  <ma14:wrappingTextBoxFlag xmlns="" xmlns:m="http://schemas.openxmlformats.org/officeDocument/2006/math" xmlns:ma14="http://schemas.microsoft.com/office/mac/drawingml/2011/main" val="1"/>
                 </a:ext>
               </a:extLst>
             </p:spPr>
@@ -19032,7 +19032,7 @@
           </a:ln>
           <a:extLst>
             <a:ext uri="{C572A759-6A51-4108-AA02-DFA0A04FC94B}">
-              <ma14:wrappingTextBoxFlag xmlns:ma14="http://schemas.microsoft.com/office/mac/drawingml/2011/main" xmlns:a14="http://schemas.microsoft.com/office/drawing/2010/main" xmlns:m="http://schemas.openxmlformats.org/officeDocument/2006/math" xmlns="" val="1"/>
+              <ma14:wrappingTextBoxFlag xmlns="" xmlns:m="http://schemas.openxmlformats.org/officeDocument/2006/math" xmlns:a14="http://schemas.microsoft.com/office/drawing/2010/main" xmlns:ma14="http://schemas.microsoft.com/office/mac/drawingml/2011/main" val="1"/>
             </a:ext>
           </a:extLst>
         </p:spPr>
@@ -19583,7 +19583,7 @@
           </a:ln>
           <a:extLst>
             <a:ext uri="{C572A759-6A51-4108-AA02-DFA0A04FC94B}">
-              <ma14:wrappingTextBoxFlag xmlns:ma14="http://schemas.microsoft.com/office/mac/drawingml/2011/main" xmlns:a14="http://schemas.microsoft.com/office/drawing/2010/main" xmlns:m="http://schemas.openxmlformats.org/officeDocument/2006/math" xmlns="" val="1"/>
+              <ma14:wrappingTextBoxFlag xmlns="" xmlns:m="http://schemas.openxmlformats.org/officeDocument/2006/math" xmlns:a14="http://schemas.microsoft.com/office/drawing/2010/main" xmlns:ma14="http://schemas.microsoft.com/office/mac/drawingml/2011/main" val="1"/>
             </a:ext>
           </a:extLst>
         </p:spPr>
@@ -19632,7 +19632,7 @@
           </a:ln>
           <a:extLst>
             <a:ext uri="{C572A759-6A51-4108-AA02-DFA0A04FC94B}">
-              <ma14:wrappingTextBoxFlag xmlns:ma14="http://schemas.microsoft.com/office/mac/drawingml/2011/main" xmlns:a14="http://schemas.microsoft.com/office/drawing/2010/main" xmlns:m="http://schemas.openxmlformats.org/officeDocument/2006/math" xmlns="" val="1"/>
+              <ma14:wrappingTextBoxFlag xmlns="" xmlns:m="http://schemas.openxmlformats.org/officeDocument/2006/math" xmlns:a14="http://schemas.microsoft.com/office/drawing/2010/main" xmlns:ma14="http://schemas.microsoft.com/office/mac/drawingml/2011/main" val="1"/>
             </a:ext>
           </a:extLst>
         </p:spPr>
@@ -20792,7 +20792,7 @@
           </a:ln>
           <a:extLst>
             <a:ext uri="{C572A759-6A51-4108-AA02-DFA0A04FC94B}">
-              <ma14:wrappingTextBoxFlag xmlns:ma14="http://schemas.microsoft.com/office/mac/drawingml/2011/main" xmlns:a14="http://schemas.microsoft.com/office/drawing/2010/main" xmlns:m="http://schemas.openxmlformats.org/officeDocument/2006/math" xmlns="" val="1"/>
+              <ma14:wrappingTextBoxFlag xmlns="" xmlns:m="http://schemas.openxmlformats.org/officeDocument/2006/math" xmlns:a14="http://schemas.microsoft.com/office/drawing/2010/main" xmlns:ma14="http://schemas.microsoft.com/office/mac/drawingml/2011/main" val="1"/>
             </a:ext>
           </a:extLst>
         </p:spPr>
@@ -20843,7 +20843,7 @@
               </a:ln>
               <a:extLst>
                 <a:ext uri="{C572A759-6A51-4108-AA02-DFA0A04FC94B}">
-                  <ma14:wrappingTextBoxFlag xmlns:ma14="http://schemas.microsoft.com/office/mac/drawingml/2011/main" xmlns:m="http://schemas.openxmlformats.org/officeDocument/2006/math" xmlns="" val="1"/>
+                  <ma14:wrappingTextBoxFlag xmlns="" xmlns:m="http://schemas.openxmlformats.org/officeDocument/2006/math" xmlns:ma14="http://schemas.microsoft.com/office/mac/drawingml/2011/main" val="1"/>
                 </a:ext>
               </a:extLst>
             </p:spPr>
@@ -21432,7 +21432,7 @@
           </a:ln>
           <a:extLst>
             <a:ext uri="{C572A759-6A51-4108-AA02-DFA0A04FC94B}">
-              <ma14:wrappingTextBoxFlag xmlns:ma14="http://schemas.microsoft.com/office/mac/drawingml/2011/main" xmlns:a14="http://schemas.microsoft.com/office/drawing/2010/main" xmlns:m="http://schemas.openxmlformats.org/officeDocument/2006/math" xmlns="" val="1"/>
+              <ma14:wrappingTextBoxFlag xmlns="" xmlns:m="http://schemas.openxmlformats.org/officeDocument/2006/math" xmlns:a14="http://schemas.microsoft.com/office/drawing/2010/main" xmlns:ma14="http://schemas.microsoft.com/office/mac/drawingml/2011/main" val="1"/>
             </a:ext>
           </a:extLst>
         </p:spPr>
@@ -21933,7 +21933,7 @@
               </a:ln>
               <a:extLst>
                 <a:ext uri="{C572A759-6A51-4108-AA02-DFA0A04FC94B}">
-                  <ma14:wrappingTextBoxFlag xmlns:ma14="http://schemas.microsoft.com/office/mac/drawingml/2011/main" xmlns:m="http://schemas.openxmlformats.org/officeDocument/2006/math" xmlns="" val="1"/>
+                  <ma14:wrappingTextBoxFlag xmlns="" xmlns:m="http://schemas.openxmlformats.org/officeDocument/2006/math" xmlns:ma14="http://schemas.microsoft.com/office/mac/drawingml/2011/main" val="1"/>
                 </a:ext>
               </a:extLst>
             </p:spPr>
@@ -22938,7 +22938,7 @@
           </a:ln>
           <a:extLst>
             <a:ext uri="{C572A759-6A51-4108-AA02-DFA0A04FC94B}">
-              <ma14:wrappingTextBoxFlag xmlns:ma14="http://schemas.microsoft.com/office/mac/drawingml/2011/main" xmlns:a14="http://schemas.microsoft.com/office/drawing/2010/main" xmlns:m="http://schemas.openxmlformats.org/officeDocument/2006/math" xmlns="" val="1"/>
+              <ma14:wrappingTextBoxFlag xmlns="" xmlns:m="http://schemas.openxmlformats.org/officeDocument/2006/math" xmlns:a14="http://schemas.microsoft.com/office/drawing/2010/main" xmlns:ma14="http://schemas.microsoft.com/office/mac/drawingml/2011/main" val="1"/>
             </a:ext>
           </a:extLst>
         </p:spPr>
@@ -22987,7 +22987,7 @@
           </a:ln>
           <a:extLst>
             <a:ext uri="{C572A759-6A51-4108-AA02-DFA0A04FC94B}">
-              <ma14:wrappingTextBoxFlag xmlns:ma14="http://schemas.microsoft.com/office/mac/drawingml/2011/main" xmlns:m="http://schemas.openxmlformats.org/officeDocument/2006/math" xmlns="" xmlns:a14="http://schemas.microsoft.com/office/drawing/2010/main" xmlns:mc="http://schemas.openxmlformats.org/markup-compatibility/2006" val="1"/>
+              <ma14:wrappingTextBoxFlag xmlns:mc="http://schemas.openxmlformats.org/markup-compatibility/2006" xmlns:a14="http://schemas.microsoft.com/office/drawing/2010/main" xmlns="" xmlns:m="http://schemas.openxmlformats.org/officeDocument/2006/math" xmlns:ma14="http://schemas.microsoft.com/office/mac/drawingml/2011/main" val="1"/>
             </a:ext>
           </a:extLst>
         </p:spPr>
@@ -23302,7 +23302,7 @@
           </a:ln>
           <a:extLst>
             <a:ext uri="{C572A759-6A51-4108-AA02-DFA0A04FC94B}">
-              <ma14:wrappingTextBoxFlag xmlns:ma14="http://schemas.microsoft.com/office/mac/drawingml/2011/main" xmlns:a14="http://schemas.microsoft.com/office/drawing/2010/main" xmlns:m="http://schemas.openxmlformats.org/officeDocument/2006/math" xmlns="" val="1"/>
+              <ma14:wrappingTextBoxFlag xmlns="" xmlns:m="http://schemas.openxmlformats.org/officeDocument/2006/math" xmlns:a14="http://schemas.microsoft.com/office/drawing/2010/main" xmlns:ma14="http://schemas.microsoft.com/office/mac/drawingml/2011/main" val="1"/>
             </a:ext>
           </a:extLst>
         </p:spPr>
@@ -23959,7 +23959,7 @@
           </a:ln>
           <a:extLst>
             <a:ext uri="{C572A759-6A51-4108-AA02-DFA0A04FC94B}">
-              <ma14:wrappingTextBoxFlag xmlns:ma14="http://schemas.microsoft.com/office/mac/drawingml/2011/main" xmlns:a14="http://schemas.microsoft.com/office/drawing/2010/main" xmlns:m="http://schemas.openxmlformats.org/officeDocument/2006/math" xmlns="" val="1"/>
+              <ma14:wrappingTextBoxFlag xmlns="" xmlns:m="http://schemas.openxmlformats.org/officeDocument/2006/math" xmlns:a14="http://schemas.microsoft.com/office/drawing/2010/main" xmlns:ma14="http://schemas.microsoft.com/office/mac/drawingml/2011/main" val="1"/>
             </a:ext>
           </a:extLst>
         </p:spPr>
@@ -24013,7 +24013,7 @@
           </a:ln>
           <a:extLst>
             <a:ext uri="{C572A759-6A51-4108-AA02-DFA0A04FC94B}">
-              <ma14:wrappingTextBoxFlag xmlns:ma14="http://schemas.microsoft.com/office/mac/drawingml/2011/main" xmlns:a14="http://schemas.microsoft.com/office/drawing/2010/main" xmlns:m="http://schemas.openxmlformats.org/officeDocument/2006/math" xmlns="" val="1"/>
+              <ma14:wrappingTextBoxFlag xmlns="" xmlns:m="http://schemas.openxmlformats.org/officeDocument/2006/math" xmlns:a14="http://schemas.microsoft.com/office/drawing/2010/main" xmlns:ma14="http://schemas.microsoft.com/office/mac/drawingml/2011/main" val="1"/>
             </a:ext>
           </a:extLst>
         </p:spPr>
@@ -24117,7 +24117,7 @@
           </a:ln>
           <a:extLst>
             <a:ext uri="{C572A759-6A51-4108-AA02-DFA0A04FC94B}">
-              <ma14:wrappingTextBoxFlag xmlns:ma14="http://schemas.microsoft.com/office/mac/drawingml/2011/main" xmlns:a14="http://schemas.microsoft.com/office/drawing/2010/main" xmlns:m="http://schemas.openxmlformats.org/officeDocument/2006/math" xmlns="" val="1"/>
+              <ma14:wrappingTextBoxFlag xmlns="" xmlns:m="http://schemas.openxmlformats.org/officeDocument/2006/math" xmlns:a14="http://schemas.microsoft.com/office/drawing/2010/main" xmlns:ma14="http://schemas.microsoft.com/office/mac/drawingml/2011/main" val="1"/>
             </a:ext>
           </a:extLst>
         </p:spPr>
@@ -24423,7 +24423,7 @@
           </a:ln>
           <a:extLst>
             <a:ext uri="{C572A759-6A51-4108-AA02-DFA0A04FC94B}">
-              <ma14:wrappingTextBoxFlag xmlns:ma14="http://schemas.microsoft.com/office/mac/drawingml/2011/main" xmlns:a14="http://schemas.microsoft.com/office/drawing/2010/main" xmlns:m="http://schemas.openxmlformats.org/officeDocument/2006/math" xmlns="" val="1"/>
+              <ma14:wrappingTextBoxFlag xmlns="" xmlns:m="http://schemas.openxmlformats.org/officeDocument/2006/math" xmlns:a14="http://schemas.microsoft.com/office/drawing/2010/main" xmlns:ma14="http://schemas.microsoft.com/office/mac/drawingml/2011/main" val="1"/>
             </a:ext>
           </a:extLst>
         </p:spPr>
@@ -24472,7 +24472,7 @@
           </a:ln>
           <a:extLst>
             <a:ext uri="{C572A759-6A51-4108-AA02-DFA0A04FC94B}">
-              <ma14:wrappingTextBoxFlag xmlns:ma14="http://schemas.microsoft.com/office/mac/drawingml/2011/main" xmlns:a14="http://schemas.microsoft.com/office/drawing/2010/main" xmlns:m="http://schemas.openxmlformats.org/officeDocument/2006/math" xmlns="" val="1"/>
+              <ma14:wrappingTextBoxFlag xmlns="" xmlns:m="http://schemas.openxmlformats.org/officeDocument/2006/math" xmlns:a14="http://schemas.microsoft.com/office/drawing/2010/main" xmlns:ma14="http://schemas.microsoft.com/office/mac/drawingml/2011/main" val="1"/>
             </a:ext>
           </a:extLst>
         </p:spPr>
@@ -24605,7 +24605,7 @@
           </a:ln>
           <a:extLst>
             <a:ext uri="{C572A759-6A51-4108-AA02-DFA0A04FC94B}">
-              <ma14:wrappingTextBoxFlag xmlns:ma14="http://schemas.microsoft.com/office/mac/drawingml/2011/main" xmlns:a14="http://schemas.microsoft.com/office/drawing/2010/main" xmlns:m="http://schemas.openxmlformats.org/officeDocument/2006/math" xmlns="" val="1"/>
+              <ma14:wrappingTextBoxFlag xmlns="" xmlns:m="http://schemas.openxmlformats.org/officeDocument/2006/math" xmlns:a14="http://schemas.microsoft.com/office/drawing/2010/main" xmlns:ma14="http://schemas.microsoft.com/office/mac/drawingml/2011/main" val="1"/>
             </a:ext>
           </a:extLst>
         </p:spPr>
@@ -25200,7 +25200,7 @@
           </a:ln>
           <a:extLst>
             <a:ext uri="{C572A759-6A51-4108-AA02-DFA0A04FC94B}">
-              <ma14:wrappingTextBoxFlag xmlns:ma14="http://schemas.microsoft.com/office/mac/drawingml/2011/main" xmlns:a14="http://schemas.microsoft.com/office/drawing/2010/main" xmlns:m="http://schemas.openxmlformats.org/officeDocument/2006/math" xmlns="" val="1"/>
+              <ma14:wrappingTextBoxFlag xmlns="" xmlns:m="http://schemas.openxmlformats.org/officeDocument/2006/math" xmlns:a14="http://schemas.microsoft.com/office/drawing/2010/main" xmlns:ma14="http://schemas.microsoft.com/office/mac/drawingml/2011/main" val="1"/>
             </a:ext>
           </a:extLst>
         </p:spPr>
@@ -25249,7 +25249,7 @@
           </a:ln>
           <a:extLst>
             <a:ext uri="{C572A759-6A51-4108-AA02-DFA0A04FC94B}">
-              <ma14:wrappingTextBoxFlag xmlns:ma14="http://schemas.microsoft.com/office/mac/drawingml/2011/main" xmlns:a14="http://schemas.microsoft.com/office/drawing/2010/main" xmlns:m="http://schemas.openxmlformats.org/officeDocument/2006/math" xmlns="" val="1"/>
+              <ma14:wrappingTextBoxFlag xmlns="" xmlns:m="http://schemas.openxmlformats.org/officeDocument/2006/math" xmlns:a14="http://schemas.microsoft.com/office/drawing/2010/main" xmlns:ma14="http://schemas.microsoft.com/office/mac/drawingml/2011/main" val="1"/>
             </a:ext>
           </a:extLst>
         </p:spPr>

</xml_diff>